<commit_message>
updated description of Drasil and MathJax name
</commit_message>
<xml_diff>
--- a/People/Mohd-Bilal/research-poster/MohammadBilal_Poster.pptx
+++ b/People/Mohd-Bilal/research-poster/MohammadBilal_Poster.pptx
@@ -128,12 +128,12 @@
   <pc:docChgLst>
     <pc:chgData name="Bilal Mohammad" userId="fd6debca6fc80796" providerId="LiveId" clId="{0364F51A-C767-46A3-907C-27262140D749}"/>
     <pc:docChg chg="undo redo custSel modSld">
-      <pc:chgData name="Bilal Mohammad" userId="fd6debca6fc80796" providerId="LiveId" clId="{0364F51A-C767-46A3-907C-27262140D749}" dt="2024-08-09T13:51:39.389" v="5670" actId="20577"/>
+      <pc:chgData name="Bilal Mohammad" userId="fd6debca6fc80796" providerId="LiveId" clId="{0364F51A-C767-46A3-907C-27262140D749}" dt="2024-08-09T16:47:56.604" v="5818" actId="1036"/>
       <pc:docMkLst>
         <pc:docMk/>
       </pc:docMkLst>
       <pc:sldChg chg="addSp delSp modSp mod">
-        <pc:chgData name="Bilal Mohammad" userId="fd6debca6fc80796" providerId="LiveId" clId="{0364F51A-C767-46A3-907C-27262140D749}" dt="2024-08-09T13:51:39.389" v="5670" actId="20577"/>
+        <pc:chgData name="Bilal Mohammad" userId="fd6debca6fc80796" providerId="LiveId" clId="{0364F51A-C767-46A3-907C-27262140D749}" dt="2024-08-09T16:47:56.604" v="5818" actId="1036"/>
         <pc:sldMkLst>
           <pc:docMk/>
           <pc:sldMk cId="1069475902" sldId="256"/>
@@ -307,7 +307,7 @@
           </ac:spMkLst>
         </pc:spChg>
         <pc:spChg chg="add mod">
-          <ac:chgData name="Bilal Mohammad" userId="fd6debca6fc80796" providerId="LiveId" clId="{0364F51A-C767-46A3-907C-27262140D749}" dt="2024-08-08T20:29:24.002" v="5269" actId="113"/>
+          <ac:chgData name="Bilal Mohammad" userId="fd6debca6fc80796" providerId="LiveId" clId="{0364F51A-C767-46A3-907C-27262140D749}" dt="2024-08-09T16:46:07.531" v="5686" actId="20577"/>
           <ac:spMkLst>
             <pc:docMk/>
             <pc:sldMk cId="1069475902" sldId="256"/>
@@ -355,7 +355,7 @@
           </ac:spMkLst>
         </pc:spChg>
         <pc:spChg chg="add mod ord">
-          <ac:chgData name="Bilal Mohammad" userId="fd6debca6fc80796" providerId="LiveId" clId="{0364F51A-C767-46A3-907C-27262140D749}" dt="2024-08-08T20:29:16.127" v="5267" actId="113"/>
+          <ac:chgData name="Bilal Mohammad" userId="fd6debca6fc80796" providerId="LiveId" clId="{0364F51A-C767-46A3-907C-27262140D749}" dt="2024-08-09T16:47:56.604" v="5818" actId="1036"/>
           <ac:spMkLst>
             <pc:docMk/>
             <pc:sldMk cId="1069475902" sldId="256"/>
@@ -635,7 +635,7 @@
           </ac:spMkLst>
         </pc:spChg>
         <pc:spChg chg="add mod">
-          <ac:chgData name="Bilal Mohammad" userId="fd6debca6fc80796" providerId="LiveId" clId="{0364F51A-C767-46A3-907C-27262140D749}" dt="2024-08-08T20:29:03.747" v="5263" actId="113"/>
+          <ac:chgData name="Bilal Mohammad" userId="fd6debca6fc80796" providerId="LiveId" clId="{0364F51A-C767-46A3-907C-27262140D749}" dt="2024-08-09T16:44:57.067" v="5684" actId="20577"/>
           <ac:spMkLst>
             <pc:docMk/>
             <pc:sldMk cId="1069475902" sldId="256"/>
@@ -859,7 +859,7 @@
           </ac:grpSpMkLst>
         </pc:grpChg>
         <pc:grpChg chg="add mod">
-          <ac:chgData name="Bilal Mohammad" userId="fd6debca6fc80796" providerId="LiveId" clId="{0364F51A-C767-46A3-907C-27262140D749}" dt="2024-08-08T19:01:56.259" v="4533" actId="164"/>
+          <ac:chgData name="Bilal Mohammad" userId="fd6debca6fc80796" providerId="LiveId" clId="{0364F51A-C767-46A3-907C-27262140D749}" dt="2024-08-09T16:47:50.553" v="5815" actId="1036"/>
           <ac:grpSpMkLst>
             <pc:docMk/>
             <pc:sldMk cId="1069475902" sldId="256"/>
@@ -9866,9 +9866,9 @@
         <p:grpSpPr>
           <a:xfrm>
             <a:off x="873142" y="3775051"/>
-            <a:ext cx="7762858" cy="6950856"/>
+            <a:ext cx="7762858" cy="7198827"/>
             <a:chOff x="873142" y="3775051"/>
-            <a:chExt cx="7762858" cy="6950856"/>
+            <a:chExt cx="7762858" cy="7198827"/>
           </a:xfrm>
         </p:grpSpPr>
         <p:sp>
@@ -9885,8 +9885,8 @@
           </p:nvSpPr>
           <p:spPr>
             <a:xfrm>
-              <a:off x="873142" y="4539598"/>
-              <a:ext cx="7762857" cy="6186309"/>
+              <a:off x="873142" y="4510570"/>
+              <a:ext cx="7762857" cy="6463308"/>
             </a:xfrm>
             <a:prstGeom prst="rect">
               <a:avLst/>
@@ -10038,11 +10038,18 @@
                 <a:t>Drasil</a:t>
               </a:r>
               <a:r>
+                <a:rPr lang="en-US" sz="1800" b="1" dirty="0">
+                  <a:ea typeface="Verdana" panose="020B0604030504040204" pitchFamily="34" charset="0"/>
+                  <a:cs typeface="Arial" panose="020B0604020202020204" pitchFamily="34" charset="0"/>
+                </a:rPr>
+                <a:t>:</a:t>
+              </a:r>
+              <a:r>
                 <a:rPr lang="en-US" sz="1800" dirty="0">
                   <a:ea typeface="Verdana" panose="020B0604030504040204" pitchFamily="34" charset="0"/>
                   <a:cs typeface="Arial" panose="020B0604020202020204" pitchFamily="34" charset="0"/>
                 </a:rPr>
-                <a:t>, a software framework written in </a:t>
+                <a:t> a software framework written in </a:t>
               </a:r>
               <a:r>
                 <a:rPr lang="en-US" sz="1800" b="1" dirty="0">
@@ -10056,7 +10063,7 @@
                   <a:ea typeface="Verdana" panose="020B0604030504040204" pitchFamily="34" charset="0"/>
                   <a:cs typeface="Arial" panose="020B0604020202020204" pitchFamily="34" charset="0"/>
                 </a:rPr>
-                <a:t>, that keeps all software artifacts (requirements, design, code, tests, build scripts, documentation, etc.) synchronized with each other. </a:t>
+                <a:t> that generates all software artifacts (requirements, design, code, tests, build scripts, documentation, etc.) based on a single specification in a domain-specific language (DSL). </a:t>
               </a:r>
               <a:r>
                 <a:rPr lang="en-US" sz="1800" baseline="30000" dirty="0">
@@ -10657,7 +10664,7 @@
         </p:nvGrpSpPr>
         <p:grpSpPr>
           <a:xfrm>
-            <a:off x="873142" y="10979921"/>
+            <a:off x="873142" y="11081519"/>
             <a:ext cx="7762858" cy="5832413"/>
             <a:chOff x="873142" y="10979921"/>
             <a:chExt cx="7762858" cy="5832413"/>
@@ -10970,7 +10977,7 @@
                   <a:ea typeface="Verdana" panose="020B0604030504040204" pitchFamily="34" charset="0"/>
                   <a:cs typeface="Arial" panose="020B0604020202020204" pitchFamily="34" charset="0"/>
                 </a:rPr>
-                <a:t>Mathjax</a:t>
+                <a:t>MathJax</a:t>
               </a:r>
               <a:r>
                 <a:rPr lang="en-US" sz="1800" b="1" dirty="0">
@@ -14061,7 +14068,7 @@
                 <a:ea typeface="Verdana" panose="020B0604030504040204" pitchFamily="34" charset="0"/>
                 <a:cs typeface="Arial" panose="020B0604020202020204" pitchFamily="34" charset="0"/>
               </a:rPr>
-              <a:t>In the graph below, software generated using </a:t>
+              <a:t>In the graph below, software documentation generated using </a:t>
             </a:r>
             <a:r>
               <a:rPr lang="en-US" sz="1800" dirty="0" err="1">

</xml_diff>

<commit_message>
incorporate Dr. Smith's feedback
</commit_message>
<xml_diff>
--- a/People/Mohd-Bilal/research-poster/MohammadBilal_Poster.pptx
+++ b/People/Mohd-Bilal/research-poster/MohammadBilal_Poster.pptx
@@ -118,7 +118,7 @@
 <file path=ppt/revisionInfo.xml><?xml version="1.0" encoding="utf-8"?>
 <p1510:revInfo xmlns:a="http://schemas.openxmlformats.org/drawingml/2006/main" xmlns:r="http://schemas.openxmlformats.org/officeDocument/2006/relationships" xmlns:p1510="http://schemas.microsoft.com/office/powerpoint/2015/10/main">
   <p1510:revLst>
-    <p1510:client id="{0364F51A-C767-46A3-907C-27262140D749}" v="551" dt="2024-08-08T20:26:14.770"/>
+    <p1510:client id="{0364F51A-C767-46A3-907C-27262140D749}" v="563" dt="2024-08-12T14:33:15.262"/>
   </p1510:revLst>
 </p1510:revInfo>
 </file>
@@ -128,12 +128,12 @@
   <pc:docChgLst>
     <pc:chgData name="Bilal Mohammad" userId="fd6debca6fc80796" providerId="LiveId" clId="{0364F51A-C767-46A3-907C-27262140D749}"/>
     <pc:docChg chg="undo redo custSel modSld">
-      <pc:chgData name="Bilal Mohammad" userId="fd6debca6fc80796" providerId="LiveId" clId="{0364F51A-C767-46A3-907C-27262140D749}" dt="2024-08-09T16:47:56.604" v="5818" actId="1036"/>
+      <pc:chgData name="Bilal Mohammad" userId="fd6debca6fc80796" providerId="LiveId" clId="{0364F51A-C767-46A3-907C-27262140D749}" dt="2024-08-12T14:43:55.648" v="6357" actId="20577"/>
       <pc:docMkLst>
         <pc:docMk/>
       </pc:docMkLst>
       <pc:sldChg chg="addSp delSp modSp mod">
-        <pc:chgData name="Bilal Mohammad" userId="fd6debca6fc80796" providerId="LiveId" clId="{0364F51A-C767-46A3-907C-27262140D749}" dt="2024-08-09T16:47:56.604" v="5818" actId="1036"/>
+        <pc:chgData name="Bilal Mohammad" userId="fd6debca6fc80796" providerId="LiveId" clId="{0364F51A-C767-46A3-907C-27262140D749}" dt="2024-08-12T14:43:55.648" v="6357" actId="20577"/>
         <pc:sldMkLst>
           <pc:docMk/>
           <pc:sldMk cId="1069475902" sldId="256"/>
@@ -144,6 +144,22 @@
             <pc:docMk/>
             <pc:sldMk cId="1069475902" sldId="256"/>
             <ac:spMk id="2" creationId="{CD386C48-603A-CAA5-D0F2-C8045A3E4724}"/>
+          </ac:spMkLst>
+        </pc:spChg>
+        <pc:spChg chg="add mod">
+          <ac:chgData name="Bilal Mohammad" userId="fd6debca6fc80796" providerId="LiveId" clId="{0364F51A-C767-46A3-907C-27262140D749}" dt="2024-08-12T14:21:27.415" v="6257" actId="1076"/>
+          <ac:spMkLst>
+            <pc:docMk/>
+            <pc:sldMk cId="1069475902" sldId="256"/>
+            <ac:spMk id="3" creationId="{53DC95C1-0D2E-8614-03EC-6596C4D11ED0}"/>
+          </ac:spMkLst>
+        </pc:spChg>
+        <pc:spChg chg="add mod">
+          <ac:chgData name="Bilal Mohammad" userId="fd6debca6fc80796" providerId="LiveId" clId="{0364F51A-C767-46A3-907C-27262140D749}" dt="2024-08-12T14:21:52.633" v="6260" actId="1076"/>
+          <ac:spMkLst>
+            <pc:docMk/>
+            <pc:sldMk cId="1069475902" sldId="256"/>
+            <ac:spMk id="4" creationId="{398D50D5-C715-6626-B00C-52180850CC4D}"/>
           </ac:spMkLst>
         </pc:spChg>
         <pc:spChg chg="add del mod">
@@ -160,6 +176,14 @@
             <pc:docMk/>
             <pc:sldMk cId="1069475902" sldId="256"/>
             <ac:spMk id="5" creationId="{0F919608-CFCF-5F0E-0244-049E5A196DE8}"/>
+          </ac:spMkLst>
+        </pc:spChg>
+        <pc:spChg chg="add mod">
+          <ac:chgData name="Bilal Mohammad" userId="fd6debca6fc80796" providerId="LiveId" clId="{0364F51A-C767-46A3-907C-27262140D749}" dt="2024-08-12T14:22:01.766" v="6263" actId="1076"/>
+          <ac:spMkLst>
+            <pc:docMk/>
+            <pc:sldMk cId="1069475902" sldId="256"/>
+            <ac:spMk id="6" creationId="{2C8E3598-EA35-0942-C272-224A441D05D1}"/>
           </ac:spMkLst>
         </pc:spChg>
         <pc:spChg chg="del">
@@ -200,6 +224,14 @@
             <pc:docMk/>
             <pc:sldMk cId="1069475902" sldId="256"/>
             <ac:spMk id="10" creationId="{1AFED893-BFEB-ACAB-BC24-A6A5F1926105}"/>
+          </ac:spMkLst>
+        </pc:spChg>
+        <pc:spChg chg="add mod">
+          <ac:chgData name="Bilal Mohammad" userId="fd6debca6fc80796" providerId="LiveId" clId="{0364F51A-C767-46A3-907C-27262140D749}" dt="2024-08-12T14:22:11.619" v="6265" actId="1076"/>
+          <ac:spMkLst>
+            <pc:docMk/>
+            <pc:sldMk cId="1069475902" sldId="256"/>
+            <ac:spMk id="11" creationId="{37A70703-1E45-1924-F6BE-67F006EA5F7B}"/>
           </ac:spMkLst>
         </pc:spChg>
         <pc:spChg chg="add del mod">
@@ -275,11 +307,27 @@
           </ac:spMkLst>
         </pc:spChg>
         <pc:spChg chg="add mod">
+          <ac:chgData name="Bilal Mohammad" userId="fd6debca6fc80796" providerId="LiveId" clId="{0364F51A-C767-46A3-907C-27262140D749}" dt="2024-08-12T14:23:03.105" v="6272" actId="1076"/>
+          <ac:spMkLst>
+            <pc:docMk/>
+            <pc:sldMk cId="1069475902" sldId="256"/>
+            <ac:spMk id="15" creationId="{D6CBB618-486E-B6BC-4CC5-F89743EAFC07}"/>
+          </ac:spMkLst>
+        </pc:spChg>
+        <pc:spChg chg="add mod">
           <ac:chgData name="Bilal Mohammad" userId="fd6debca6fc80796" providerId="LiveId" clId="{0364F51A-C767-46A3-907C-27262140D749}" dt="2024-08-08T13:55:51.055" v="2158" actId="14100"/>
           <ac:spMkLst>
             <pc:docMk/>
             <pc:sldMk cId="1069475902" sldId="256"/>
             <ac:spMk id="16" creationId="{88C189F3-5D35-971F-838F-ED069219F8CA}"/>
+          </ac:spMkLst>
+        </pc:spChg>
+        <pc:spChg chg="add mod">
+          <ac:chgData name="Bilal Mohammad" userId="fd6debca6fc80796" providerId="LiveId" clId="{0364F51A-C767-46A3-907C-27262140D749}" dt="2024-08-12T14:23:33.872" v="6277" actId="1076"/>
+          <ac:spMkLst>
+            <pc:docMk/>
+            <pc:sldMk cId="1069475902" sldId="256"/>
+            <ac:spMk id="17" creationId="{6523B1C2-FC3C-5DFF-5FCA-ABA2545C8B38}"/>
           </ac:spMkLst>
         </pc:spChg>
         <pc:spChg chg="add del mod">
@@ -298,6 +346,14 @@
             <ac:spMk id="18" creationId="{1273D8D3-25DB-60D6-2BBA-3792F8E9847F}"/>
           </ac:spMkLst>
         </pc:spChg>
+        <pc:spChg chg="add mod">
+          <ac:chgData name="Bilal Mohammad" userId="fd6debca6fc80796" providerId="LiveId" clId="{0364F51A-C767-46A3-907C-27262140D749}" dt="2024-08-12T14:23:55.632" v="6281" actId="1076"/>
+          <ac:spMkLst>
+            <pc:docMk/>
+            <pc:sldMk cId="1069475902" sldId="256"/>
+            <ac:spMk id="18" creationId="{8656AD6B-39C2-B11F-5659-1740435EFCFF}"/>
+          </ac:spMkLst>
+        </pc:spChg>
         <pc:spChg chg="add del mod">
           <ac:chgData name="Bilal Mohammad" userId="fd6debca6fc80796" providerId="LiveId" clId="{0364F51A-C767-46A3-907C-27262140D749}" dt="2024-08-08T15:06:47.215" v="3631" actId="478"/>
           <ac:spMkLst>
@@ -306,8 +362,16 @@
             <ac:spMk id="19" creationId="{1D729EF0-B2EF-031A-4E5F-F9D1CC0D9FC6}"/>
           </ac:spMkLst>
         </pc:spChg>
+        <pc:spChg chg="add del mod">
+          <ac:chgData name="Bilal Mohammad" userId="fd6debca6fc80796" providerId="LiveId" clId="{0364F51A-C767-46A3-907C-27262140D749}" dt="2024-08-12T14:24:07.712" v="6285" actId="478"/>
+          <ac:spMkLst>
+            <pc:docMk/>
+            <pc:sldMk cId="1069475902" sldId="256"/>
+            <ac:spMk id="19" creationId="{3E7D5673-FE11-71D2-5A82-CFAD81B8BBA0}"/>
+          </ac:spMkLst>
+        </pc:spChg>
         <pc:spChg chg="add mod">
-          <ac:chgData name="Bilal Mohammad" userId="fd6debca6fc80796" providerId="LiveId" clId="{0364F51A-C767-46A3-907C-27262140D749}" dt="2024-08-09T16:46:07.531" v="5686" actId="20577"/>
+          <ac:chgData name="Bilal Mohammad" userId="fd6debca6fc80796" providerId="LiveId" clId="{0364F51A-C767-46A3-907C-27262140D749}" dt="2024-08-12T14:41:51.112" v="6349" actId="113"/>
           <ac:spMkLst>
             <pc:docMk/>
             <pc:sldMk cId="1069475902" sldId="256"/>
@@ -331,6 +395,14 @@
           </ac:spMkLst>
         </pc:spChg>
         <pc:spChg chg="add mod">
+          <ac:chgData name="Bilal Mohammad" userId="fd6debca6fc80796" providerId="LiveId" clId="{0364F51A-C767-46A3-907C-27262140D749}" dt="2024-08-12T14:25:02.771" v="6291" actId="1076"/>
+          <ac:spMkLst>
+            <pc:docMk/>
+            <pc:sldMk cId="1069475902" sldId="256"/>
+            <ac:spMk id="21" creationId="{C6776E2C-F6C4-9D2B-435C-CA9EE5B55FEB}"/>
+          </ac:spMkLst>
+        </pc:spChg>
+        <pc:spChg chg="add mod">
           <ac:chgData name="Bilal Mohammad" userId="fd6debca6fc80796" providerId="LiveId" clId="{0364F51A-C767-46A3-907C-27262140D749}" dt="2024-08-08T19:01:18.694" v="4531" actId="164"/>
           <ac:spMkLst>
             <pc:docMk/>
@@ -347,7 +419,7 @@
           </ac:spMkLst>
         </pc:spChg>
         <pc:spChg chg="add mod">
-          <ac:chgData name="Bilal Mohammad" userId="fd6debca6fc80796" providerId="LiveId" clId="{0364F51A-C767-46A3-907C-27262140D749}" dt="2024-08-08T19:02:09.140" v="4534" actId="164"/>
+          <ac:chgData name="Bilal Mohammad" userId="fd6debca6fc80796" providerId="LiveId" clId="{0364F51A-C767-46A3-907C-27262140D749}" dt="2024-08-12T14:08:37.619" v="6109" actId="1076"/>
           <ac:spMkLst>
             <pc:docMk/>
             <pc:sldMk cId="1069475902" sldId="256"/>
@@ -355,7 +427,7 @@
           </ac:spMkLst>
         </pc:spChg>
         <pc:spChg chg="add mod ord">
-          <ac:chgData name="Bilal Mohammad" userId="fd6debca6fc80796" providerId="LiveId" clId="{0364F51A-C767-46A3-907C-27262140D749}" dt="2024-08-09T16:47:56.604" v="5818" actId="1036"/>
+          <ac:chgData name="Bilal Mohammad" userId="fd6debca6fc80796" providerId="LiveId" clId="{0364F51A-C767-46A3-907C-27262140D749}" dt="2024-08-12T14:42:10.250" v="6351" actId="113"/>
           <ac:spMkLst>
             <pc:docMk/>
             <pc:sldMk cId="1069475902" sldId="256"/>
@@ -387,7 +459,7 @@
           </ac:spMkLst>
         </pc:spChg>
         <pc:spChg chg="add mod">
-          <ac:chgData name="Bilal Mohammad" userId="fd6debca6fc80796" providerId="LiveId" clId="{0364F51A-C767-46A3-907C-27262140D749}" dt="2024-08-08T19:01:56.259" v="4533" actId="164"/>
+          <ac:chgData name="Bilal Mohammad" userId="fd6debca6fc80796" providerId="LiveId" clId="{0364F51A-C767-46A3-907C-27262140D749}" dt="2024-08-12T13:42:10.557" v="5857" actId="20577"/>
           <ac:spMkLst>
             <pc:docMk/>
             <pc:sldMk cId="1069475902" sldId="256"/>
@@ -395,7 +467,7 @@
           </ac:spMkLst>
         </pc:spChg>
         <pc:spChg chg="add mod">
-          <ac:chgData name="Bilal Mohammad" userId="fd6debca6fc80796" providerId="LiveId" clId="{0364F51A-C767-46A3-907C-27262140D749}" dt="2024-08-08T19:02:09.140" v="4534" actId="164"/>
+          <ac:chgData name="Bilal Mohammad" userId="fd6debca6fc80796" providerId="LiveId" clId="{0364F51A-C767-46A3-907C-27262140D749}" dt="2024-08-12T14:08:57.948" v="6116" actId="1035"/>
           <ac:spMkLst>
             <pc:docMk/>
             <pc:sldMk cId="1069475902" sldId="256"/>
@@ -403,7 +475,7 @@
           </ac:spMkLst>
         </pc:spChg>
         <pc:spChg chg="add mod">
-          <ac:chgData name="Bilal Mohammad" userId="fd6debca6fc80796" providerId="LiveId" clId="{0364F51A-C767-46A3-907C-27262140D749}" dt="2024-08-08T19:02:09.140" v="4534" actId="164"/>
+          <ac:chgData name="Bilal Mohammad" userId="fd6debca6fc80796" providerId="LiveId" clId="{0364F51A-C767-46A3-907C-27262140D749}" dt="2024-08-12T14:08:57.948" v="6116" actId="1035"/>
           <ac:spMkLst>
             <pc:docMk/>
             <pc:sldMk cId="1069475902" sldId="256"/>
@@ -547,7 +619,7 @@
           </ac:spMkLst>
         </pc:spChg>
         <pc:spChg chg="add mod topLvl">
-          <ac:chgData name="Bilal Mohammad" userId="fd6debca6fc80796" providerId="LiveId" clId="{0364F51A-C767-46A3-907C-27262140D749}" dt="2024-08-08T19:01:18.694" v="4531" actId="164"/>
+          <ac:chgData name="Bilal Mohammad" userId="fd6debca6fc80796" providerId="LiveId" clId="{0364F51A-C767-46A3-907C-27262140D749}" dt="2024-08-12T14:19:44.418" v="6241" actId="1076"/>
           <ac:spMkLst>
             <pc:docMk/>
             <pc:sldMk cId="1069475902" sldId="256"/>
@@ -579,7 +651,7 @@
           </ac:spMkLst>
         </pc:spChg>
         <pc:spChg chg="add mod">
-          <ac:chgData name="Bilal Mohammad" userId="fd6debca6fc80796" providerId="LiveId" clId="{0364F51A-C767-46A3-907C-27262140D749}" dt="2024-08-08T19:02:20.688" v="4535" actId="164"/>
+          <ac:chgData name="Bilal Mohammad" userId="fd6debca6fc80796" providerId="LiveId" clId="{0364F51A-C767-46A3-907C-27262140D749}" dt="2024-08-12T14:40:35.025" v="6347" actId="20577"/>
           <ac:spMkLst>
             <pc:docMk/>
             <pc:sldMk cId="1069475902" sldId="256"/>
@@ -587,7 +659,7 @@
           </ac:spMkLst>
         </pc:spChg>
         <pc:spChg chg="add mod">
-          <ac:chgData name="Bilal Mohammad" userId="fd6debca6fc80796" providerId="LiveId" clId="{0364F51A-C767-46A3-907C-27262140D749}" dt="2024-08-09T13:51:39.389" v="5670" actId="20577"/>
+          <ac:chgData name="Bilal Mohammad" userId="fd6debca6fc80796" providerId="LiveId" clId="{0364F51A-C767-46A3-907C-27262140D749}" dt="2024-08-12T13:53:41.106" v="5948" actId="20577"/>
           <ac:spMkLst>
             <pc:docMk/>
             <pc:sldMk cId="1069475902" sldId="256"/>
@@ -595,7 +667,7 @@
           </ac:spMkLst>
         </pc:spChg>
         <pc:spChg chg="add mod topLvl">
-          <ac:chgData name="Bilal Mohammad" userId="fd6debca6fc80796" providerId="LiveId" clId="{0364F51A-C767-46A3-907C-27262140D749}" dt="2024-08-08T19:01:18.694" v="4531" actId="164"/>
+          <ac:chgData name="Bilal Mohammad" userId="fd6debca6fc80796" providerId="LiveId" clId="{0364F51A-C767-46A3-907C-27262140D749}" dt="2024-08-12T14:21:19.360" v="6255" actId="1076"/>
           <ac:spMkLst>
             <pc:docMk/>
             <pc:sldMk cId="1069475902" sldId="256"/>
@@ -603,7 +675,7 @@
           </ac:spMkLst>
         </pc:spChg>
         <pc:spChg chg="add mod">
-          <ac:chgData name="Bilal Mohammad" userId="fd6debca6fc80796" providerId="LiveId" clId="{0364F51A-C767-46A3-907C-27262140D749}" dt="2024-08-08T20:04:54.784" v="5064" actId="1035"/>
+          <ac:chgData name="Bilal Mohammad" userId="fd6debca6fc80796" providerId="LiveId" clId="{0364F51A-C767-46A3-907C-27262140D749}" dt="2024-08-12T13:54:08.122" v="5984" actId="1035"/>
           <ac:spMkLst>
             <pc:docMk/>
             <pc:sldMk cId="1069475902" sldId="256"/>
@@ -611,15 +683,15 @@
           </ac:spMkLst>
         </pc:spChg>
         <pc:spChg chg="add mod">
-          <ac:chgData name="Bilal Mohammad" userId="fd6debca6fc80796" providerId="LiveId" clId="{0364F51A-C767-46A3-907C-27262140D749}" dt="2024-08-08T20:04:54.784" v="5064" actId="1035"/>
+          <ac:chgData name="Bilal Mohammad" userId="fd6debca6fc80796" providerId="LiveId" clId="{0364F51A-C767-46A3-907C-27262140D749}" dt="2024-08-12T13:54:08.122" v="5984" actId="1035"/>
           <ac:spMkLst>
             <pc:docMk/>
             <pc:sldMk cId="1069475902" sldId="256"/>
             <ac:spMk id="73" creationId="{DC32BF8C-EF5F-7E77-814D-F79CAEC82D00}"/>
           </ac:spMkLst>
         </pc:spChg>
-        <pc:spChg chg="add mod topLvl">
-          <ac:chgData name="Bilal Mohammad" userId="fd6debca6fc80796" providerId="LiveId" clId="{0364F51A-C767-46A3-907C-27262140D749}" dt="2024-08-08T19:01:18.694" v="4531" actId="164"/>
+        <pc:spChg chg="add del mod topLvl">
+          <ac:chgData name="Bilal Mohammad" userId="fd6debca6fc80796" providerId="LiveId" clId="{0364F51A-C767-46A3-907C-27262140D749}" dt="2024-08-12T14:20:27.178" v="6247" actId="478"/>
           <ac:spMkLst>
             <pc:docMk/>
             <pc:sldMk cId="1069475902" sldId="256"/>
@@ -627,7 +699,7 @@
           </ac:spMkLst>
         </pc:spChg>
         <pc:spChg chg="add mod">
-          <ac:chgData name="Bilal Mohammad" userId="fd6debca6fc80796" providerId="LiveId" clId="{0364F51A-C767-46A3-907C-27262140D749}" dt="2024-08-08T19:48:04.884" v="4756" actId="1076"/>
+          <ac:chgData name="Bilal Mohammad" userId="fd6debca6fc80796" providerId="LiveId" clId="{0364F51A-C767-46A3-907C-27262140D749}" dt="2024-08-12T13:54:00.295" v="5961" actId="1035"/>
           <ac:spMkLst>
             <pc:docMk/>
             <pc:sldMk cId="1069475902" sldId="256"/>
@@ -635,7 +707,7 @@
           </ac:spMkLst>
         </pc:spChg>
         <pc:spChg chg="add mod">
-          <ac:chgData name="Bilal Mohammad" userId="fd6debca6fc80796" providerId="LiveId" clId="{0364F51A-C767-46A3-907C-27262140D749}" dt="2024-08-09T16:44:57.067" v="5684" actId="20577"/>
+          <ac:chgData name="Bilal Mohammad" userId="fd6debca6fc80796" providerId="LiveId" clId="{0364F51A-C767-46A3-907C-27262140D749}" dt="2024-08-12T14:43:55.648" v="6357" actId="20577"/>
           <ac:spMkLst>
             <pc:docMk/>
             <pc:sldMk cId="1069475902" sldId="256"/>
@@ -666,48 +738,48 @@
             <ac:spMk id="96" creationId="{71D25F34-C0D9-4306-9073-DEDBC0C7B5EB}"/>
           </ac:spMkLst>
         </pc:spChg>
-        <pc:spChg chg="add mod topLvl">
-          <ac:chgData name="Bilal Mohammad" userId="fd6debca6fc80796" providerId="LiveId" clId="{0364F51A-C767-46A3-907C-27262140D749}" dt="2024-08-08T19:01:18.694" v="4531" actId="164"/>
+        <pc:spChg chg="add del mod topLvl">
+          <ac:chgData name="Bilal Mohammad" userId="fd6debca6fc80796" providerId="LiveId" clId="{0364F51A-C767-46A3-907C-27262140D749}" dt="2024-08-12T14:19:24.325" v="6236" actId="478"/>
           <ac:spMkLst>
             <pc:docMk/>
             <pc:sldMk cId="1069475902" sldId="256"/>
             <ac:spMk id="97" creationId="{CBDF711D-554B-9A7A-690E-529E7D25C308}"/>
           </ac:spMkLst>
         </pc:spChg>
-        <pc:spChg chg="add mod topLvl">
-          <ac:chgData name="Bilal Mohammad" userId="fd6debca6fc80796" providerId="LiveId" clId="{0364F51A-C767-46A3-907C-27262140D749}" dt="2024-08-08T19:01:18.694" v="4531" actId="164"/>
+        <pc:spChg chg="add del mod topLvl">
+          <ac:chgData name="Bilal Mohammad" userId="fd6debca6fc80796" providerId="LiveId" clId="{0364F51A-C767-46A3-907C-27262140D749}" dt="2024-08-12T14:20:19.906" v="6245" actId="478"/>
           <ac:spMkLst>
             <pc:docMk/>
             <pc:sldMk cId="1069475902" sldId="256"/>
             <ac:spMk id="98" creationId="{DBAADFFC-32F9-6F3A-F27E-0B8CC562A7F7}"/>
           </ac:spMkLst>
         </pc:spChg>
-        <pc:spChg chg="add mod topLvl">
-          <ac:chgData name="Bilal Mohammad" userId="fd6debca6fc80796" providerId="LiveId" clId="{0364F51A-C767-46A3-907C-27262140D749}" dt="2024-08-08T19:01:18.694" v="4531" actId="164"/>
+        <pc:spChg chg="add del mod topLvl">
+          <ac:chgData name="Bilal Mohammad" userId="fd6debca6fc80796" providerId="LiveId" clId="{0364F51A-C767-46A3-907C-27262140D749}" dt="2024-08-12T14:20:24.009" v="6246" actId="478"/>
           <ac:spMkLst>
             <pc:docMk/>
             <pc:sldMk cId="1069475902" sldId="256"/>
             <ac:spMk id="99" creationId="{7FAA080E-0B90-0D90-BD60-5FCA4CB6D73A}"/>
           </ac:spMkLst>
         </pc:spChg>
-        <pc:spChg chg="add mod topLvl">
-          <ac:chgData name="Bilal Mohammad" userId="fd6debca6fc80796" providerId="LiveId" clId="{0364F51A-C767-46A3-907C-27262140D749}" dt="2024-08-08T19:01:18.694" v="4531" actId="164"/>
+        <pc:spChg chg="add del mod topLvl">
+          <ac:chgData name="Bilal Mohammad" userId="fd6debca6fc80796" providerId="LiveId" clId="{0364F51A-C767-46A3-907C-27262140D749}" dt="2024-08-12T14:20:31.623" v="6248" actId="478"/>
           <ac:spMkLst>
             <pc:docMk/>
             <pc:sldMk cId="1069475902" sldId="256"/>
             <ac:spMk id="100" creationId="{9F810912-4502-9B89-DB00-BA1056252010}"/>
           </ac:spMkLst>
         </pc:spChg>
-        <pc:spChg chg="add mod topLvl">
-          <ac:chgData name="Bilal Mohammad" userId="fd6debca6fc80796" providerId="LiveId" clId="{0364F51A-C767-46A3-907C-27262140D749}" dt="2024-08-08T19:01:18.694" v="4531" actId="164"/>
+        <pc:spChg chg="add del mod topLvl">
+          <ac:chgData name="Bilal Mohammad" userId="fd6debca6fc80796" providerId="LiveId" clId="{0364F51A-C767-46A3-907C-27262140D749}" dt="2024-08-12T14:20:35.260" v="6249" actId="478"/>
           <ac:spMkLst>
             <pc:docMk/>
             <pc:sldMk cId="1069475902" sldId="256"/>
             <ac:spMk id="101" creationId="{A8520A3D-DBCF-B1D9-0F52-7C39B7E4E1D7}"/>
           </ac:spMkLst>
         </pc:spChg>
-        <pc:spChg chg="add mod topLvl">
-          <ac:chgData name="Bilal Mohammad" userId="fd6debca6fc80796" providerId="LiveId" clId="{0364F51A-C767-46A3-907C-27262140D749}" dt="2024-08-08T19:01:18.694" v="4531" actId="164"/>
+        <pc:spChg chg="add del mod topLvl">
+          <ac:chgData name="Bilal Mohammad" userId="fd6debca6fc80796" providerId="LiveId" clId="{0364F51A-C767-46A3-907C-27262140D749}" dt="2024-08-12T14:20:38.544" v="6250" actId="478"/>
           <ac:spMkLst>
             <pc:docMk/>
             <pc:sldMk cId="1069475902" sldId="256"/>
@@ -739,7 +811,7 @@
           </ac:spMkLst>
         </pc:spChg>
         <pc:spChg chg="add mod topLvl">
-          <ac:chgData name="Bilal Mohammad" userId="fd6debca6fc80796" providerId="LiveId" clId="{0364F51A-C767-46A3-907C-27262140D749}" dt="2024-08-08T19:01:18.694" v="4531" actId="164"/>
+          <ac:chgData name="Bilal Mohammad" userId="fd6debca6fc80796" providerId="LiveId" clId="{0364F51A-C767-46A3-907C-27262140D749}" dt="2024-08-12T14:25:37.771" v="6296" actId="1076"/>
           <ac:spMkLst>
             <pc:docMk/>
             <pc:sldMk cId="1069475902" sldId="256"/>
@@ -747,7 +819,7 @@
           </ac:spMkLst>
         </pc:spChg>
         <pc:spChg chg="add mod topLvl">
-          <ac:chgData name="Bilal Mohammad" userId="fd6debca6fc80796" providerId="LiveId" clId="{0364F51A-C767-46A3-907C-27262140D749}" dt="2024-08-08T19:01:18.694" v="4531" actId="164"/>
+          <ac:chgData name="Bilal Mohammad" userId="fd6debca6fc80796" providerId="LiveId" clId="{0364F51A-C767-46A3-907C-27262140D749}" dt="2024-08-12T14:25:34.102" v="6295" actId="1076"/>
           <ac:spMkLst>
             <pc:docMk/>
             <pc:sldMk cId="1069475902" sldId="256"/>
@@ -755,15 +827,15 @@
           </ac:spMkLst>
         </pc:spChg>
         <pc:spChg chg="add mod topLvl">
-          <ac:chgData name="Bilal Mohammad" userId="fd6debca6fc80796" providerId="LiveId" clId="{0364F51A-C767-46A3-907C-27262140D749}" dt="2024-08-08T19:01:18.694" v="4531" actId="164"/>
+          <ac:chgData name="Bilal Mohammad" userId="fd6debca6fc80796" providerId="LiveId" clId="{0364F51A-C767-46A3-907C-27262140D749}" dt="2024-08-12T14:25:45.852" v="6298" actId="1076"/>
           <ac:spMkLst>
             <pc:docMk/>
             <pc:sldMk cId="1069475902" sldId="256"/>
             <ac:spMk id="108" creationId="{2C4EA28C-4D95-E692-3F3E-FF9CFF41CB7A}"/>
           </ac:spMkLst>
         </pc:spChg>
-        <pc:spChg chg="add mod topLvl">
-          <ac:chgData name="Bilal Mohammad" userId="fd6debca6fc80796" providerId="LiveId" clId="{0364F51A-C767-46A3-907C-27262140D749}" dt="2024-08-08T19:01:18.694" v="4531" actId="164"/>
+        <pc:spChg chg="add del mod topLvl">
+          <ac:chgData name="Bilal Mohammad" userId="fd6debca6fc80796" providerId="LiveId" clId="{0364F51A-C767-46A3-907C-27262140D749}" dt="2024-08-12T14:22:20.259" v="6266" actId="478"/>
           <ac:spMkLst>
             <pc:docMk/>
             <pc:sldMk cId="1069475902" sldId="256"/>
@@ -843,7 +915,7 @@
           </ac:grpSpMkLst>
         </pc:grpChg>
         <pc:grpChg chg="add mod">
-          <ac:chgData name="Bilal Mohammad" userId="fd6debca6fc80796" providerId="LiveId" clId="{0364F51A-C767-46A3-907C-27262140D749}" dt="2024-08-08T19:01:18.694" v="4531" actId="164"/>
+          <ac:chgData name="Bilal Mohammad" userId="fd6debca6fc80796" providerId="LiveId" clId="{0364F51A-C767-46A3-907C-27262140D749}" dt="2024-08-12T14:23:07.497" v="6274" actId="1076"/>
           <ac:grpSpMkLst>
             <pc:docMk/>
             <pc:sldMk cId="1069475902" sldId="256"/>
@@ -859,7 +931,7 @@
           </ac:grpSpMkLst>
         </pc:grpChg>
         <pc:grpChg chg="add mod">
-          <ac:chgData name="Bilal Mohammad" userId="fd6debca6fc80796" providerId="LiveId" clId="{0364F51A-C767-46A3-907C-27262140D749}" dt="2024-08-09T16:47:50.553" v="5815" actId="1036"/>
+          <ac:chgData name="Bilal Mohammad" userId="fd6debca6fc80796" providerId="LiveId" clId="{0364F51A-C767-46A3-907C-27262140D749}" dt="2024-08-12T14:10:48.714" v="6184" actId="1036"/>
           <ac:grpSpMkLst>
             <pc:docMk/>
             <pc:sldMk cId="1069475902" sldId="256"/>
@@ -867,7 +939,7 @@
           </ac:grpSpMkLst>
         </pc:grpChg>
         <pc:grpChg chg="add mod">
-          <ac:chgData name="Bilal Mohammad" userId="fd6debca6fc80796" providerId="LiveId" clId="{0364F51A-C767-46A3-907C-27262140D749}" dt="2024-08-08T19:02:09.140" v="4534" actId="164"/>
+          <ac:chgData name="Bilal Mohammad" userId="fd6debca6fc80796" providerId="LiveId" clId="{0364F51A-C767-46A3-907C-27262140D749}" dt="2024-08-12T14:08:25.639" v="6108" actId="14100"/>
           <ac:grpSpMkLst>
             <pc:docMk/>
             <pc:sldMk cId="1069475902" sldId="256"/>
@@ -923,7 +995,7 @@
           </ac:graphicFrameMkLst>
         </pc:graphicFrameChg>
         <pc:graphicFrameChg chg="add mod modGraphic">
-          <ac:chgData name="Bilal Mohammad" userId="fd6debca6fc80796" providerId="LiveId" clId="{0364F51A-C767-46A3-907C-27262140D749}" dt="2024-08-08T19:02:09.140" v="4534" actId="164"/>
+          <ac:chgData name="Bilal Mohammad" userId="fd6debca6fc80796" providerId="LiveId" clId="{0364F51A-C767-46A3-907C-27262140D749}" dt="2024-08-12T14:09:20.476" v="6119" actId="255"/>
           <ac:graphicFrameMkLst>
             <pc:docMk/>
             <pc:sldMk cId="1069475902" sldId="256"/>
@@ -931,7 +1003,7 @@
           </ac:graphicFrameMkLst>
         </pc:graphicFrameChg>
         <pc:graphicFrameChg chg="add mod">
-          <ac:chgData name="Bilal Mohammad" userId="fd6debca6fc80796" providerId="LiveId" clId="{0364F51A-C767-46A3-907C-27262140D749}" dt="2024-08-08T20:01:43.830" v="4857"/>
+          <ac:chgData name="Bilal Mohammad" userId="fd6debca6fc80796" providerId="LiveId" clId="{0364F51A-C767-46A3-907C-27262140D749}" dt="2024-08-12T14:33:15.262" v="6315"/>
           <ac:graphicFrameMkLst>
             <pc:docMk/>
             <pc:sldMk cId="1069475902" sldId="256"/>
@@ -1011,7 +1083,7 @@
           </ac:picMkLst>
         </pc:picChg>
         <pc:picChg chg="add mod topLvl modCrop">
-          <ac:chgData name="Bilal Mohammad" userId="fd6debca6fc80796" providerId="LiveId" clId="{0364F51A-C767-46A3-907C-27262140D749}" dt="2024-08-08T19:01:18.694" v="4531" actId="164"/>
+          <ac:chgData name="Bilal Mohammad" userId="fd6debca6fc80796" providerId="LiveId" clId="{0364F51A-C767-46A3-907C-27262140D749}" dt="2024-08-12T14:17:52.184" v="6226" actId="14100"/>
           <ac:picMkLst>
             <pc:docMk/>
             <pc:sldMk cId="1069475902" sldId="256"/>
@@ -1019,7 +1091,7 @@
           </ac:picMkLst>
         </pc:picChg>
         <pc:picChg chg="add mod topLvl">
-          <ac:chgData name="Bilal Mohammad" userId="fd6debca6fc80796" providerId="LiveId" clId="{0364F51A-C767-46A3-907C-27262140D749}" dt="2024-08-08T19:01:18.694" v="4531" actId="164"/>
+          <ac:chgData name="Bilal Mohammad" userId="fd6debca6fc80796" providerId="LiveId" clId="{0364F51A-C767-46A3-907C-27262140D749}" dt="2024-08-12T14:18:05.793" v="6228" actId="14100"/>
           <ac:picMkLst>
             <pc:docMk/>
             <pc:sldMk cId="1069475902" sldId="256"/>
@@ -1027,7 +1099,7 @@
           </ac:picMkLst>
         </pc:picChg>
         <pc:picChg chg="add mod topLvl">
-          <ac:chgData name="Bilal Mohammad" userId="fd6debca6fc80796" providerId="LiveId" clId="{0364F51A-C767-46A3-907C-27262140D749}" dt="2024-08-08T19:01:18.694" v="4531" actId="164"/>
+          <ac:chgData name="Bilal Mohammad" userId="fd6debca6fc80796" providerId="LiveId" clId="{0364F51A-C767-46A3-907C-27262140D749}" dt="2024-08-12T14:18:18.031" v="6230" actId="14100"/>
           <ac:picMkLst>
             <pc:docMk/>
             <pc:sldMk cId="1069475902" sldId="256"/>
@@ -1074,8 +1146,8 @@
             <ac:picMk id="60" creationId="{1C8A425F-7FED-336E-0C99-BCF6B4EF80BA}"/>
           </ac:picMkLst>
         </pc:picChg>
-        <pc:picChg chg="add mod">
-          <ac:chgData name="Bilal Mohammad" userId="fd6debca6fc80796" providerId="LiveId" clId="{0364F51A-C767-46A3-907C-27262140D749}" dt="2024-08-08T19:01:18.694" v="4531" actId="164"/>
+        <pc:picChg chg="add mod modCrop">
+          <ac:chgData name="Bilal Mohammad" userId="fd6debca6fc80796" providerId="LiveId" clId="{0364F51A-C767-46A3-907C-27262140D749}" dt="2024-08-12T14:37:17.213" v="6317" actId="14100"/>
           <ac:picMkLst>
             <pc:docMk/>
             <pc:sldMk cId="1069475902" sldId="256"/>
@@ -1098,8 +1170,8 @@
             <ac:picMk id="64" creationId="{5C65BC36-5437-0FF0-9DA1-AFF5C12DDFD9}"/>
           </ac:picMkLst>
         </pc:picChg>
-        <pc:picChg chg="add mod ord">
-          <ac:chgData name="Bilal Mohammad" userId="fd6debca6fc80796" providerId="LiveId" clId="{0364F51A-C767-46A3-907C-27262140D749}" dt="2024-08-08T19:01:18.694" v="4531" actId="164"/>
+        <pc:picChg chg="add mod ord modCrop">
+          <ac:chgData name="Bilal Mohammad" userId="fd6debca6fc80796" providerId="LiveId" clId="{0364F51A-C767-46A3-907C-27262140D749}" dt="2024-08-12T14:16:17.672" v="6209" actId="14100"/>
           <ac:picMkLst>
             <pc:docMk/>
             <pc:sldMk cId="1069475902" sldId="256"/>
@@ -1162,16 +1234,16 @@
             <ac:picMk id="80" creationId="{AF854EA6-F09F-64EA-F409-6585ABDBECED}"/>
           </ac:picMkLst>
         </pc:picChg>
-        <pc:picChg chg="add mod topLvl">
-          <ac:chgData name="Bilal Mohammad" userId="fd6debca6fc80796" providerId="LiveId" clId="{0364F51A-C767-46A3-907C-27262140D749}" dt="2024-08-08T19:01:18.694" v="4531" actId="164"/>
+        <pc:picChg chg="add mod topLvl modCrop">
+          <ac:chgData name="Bilal Mohammad" userId="fd6debca6fc80796" providerId="LiveId" clId="{0364F51A-C767-46A3-907C-27262140D749}" dt="2024-08-12T14:17:42.027" v="6224" actId="14100"/>
           <ac:picMkLst>
             <pc:docMk/>
             <pc:sldMk cId="1069475902" sldId="256"/>
             <ac:picMk id="81" creationId="{D44B6EB6-17D3-3CDA-39F0-3F7C8F6B431A}"/>
           </ac:picMkLst>
         </pc:picChg>
-        <pc:picChg chg="add mod topLvl">
-          <ac:chgData name="Bilal Mohammad" userId="fd6debca6fc80796" providerId="LiveId" clId="{0364F51A-C767-46A3-907C-27262140D749}" dt="2024-08-08T19:01:18.694" v="4531" actId="164"/>
+        <pc:picChg chg="add mod topLvl modCrop">
+          <ac:chgData name="Bilal Mohammad" userId="fd6debca6fc80796" providerId="LiveId" clId="{0364F51A-C767-46A3-907C-27262140D749}" dt="2024-08-12T14:17:28.105" v="6221" actId="14100"/>
           <ac:picMkLst>
             <pc:docMk/>
             <pc:sldMk cId="1069475902" sldId="256"/>
@@ -1186,8 +1258,8 @@
             <ac:picMk id="84" creationId="{FAE430DF-A57F-E8C6-8681-02BC21EC0C31}"/>
           </ac:picMkLst>
         </pc:picChg>
-        <pc:picChg chg="add mod topLvl">
-          <ac:chgData name="Bilal Mohammad" userId="fd6debca6fc80796" providerId="LiveId" clId="{0364F51A-C767-46A3-907C-27262140D749}" dt="2024-08-08T19:01:18.694" v="4531" actId="164"/>
+        <pc:picChg chg="add mod topLvl modCrop">
+          <ac:chgData name="Bilal Mohammad" userId="fd6debca6fc80796" providerId="LiveId" clId="{0364F51A-C767-46A3-907C-27262140D749}" dt="2024-08-12T14:17:15.505" v="6217" actId="14100"/>
           <ac:picMkLst>
             <pc:docMk/>
             <pc:sldMk cId="1069475902" sldId="256"/>
@@ -1202,8 +1274,8 @@
             <ac:picMk id="89" creationId="{79822809-C356-52FE-9B7A-33CD137BE5B4}"/>
           </ac:picMkLst>
         </pc:picChg>
-        <pc:picChg chg="add mod topLvl">
-          <ac:chgData name="Bilal Mohammad" userId="fd6debca6fc80796" providerId="LiveId" clId="{0364F51A-C767-46A3-907C-27262140D749}" dt="2024-08-08T19:01:18.694" v="4531" actId="164"/>
+        <pc:picChg chg="add mod topLvl modCrop">
+          <ac:chgData name="Bilal Mohammad" userId="fd6debca6fc80796" providerId="LiveId" clId="{0364F51A-C767-46A3-907C-27262140D749}" dt="2024-08-12T14:20:46.969" v="6252" actId="14100"/>
           <ac:picMkLst>
             <pc:docMk/>
             <pc:sldMk cId="1069475902" sldId="256"/>
@@ -1218,16 +1290,16 @@
             <ac:picMk id="93" creationId="{567A86B7-C705-9997-3A06-BF4CF6A6D6ED}"/>
           </ac:picMkLst>
         </pc:picChg>
-        <pc:picChg chg="add mod topLvl">
-          <ac:chgData name="Bilal Mohammad" userId="fd6debca6fc80796" providerId="LiveId" clId="{0364F51A-C767-46A3-907C-27262140D749}" dt="2024-08-08T19:01:18.694" v="4531" actId="164"/>
+        <pc:picChg chg="add mod topLvl modCrop">
+          <ac:chgData name="Bilal Mohammad" userId="fd6debca6fc80796" providerId="LiveId" clId="{0364F51A-C767-46A3-907C-27262140D749}" dt="2024-08-12T14:20:53.592" v="6254" actId="14100"/>
           <ac:picMkLst>
             <pc:docMk/>
             <pc:sldMk cId="1069475902" sldId="256"/>
             <ac:picMk id="95" creationId="{7682D17B-69E5-8B7E-BD58-0D5C000A02F1}"/>
           </ac:picMkLst>
         </pc:picChg>
-        <pc:picChg chg="add mod topLvl">
-          <ac:chgData name="Bilal Mohammad" userId="fd6debca6fc80796" providerId="LiveId" clId="{0364F51A-C767-46A3-907C-27262140D749}" dt="2024-08-08T19:01:18.694" v="4531" actId="164"/>
+        <pc:picChg chg="add mod topLvl modCrop">
+          <ac:chgData name="Bilal Mohammad" userId="fd6debca6fc80796" providerId="LiveId" clId="{0364F51A-C767-46A3-907C-27262140D749}" dt="2024-08-12T14:29:56.413" v="6300" actId="14100"/>
           <ac:picMkLst>
             <pc:docMk/>
             <pc:sldMk cId="1069475902" sldId="256"/>
@@ -1264,7 +1336,7 @@
           <c:x val="9.0310721793201834E-2"/>
           <c:y val="0.12075301911531296"/>
           <c:w val="0.89137883533000606"/>
-          <c:h val="0.70682271754882342"/>
+          <c:h val="0.77194242707181671"/>
         </c:manualLayout>
       </c:layout>
       <c:barChart>
@@ -3052,7 +3124,7 @@
       </dgm:t>
     </dgm:pt>
     <dgm:pt modelId="{E5AE34CC-5E89-4EF7-A560-6C36A4ED9F15}">
-      <dgm:prSet phldrT="[Text]"/>
+      <dgm:prSet phldrT="[Text]" custT="1"/>
       <dgm:spPr>
         <a:ln>
           <a:solidFill>
@@ -3065,15 +3137,15 @@
         <a:lstStyle/>
         <a:p>
           <a:r>
-            <a:rPr lang="en-CA" dirty="0"/>
+            <a:rPr lang="en-CA" sz="1800" dirty="0"/>
             <a:t>Manually port an example case study into </a:t>
           </a:r>
           <a:r>
-            <a:rPr lang="en-CA" dirty="0" err="1"/>
+            <a:rPr lang="en-CA" sz="1800" dirty="0" err="1"/>
             <a:t>mdBook</a:t>
           </a:r>
           <a:r>
-            <a:rPr lang="en-CA" dirty="0"/>
+            <a:rPr lang="en-CA" sz="1800" dirty="0"/>
             <a:t>.</a:t>
           </a:r>
         </a:p>
@@ -3086,12 +3158,12 @@
         <a:bodyPr/>
         <a:lstStyle/>
         <a:p>
-          <a:endParaRPr lang="en-CA"/>
+          <a:endParaRPr lang="en-CA" sz="1800"/>
         </a:p>
       </dgm:t>
     </dgm:pt>
     <dgm:pt modelId="{9A009DF6-DA59-46AF-95FE-49A3846FCAF0}" type="sibTrans" cxnId="{1CEB266B-C957-4EF7-A058-A7E7E9BDF2EC}">
-      <dgm:prSet/>
+      <dgm:prSet custT="1"/>
       <dgm:spPr>
         <a:solidFill>
           <a:srgbClr val="7A003C">
@@ -3110,12 +3182,12 @@
         <a:bodyPr/>
         <a:lstStyle/>
         <a:p>
-          <a:endParaRPr lang="en-CA"/>
+          <a:endParaRPr lang="en-CA" sz="1800"/>
         </a:p>
       </dgm:t>
     </dgm:pt>
     <dgm:pt modelId="{AD5CCA71-92D9-4521-A463-323BABE01F77}">
-      <dgm:prSet phldrT="[Text]"/>
+      <dgm:prSet phldrT="[Text]" custT="1"/>
       <dgm:spPr>
         <a:ln>
           <a:solidFill>
@@ -3128,15 +3200,15 @@
         <a:lstStyle/>
         <a:p>
           <a:r>
-            <a:rPr lang="en-CA" dirty="0"/>
+            <a:rPr lang="en-CA" sz="1800" dirty="0"/>
             <a:t>Create a Markdown definition DSL in </a:t>
           </a:r>
           <a:r>
-            <a:rPr lang="en-CA" dirty="0" err="1"/>
+            <a:rPr lang="en-CA" sz="1800" dirty="0" err="1"/>
             <a:t>Drasil</a:t>
           </a:r>
           <a:r>
-            <a:rPr lang="en-CA" dirty="0"/>
+            <a:rPr lang="en-CA" sz="1800" dirty="0"/>
             <a:t>.</a:t>
           </a:r>
         </a:p>
@@ -3149,12 +3221,12 @@
         <a:bodyPr/>
         <a:lstStyle/>
         <a:p>
-          <a:endParaRPr lang="en-CA"/>
+          <a:endParaRPr lang="en-CA" sz="1800"/>
         </a:p>
       </dgm:t>
     </dgm:pt>
     <dgm:pt modelId="{88F7F43F-85F8-45C2-8E4D-CBFC091B05C3}" type="sibTrans" cxnId="{92A27AED-8DC9-4A69-BDE8-E453F1875312}">
-      <dgm:prSet/>
+      <dgm:prSet custT="1"/>
       <dgm:spPr>
         <a:solidFill>
           <a:srgbClr val="7A003C">
@@ -3173,12 +3245,12 @@
         <a:bodyPr/>
         <a:lstStyle/>
         <a:p>
-          <a:endParaRPr lang="en-CA"/>
+          <a:endParaRPr lang="en-CA" sz="1800"/>
         </a:p>
       </dgm:t>
     </dgm:pt>
     <dgm:pt modelId="{3EBCBA8E-CCC1-4901-9FFE-41DD44914BE0}">
-      <dgm:prSet phldrT="[Text]"/>
+      <dgm:prSet phldrT="[Text]" custT="1"/>
       <dgm:spPr>
         <a:ln>
           <a:solidFill>
@@ -3191,15 +3263,15 @@
         <a:lstStyle/>
         <a:p>
           <a:r>
-            <a:rPr lang="en-CA" dirty="0"/>
+            <a:rPr lang="en-CA" sz="1800" dirty="0"/>
             <a:t>Create an encoding of an </a:t>
           </a:r>
           <a:r>
-            <a:rPr lang="en-CA" dirty="0" err="1"/>
+            <a:rPr lang="en-CA" sz="1800" dirty="0" err="1"/>
             <a:t>mdBook</a:t>
           </a:r>
           <a:r>
-            <a:rPr lang="en-CA" dirty="0"/>
+            <a:rPr lang="en-CA" sz="1800" dirty="0"/>
             <a:t>-based project.</a:t>
           </a:r>
         </a:p>
@@ -3212,12 +3284,12 @@
         <a:bodyPr/>
         <a:lstStyle/>
         <a:p>
-          <a:endParaRPr lang="en-CA"/>
+          <a:endParaRPr lang="en-CA" sz="1800"/>
         </a:p>
       </dgm:t>
     </dgm:pt>
     <dgm:pt modelId="{26880C7F-F3E8-472C-9DAF-998CC26C1E14}" type="sibTrans" cxnId="{37591AEE-EEEE-407A-BC4E-CCE36A294038}">
-      <dgm:prSet/>
+      <dgm:prSet custT="1"/>
       <dgm:spPr>
         <a:solidFill>
           <a:srgbClr val="7A003C">
@@ -3236,12 +3308,12 @@
         <a:bodyPr/>
         <a:lstStyle/>
         <a:p>
-          <a:endParaRPr lang="en-CA" dirty="0"/>
+          <a:endParaRPr lang="en-CA" sz="1800" dirty="0"/>
         </a:p>
       </dgm:t>
     </dgm:pt>
     <dgm:pt modelId="{16CB44F1-9116-457D-B57C-4F981A8BEDAE}">
-      <dgm:prSet phldrT="[Text]"/>
+      <dgm:prSet phldrT="[Text]" custT="1"/>
       <dgm:spPr>
         <a:ln>
           <a:solidFill>
@@ -3254,15 +3326,15 @@
         <a:lstStyle/>
         <a:p>
           <a:r>
-            <a:rPr lang="en-CA" dirty="0"/>
+            <a:rPr lang="en-CA" sz="1800" dirty="0"/>
             <a:t>Create a renderer for the SRS into the </a:t>
           </a:r>
           <a:r>
-            <a:rPr lang="en-CA" dirty="0" err="1"/>
+            <a:rPr lang="en-CA" sz="1800" dirty="0" err="1"/>
             <a:t>mdBook</a:t>
           </a:r>
           <a:r>
-            <a:rPr lang="en-CA" dirty="0"/>
+            <a:rPr lang="en-CA" sz="1800" dirty="0"/>
             <a:t>-based project encoding.</a:t>
           </a:r>
         </a:p>
@@ -3275,7 +3347,7 @@
         <a:bodyPr/>
         <a:lstStyle/>
         <a:p>
-          <a:endParaRPr lang="en-CA"/>
+          <a:endParaRPr lang="en-CA" sz="1800"/>
         </a:p>
       </dgm:t>
     </dgm:pt>
@@ -3286,7 +3358,7 @@
         <a:bodyPr/>
         <a:lstStyle/>
         <a:p>
-          <a:endParaRPr lang="en-CA"/>
+          <a:endParaRPr lang="en-CA" sz="1800"/>
         </a:p>
       </dgm:t>
     </dgm:pt>
@@ -3451,7 +3523,7 @@
       <dsp:spPr>
         <a:xfrm>
           <a:off x="0" y="0"/>
-          <a:ext cx="6210285" cy="679287"/>
+          <a:ext cx="6210285" cy="861503"/>
         </a:xfrm>
         <a:prstGeom prst="roundRect">
           <a:avLst>
@@ -3490,12 +3562,12 @@
         </a:fontRef>
       </dsp:style>
       <dsp:txBody>
-        <a:bodyPr spcFirstLastPara="0" vert="horz" wrap="square" lIns="64770" tIns="64770" rIns="64770" bIns="64770" numCol="1" spcCol="1270" anchor="ctr" anchorCtr="0">
+        <a:bodyPr spcFirstLastPara="0" vert="horz" wrap="square" lIns="68580" tIns="68580" rIns="68580" bIns="68580" numCol="1" spcCol="1270" anchor="ctr" anchorCtr="0">
           <a:noAutofit/>
         </a:bodyPr>
         <a:lstStyle/>
         <a:p>
-          <a:pPr marL="0" lvl="0" indent="0" algn="l" defTabSz="755650">
+          <a:pPr marL="0" lvl="0" indent="0" algn="l" defTabSz="800100">
             <a:lnSpc>
               <a:spcPct val="90000"/>
             </a:lnSpc>
@@ -3508,22 +3580,22 @@
             <a:buNone/>
           </a:pPr>
           <a:r>
-            <a:rPr lang="en-CA" sz="1700" kern="1200" dirty="0"/>
+            <a:rPr lang="en-CA" sz="1800" kern="1200" dirty="0"/>
             <a:t>Manually port an example case study into </a:t>
           </a:r>
           <a:r>
-            <a:rPr lang="en-CA" sz="1700" kern="1200" dirty="0" err="1"/>
+            <a:rPr lang="en-CA" sz="1800" kern="1200" dirty="0" err="1"/>
             <a:t>mdBook</a:t>
           </a:r>
           <a:r>
-            <a:rPr lang="en-CA" sz="1700" kern="1200" dirty="0"/>
+            <a:rPr lang="en-CA" sz="1800" kern="1200" dirty="0"/>
             <a:t>.</a:t>
           </a:r>
         </a:p>
       </dsp:txBody>
       <dsp:txXfrm>
-        <a:off x="19896" y="19896"/>
-        <a:ext cx="5419881" cy="639495"/>
+        <a:off x="25233" y="25233"/>
+        <a:ext cx="5207858" cy="811037"/>
       </dsp:txXfrm>
     </dsp:sp>
     <dsp:sp modelId="{DAB2764D-F42E-41DC-98DD-6D2048E99900}">
@@ -3533,8 +3605,8 @@
       </dsp:nvSpPr>
       <dsp:spPr>
         <a:xfrm>
-          <a:off x="520111" y="802794"/>
-          <a:ext cx="6210285" cy="679287"/>
+          <a:off x="520111" y="1018140"/>
+          <a:ext cx="6210285" cy="861503"/>
         </a:xfrm>
         <a:prstGeom prst="roundRect">
           <a:avLst>
@@ -3573,12 +3645,12 @@
         </a:fontRef>
       </dsp:style>
       <dsp:txBody>
-        <a:bodyPr spcFirstLastPara="0" vert="horz" wrap="square" lIns="64770" tIns="64770" rIns="64770" bIns="64770" numCol="1" spcCol="1270" anchor="ctr" anchorCtr="0">
+        <a:bodyPr spcFirstLastPara="0" vert="horz" wrap="square" lIns="68580" tIns="68580" rIns="68580" bIns="68580" numCol="1" spcCol="1270" anchor="ctr" anchorCtr="0">
           <a:noAutofit/>
         </a:bodyPr>
         <a:lstStyle/>
         <a:p>
-          <a:pPr marL="0" lvl="0" indent="0" algn="l" defTabSz="755650">
+          <a:pPr marL="0" lvl="0" indent="0" algn="l" defTabSz="800100">
             <a:lnSpc>
               <a:spcPct val="90000"/>
             </a:lnSpc>
@@ -3591,22 +3663,22 @@
             <a:buNone/>
           </a:pPr>
           <a:r>
-            <a:rPr lang="en-CA" sz="1700" kern="1200" dirty="0"/>
+            <a:rPr lang="en-CA" sz="1800" kern="1200" dirty="0"/>
             <a:t>Create a Markdown definition DSL in </a:t>
           </a:r>
           <a:r>
-            <a:rPr lang="en-CA" sz="1700" kern="1200" dirty="0" err="1"/>
+            <a:rPr lang="en-CA" sz="1800" kern="1200" dirty="0" err="1"/>
             <a:t>Drasil</a:t>
           </a:r>
           <a:r>
-            <a:rPr lang="en-CA" sz="1700" kern="1200" dirty="0"/>
+            <a:rPr lang="en-CA" sz="1800" kern="1200" dirty="0"/>
             <a:t>.</a:t>
           </a:r>
         </a:p>
       </dsp:txBody>
       <dsp:txXfrm>
-        <a:off x="540007" y="822690"/>
-        <a:ext cx="5208845" cy="639495"/>
+        <a:off x="545344" y="1043373"/>
+        <a:ext cx="5079730" cy="811037"/>
       </dsp:txXfrm>
     </dsp:sp>
     <dsp:sp modelId="{F545513F-43AB-45A5-A865-60AF748FFBE0}">
@@ -3616,8 +3688,8 @@
       </dsp:nvSpPr>
       <dsp:spPr>
         <a:xfrm>
-          <a:off x="1032459" y="1605588"/>
-          <a:ext cx="6210285" cy="679287"/>
+          <a:off x="1032459" y="2036281"/>
+          <a:ext cx="6210285" cy="861503"/>
         </a:xfrm>
         <a:prstGeom prst="roundRect">
           <a:avLst>
@@ -3656,12 +3728,12 @@
         </a:fontRef>
       </dsp:style>
       <dsp:txBody>
-        <a:bodyPr spcFirstLastPara="0" vert="horz" wrap="square" lIns="64770" tIns="64770" rIns="64770" bIns="64770" numCol="1" spcCol="1270" anchor="ctr" anchorCtr="0">
+        <a:bodyPr spcFirstLastPara="0" vert="horz" wrap="square" lIns="68580" tIns="68580" rIns="68580" bIns="68580" numCol="1" spcCol="1270" anchor="ctr" anchorCtr="0">
           <a:noAutofit/>
         </a:bodyPr>
         <a:lstStyle/>
         <a:p>
-          <a:pPr marL="0" lvl="0" indent="0" algn="l" defTabSz="755650">
+          <a:pPr marL="0" lvl="0" indent="0" algn="l" defTabSz="800100">
             <a:lnSpc>
               <a:spcPct val="90000"/>
             </a:lnSpc>
@@ -3674,22 +3746,22 @@
             <a:buNone/>
           </a:pPr>
           <a:r>
-            <a:rPr lang="en-CA" sz="1700" kern="1200" dirty="0"/>
+            <a:rPr lang="en-CA" sz="1800" kern="1200" dirty="0"/>
             <a:t>Create an encoding of an </a:t>
           </a:r>
           <a:r>
-            <a:rPr lang="en-CA" sz="1700" kern="1200" dirty="0" err="1"/>
+            <a:rPr lang="en-CA" sz="1800" kern="1200" dirty="0" err="1"/>
             <a:t>mdBook</a:t>
           </a:r>
           <a:r>
-            <a:rPr lang="en-CA" sz="1700" kern="1200" dirty="0"/>
+            <a:rPr lang="en-CA" sz="1800" kern="1200" dirty="0"/>
             <a:t>-based project.</a:t>
           </a:r>
         </a:p>
       </dsp:txBody>
       <dsp:txXfrm>
-        <a:off x="1052355" y="1625484"/>
-        <a:ext cx="5216608" cy="639495"/>
+        <a:off x="1057692" y="2061514"/>
+        <a:ext cx="5087493" cy="811037"/>
       </dsp:txXfrm>
     </dsp:sp>
     <dsp:sp modelId="{CC3F037C-8734-4B49-94FD-5A56E8C8854F}">
@@ -3699,8 +3771,8 @@
       </dsp:nvSpPr>
       <dsp:spPr>
         <a:xfrm>
-          <a:off x="1552571" y="2408382"/>
-          <a:ext cx="6210285" cy="679287"/>
+          <a:off x="1552571" y="3054421"/>
+          <a:ext cx="6210285" cy="861503"/>
         </a:xfrm>
         <a:prstGeom prst="roundRect">
           <a:avLst>
@@ -3739,12 +3811,12 @@
         </a:fontRef>
       </dsp:style>
       <dsp:txBody>
-        <a:bodyPr spcFirstLastPara="0" vert="horz" wrap="square" lIns="64770" tIns="64770" rIns="64770" bIns="64770" numCol="1" spcCol="1270" anchor="ctr" anchorCtr="0">
+        <a:bodyPr spcFirstLastPara="0" vert="horz" wrap="square" lIns="68580" tIns="68580" rIns="68580" bIns="68580" numCol="1" spcCol="1270" anchor="ctr" anchorCtr="0">
           <a:noAutofit/>
         </a:bodyPr>
         <a:lstStyle/>
         <a:p>
-          <a:pPr marL="0" lvl="0" indent="0" algn="l" defTabSz="755650">
+          <a:pPr marL="0" lvl="0" indent="0" algn="l" defTabSz="800100">
             <a:lnSpc>
               <a:spcPct val="90000"/>
             </a:lnSpc>
@@ -3757,22 +3829,22 @@
             <a:buNone/>
           </a:pPr>
           <a:r>
-            <a:rPr lang="en-CA" sz="1700" kern="1200" dirty="0"/>
+            <a:rPr lang="en-CA" sz="1800" kern="1200" dirty="0"/>
             <a:t>Create a renderer for the SRS into the </a:t>
           </a:r>
           <a:r>
-            <a:rPr lang="en-CA" sz="1700" kern="1200" dirty="0" err="1"/>
+            <a:rPr lang="en-CA" sz="1800" kern="1200" dirty="0" err="1"/>
             <a:t>mdBook</a:t>
           </a:r>
           <a:r>
-            <a:rPr lang="en-CA" sz="1700" kern="1200" dirty="0"/>
+            <a:rPr lang="en-CA" sz="1800" kern="1200" dirty="0"/>
             <a:t>-based project encoding.</a:t>
           </a:r>
         </a:p>
       </dsp:txBody>
       <dsp:txXfrm>
-        <a:off x="1572467" y="2428278"/>
-        <a:ext cx="5208845" cy="639495"/>
+        <a:off x="1577804" y="3079654"/>
+        <a:ext cx="5079730" cy="811037"/>
       </dsp:txXfrm>
     </dsp:sp>
     <dsp:sp modelId="{8025B994-FDAC-4637-9E23-56244BE42A49}">
@@ -3782,8 +3854,8 @@
       </dsp:nvSpPr>
       <dsp:spPr>
         <a:xfrm>
-          <a:off x="5768748" y="520272"/>
-          <a:ext cx="441536" cy="441536"/>
+          <a:off x="5650308" y="659833"/>
+          <a:ext cx="559977" cy="559977"/>
         </a:xfrm>
         <a:prstGeom prst="downArrow">
           <a:avLst>
@@ -3820,12 +3892,12 @@
         <a:fontRef idx="minor"/>
       </dsp:style>
       <dsp:txBody>
-        <a:bodyPr spcFirstLastPara="0" vert="horz" wrap="square" lIns="25400" tIns="25400" rIns="25400" bIns="25400" numCol="1" spcCol="1270" anchor="ctr" anchorCtr="0">
+        <a:bodyPr spcFirstLastPara="0" vert="horz" wrap="square" lIns="22860" tIns="22860" rIns="22860" bIns="22860" numCol="1" spcCol="1270" anchor="ctr" anchorCtr="0">
           <a:noAutofit/>
         </a:bodyPr>
         <a:lstStyle/>
         <a:p>
-          <a:pPr marL="0" lvl="0" indent="0" algn="ctr" defTabSz="889000">
+          <a:pPr marL="0" lvl="0" indent="0" algn="ctr" defTabSz="800100">
             <a:lnSpc>
               <a:spcPct val="90000"/>
             </a:lnSpc>
@@ -3837,12 +3909,12 @@
             </a:spcAft>
             <a:buNone/>
           </a:pPr>
-          <a:endParaRPr lang="en-CA" sz="2000" kern="1200"/>
+          <a:endParaRPr lang="en-CA" sz="1800" kern="1200"/>
         </a:p>
       </dsp:txBody>
       <dsp:txXfrm>
-        <a:off x="5868094" y="520272"/>
-        <a:ext cx="242844" cy="332256"/>
+        <a:off x="5776303" y="659833"/>
+        <a:ext cx="307987" cy="421383"/>
       </dsp:txXfrm>
     </dsp:sp>
     <dsp:sp modelId="{0CE7545F-2410-4543-818F-2B24A237D1D5}">
@@ -3852,8 +3924,8 @@
       </dsp:nvSpPr>
       <dsp:spPr>
         <a:xfrm>
-          <a:off x="6288860" y="1323066"/>
-          <a:ext cx="441536" cy="441536"/>
+          <a:off x="6170419" y="1677973"/>
+          <a:ext cx="559977" cy="559977"/>
         </a:xfrm>
         <a:prstGeom prst="downArrow">
           <a:avLst>
@@ -3890,12 +3962,12 @@
         <a:fontRef idx="minor"/>
       </dsp:style>
       <dsp:txBody>
-        <a:bodyPr spcFirstLastPara="0" vert="horz" wrap="square" lIns="25400" tIns="25400" rIns="25400" bIns="25400" numCol="1" spcCol="1270" anchor="ctr" anchorCtr="0">
+        <a:bodyPr spcFirstLastPara="0" vert="horz" wrap="square" lIns="22860" tIns="22860" rIns="22860" bIns="22860" numCol="1" spcCol="1270" anchor="ctr" anchorCtr="0">
           <a:noAutofit/>
         </a:bodyPr>
         <a:lstStyle/>
         <a:p>
-          <a:pPr marL="0" lvl="0" indent="0" algn="ctr" defTabSz="889000">
+          <a:pPr marL="0" lvl="0" indent="0" algn="ctr" defTabSz="800100">
             <a:lnSpc>
               <a:spcPct val="90000"/>
             </a:lnSpc>
@@ -3907,12 +3979,12 @@
             </a:spcAft>
             <a:buNone/>
           </a:pPr>
-          <a:endParaRPr lang="en-CA" sz="2000" kern="1200"/>
+          <a:endParaRPr lang="en-CA" sz="1800" kern="1200"/>
         </a:p>
       </dsp:txBody>
       <dsp:txXfrm>
-        <a:off x="6388206" y="1323066"/>
-        <a:ext cx="242844" cy="332256"/>
+        <a:off x="6296414" y="1677973"/>
+        <a:ext cx="307987" cy="421383"/>
       </dsp:txXfrm>
     </dsp:sp>
     <dsp:sp modelId="{574E8D73-9C55-4BF0-B6A5-6E83F3C9068C}">
@@ -3922,8 +3994,8 @@
       </dsp:nvSpPr>
       <dsp:spPr>
         <a:xfrm>
-          <a:off x="6801208" y="2125860"/>
-          <a:ext cx="441536" cy="441536"/>
+          <a:off x="6682768" y="2696114"/>
+          <a:ext cx="559977" cy="559977"/>
         </a:xfrm>
         <a:prstGeom prst="downArrow">
           <a:avLst>
@@ -3960,12 +4032,12 @@
         <a:fontRef idx="minor"/>
       </dsp:style>
       <dsp:txBody>
-        <a:bodyPr spcFirstLastPara="0" vert="horz" wrap="square" lIns="25400" tIns="25400" rIns="25400" bIns="25400" numCol="1" spcCol="1270" anchor="ctr" anchorCtr="0">
+        <a:bodyPr spcFirstLastPara="0" vert="horz" wrap="square" lIns="22860" tIns="22860" rIns="22860" bIns="22860" numCol="1" spcCol="1270" anchor="ctr" anchorCtr="0">
           <a:noAutofit/>
         </a:bodyPr>
         <a:lstStyle/>
         <a:p>
-          <a:pPr marL="0" lvl="0" indent="0" algn="ctr" defTabSz="889000">
+          <a:pPr marL="0" lvl="0" indent="0" algn="ctr" defTabSz="800100">
             <a:lnSpc>
               <a:spcPct val="90000"/>
             </a:lnSpc>
@@ -3977,12 +4049,12 @@
             </a:spcAft>
             <a:buNone/>
           </a:pPr>
-          <a:endParaRPr lang="en-CA" sz="2000" kern="1200" dirty="0"/>
+          <a:endParaRPr lang="en-CA" sz="1800" kern="1200" dirty="0"/>
         </a:p>
       </dsp:txBody>
       <dsp:txXfrm>
-        <a:off x="6900554" y="2125860"/>
-        <a:ext cx="242844" cy="332256"/>
+        <a:off x="6808763" y="2696114"/>
+        <a:ext cx="307987" cy="421383"/>
       </dsp:txXfrm>
     </dsp:sp>
   </dsp:spTree>
@@ -6509,7 +6581,7 @@
           <a:p>
             <a:fld id="{3A24CFE0-DC6F-4009-8160-9F80C8F0B444}" type="datetimeFigureOut">
               <a:rPr lang="en-CA" smtClean="0"/>
-              <a:t>2024-08-09</a:t>
+              <a:t>2024-08-12</a:t>
             </a:fld>
             <a:endParaRPr lang="en-CA"/>
           </a:p>
@@ -6992,7 +7064,7 @@
           <a:p>
             <a:fld id="{861E132A-DEB2-4D7F-AB88-2444701CC7A8}" type="datetimeFigureOut">
               <a:rPr lang="en-CA" smtClean="0"/>
-              <a:t>2024-08-09</a:t>
+              <a:t>2024-08-12</a:t>
             </a:fld>
             <a:endParaRPr lang="en-CA"/>
           </a:p>
@@ -7162,7 +7234,7 @@
           <a:p>
             <a:fld id="{861E132A-DEB2-4D7F-AB88-2444701CC7A8}" type="datetimeFigureOut">
               <a:rPr lang="en-CA" smtClean="0"/>
-              <a:t>2024-08-09</a:t>
+              <a:t>2024-08-12</a:t>
             </a:fld>
             <a:endParaRPr lang="en-CA"/>
           </a:p>
@@ -7342,7 +7414,7 @@
           <a:p>
             <a:fld id="{861E132A-DEB2-4D7F-AB88-2444701CC7A8}" type="datetimeFigureOut">
               <a:rPr lang="en-CA" smtClean="0"/>
-              <a:t>2024-08-09</a:t>
+              <a:t>2024-08-12</a:t>
             </a:fld>
             <a:endParaRPr lang="en-CA"/>
           </a:p>
@@ -7512,7 +7584,7 @@
           <a:p>
             <a:fld id="{861E132A-DEB2-4D7F-AB88-2444701CC7A8}" type="datetimeFigureOut">
               <a:rPr lang="en-CA" smtClean="0"/>
-              <a:t>2024-08-09</a:t>
+              <a:t>2024-08-12</a:t>
             </a:fld>
             <a:endParaRPr lang="en-CA"/>
           </a:p>
@@ -7758,7 +7830,7 @@
           <a:p>
             <a:fld id="{861E132A-DEB2-4D7F-AB88-2444701CC7A8}" type="datetimeFigureOut">
               <a:rPr lang="en-CA" smtClean="0"/>
-              <a:t>2024-08-09</a:t>
+              <a:t>2024-08-12</a:t>
             </a:fld>
             <a:endParaRPr lang="en-CA"/>
           </a:p>
@@ -7990,7 +8062,7 @@
           <a:p>
             <a:fld id="{861E132A-DEB2-4D7F-AB88-2444701CC7A8}" type="datetimeFigureOut">
               <a:rPr lang="en-CA" smtClean="0"/>
-              <a:t>2024-08-09</a:t>
+              <a:t>2024-08-12</a:t>
             </a:fld>
             <a:endParaRPr lang="en-CA"/>
           </a:p>
@@ -8357,7 +8429,7 @@
           <a:p>
             <a:fld id="{861E132A-DEB2-4D7F-AB88-2444701CC7A8}" type="datetimeFigureOut">
               <a:rPr lang="en-CA" smtClean="0"/>
-              <a:t>2024-08-09</a:t>
+              <a:t>2024-08-12</a:t>
             </a:fld>
             <a:endParaRPr lang="en-CA"/>
           </a:p>
@@ -8475,7 +8547,7 @@
           <a:p>
             <a:fld id="{861E132A-DEB2-4D7F-AB88-2444701CC7A8}" type="datetimeFigureOut">
               <a:rPr lang="en-CA" smtClean="0"/>
-              <a:t>2024-08-09</a:t>
+              <a:t>2024-08-12</a:t>
             </a:fld>
             <a:endParaRPr lang="en-CA"/>
           </a:p>
@@ -8570,7 +8642,7 @@
           <a:p>
             <a:fld id="{861E132A-DEB2-4D7F-AB88-2444701CC7A8}" type="datetimeFigureOut">
               <a:rPr lang="en-CA" smtClean="0"/>
-              <a:t>2024-08-09</a:t>
+              <a:t>2024-08-12</a:t>
             </a:fld>
             <a:endParaRPr lang="en-CA"/>
           </a:p>
@@ -8847,7 +8919,7 @@
           <a:p>
             <a:fld id="{861E132A-DEB2-4D7F-AB88-2444701CC7A8}" type="datetimeFigureOut">
               <a:rPr lang="en-CA" smtClean="0"/>
-              <a:t>2024-08-09</a:t>
+              <a:t>2024-08-12</a:t>
             </a:fld>
             <a:endParaRPr lang="en-CA"/>
           </a:p>
@@ -9104,7 +9176,7 @@
           <a:p>
             <a:fld id="{861E132A-DEB2-4D7F-AB88-2444701CC7A8}" type="datetimeFigureOut">
               <a:rPr lang="en-CA" smtClean="0"/>
-              <a:t>2024-08-09</a:t>
+              <a:t>2024-08-12</a:t>
             </a:fld>
             <a:endParaRPr lang="en-CA"/>
           </a:p>
@@ -9317,7 +9389,7 @@
           <a:p>
             <a:fld id="{861E132A-DEB2-4D7F-AB88-2444701CC7A8}" type="datetimeFigureOut">
               <a:rPr lang="en-CA" smtClean="0"/>
-              <a:t>2024-08-09</a:t>
+              <a:t>2024-08-12</a:t>
             </a:fld>
             <a:endParaRPr lang="en-CA"/>
           </a:p>
@@ -9866,9 +9938,9 @@
         <p:grpSpPr>
           <a:xfrm>
             <a:off x="873142" y="3775051"/>
-            <a:ext cx="7762858" cy="7198827"/>
+            <a:ext cx="7762858" cy="4247089"/>
             <a:chOff x="873142" y="3775051"/>
-            <a:chExt cx="7762858" cy="7198827"/>
+            <a:chExt cx="7762858" cy="4247089"/>
           </a:xfrm>
         </p:grpSpPr>
         <p:sp>
@@ -9885,8 +9957,8 @@
           </p:nvSpPr>
           <p:spPr>
             <a:xfrm>
-              <a:off x="873142" y="4510570"/>
-              <a:ext cx="7762857" cy="6463308"/>
+              <a:off x="873142" y="4605820"/>
+              <a:ext cx="7762857" cy="3416320"/>
             </a:xfrm>
             <a:prstGeom prst="rect">
               <a:avLst/>
@@ -9907,104 +9979,77 @@
                   <a:ea typeface="Verdana" panose="020B0604030504040204" pitchFamily="34" charset="0"/>
                   <a:cs typeface="Arial" panose="020B0604020202020204" pitchFamily="34" charset="0"/>
                 </a:rPr>
-                <a:t>Problem:</a:t>
-              </a:r>
-              <a:endParaRPr lang="en-CA" sz="1800" b="1" dirty="0">
-                <a:ea typeface="Verdana" panose="020B0604030504040204" pitchFamily="34" charset="0"/>
-                <a:cs typeface="Arial" panose="020B0604020202020204" pitchFamily="34" charset="0"/>
-              </a:endParaRPr>
-            </a:p>
-            <a:p>
-              <a:pPr marL="342900" indent="-342900">
-                <a:buFont typeface="Arial" panose="020B0604020202020204" pitchFamily="34" charset="0"/>
-                <a:buChar char="•"/>
-              </a:pPr>
-              <a:r>
-                <a:rPr lang="en-US" sz="1800" b="1" dirty="0">
-                  <a:ea typeface="Verdana" panose="020B0604030504040204" pitchFamily="34" charset="0"/>
-                  <a:cs typeface="Arial" panose="020B0604020202020204" pitchFamily="34" charset="0"/>
-                </a:rPr>
-                <a:t>Considerable Duplication: </a:t>
+                <a:t>Objective: </a:t>
               </a:r>
               <a:r>
                 <a:rPr lang="en-US" sz="1800" dirty="0">
                   <a:ea typeface="Verdana" panose="020B0604030504040204" pitchFamily="34" charset="0"/>
                   <a:cs typeface="Arial" panose="020B0604020202020204" pitchFamily="34" charset="0"/>
                 </a:rPr>
-                <a:t>Handwritten software artifacts often contain repeated information. </a:t>
+                <a:t>Generate </a:t>
               </a:r>
-              <a:r>
-                <a:rPr lang="en-US" sz="1800" baseline="30000" dirty="0">
-                  <a:ea typeface="Verdana" panose="020B0604030504040204" pitchFamily="34" charset="0"/>
-                  <a:cs typeface="Arial" panose="020B0604020202020204" pitchFamily="34" charset="0"/>
-                </a:rPr>
-                <a:t>[1]</a:t>
-              </a:r>
-            </a:p>
-            <a:p>
-              <a:pPr marL="342900" indent="-342900">
-                <a:buFont typeface="Arial" panose="020B0604020202020204" pitchFamily="34" charset="0"/>
-                <a:buChar char="•"/>
-              </a:pPr>
               <a:r>
                 <a:rPr lang="en-US" sz="1800" b="1" dirty="0">
                   <a:ea typeface="Verdana" panose="020B0604030504040204" pitchFamily="34" charset="0"/>
                   <a:cs typeface="Arial" panose="020B0604020202020204" pitchFamily="34" charset="0"/>
                 </a:rPr>
-                <a:t>Lack of traceability: </a:t>
+                <a:t>Software Requirements Specification </a:t>
               </a:r>
               <a:r>
                 <a:rPr lang="en-US" sz="1800" dirty="0">
                   <a:ea typeface="Verdana" panose="020B0604030504040204" pitchFamily="34" charset="0"/>
                   <a:cs typeface="Arial" panose="020B0604020202020204" pitchFamily="34" charset="0"/>
                 </a:rPr>
-                <a:t>It is challenging to track the origins and dependencies of various software components. </a:t>
+                <a:t>(SRS) in </a:t>
               </a:r>
               <a:r>
-                <a:rPr lang="en-US" sz="1800" baseline="30000" dirty="0">
+                <a:rPr lang="en-US" sz="1800" b="1" dirty="0" err="1">
                   <a:ea typeface="Verdana" panose="020B0604030504040204" pitchFamily="34" charset="0"/>
                   <a:cs typeface="Arial" panose="020B0604020202020204" pitchFamily="34" charset="0"/>
                 </a:rPr>
-                <a:t>[2]</a:t>
-              </a:r>
-              <a:endParaRPr lang="en-US" sz="1800" dirty="0">
-                <a:ea typeface="Verdana" panose="020B0604030504040204" pitchFamily="34" charset="0"/>
-                <a:cs typeface="Arial" panose="020B0604020202020204" pitchFamily="34" charset="0"/>
-              </a:endParaRPr>
-            </a:p>
-            <a:p>
-              <a:pPr marL="342900" indent="-342900">
-                <a:buFont typeface="Arial" panose="020B0604020202020204" pitchFamily="34" charset="0"/>
-                <a:buChar char="•"/>
-              </a:pPr>
-              <a:r>
-                <a:rPr lang="en-US" sz="1800" b="1" dirty="0">
-                  <a:ea typeface="Verdana" panose="020B0604030504040204" pitchFamily="34" charset="0"/>
-                  <a:cs typeface="Arial" panose="020B0604020202020204" pitchFamily="34" charset="0"/>
-                </a:rPr>
-                <a:t>Lack of maintainability: </a:t>
+                <a:t>mdBook</a:t>
               </a:r>
               <a:r>
                 <a:rPr lang="en-US" sz="1800" dirty="0">
                   <a:ea typeface="Verdana" panose="020B0604030504040204" pitchFamily="34" charset="0"/>
                   <a:cs typeface="Arial" panose="020B0604020202020204" pitchFamily="34" charset="0"/>
                 </a:rPr>
-                <a:t>Maintaining and updating handwritten software is cumbersome and time-consuming. </a:t>
+                <a:t> format from codified knowledge within </a:t>
               </a:r>
               <a:r>
-                <a:rPr lang="en-US" sz="1800" baseline="30000" dirty="0">
+                <a:rPr lang="en-US" sz="1800" b="1" dirty="0" err="1">
                   <a:ea typeface="Verdana" panose="020B0604030504040204" pitchFamily="34" charset="0"/>
                   <a:cs typeface="Arial" panose="020B0604020202020204" pitchFamily="34" charset="0"/>
                 </a:rPr>
-                <a:t>[2]</a:t>
+                <a:t>Drasil</a:t>
               </a:r>
-              <a:endParaRPr lang="en-US" sz="1800" dirty="0">
-                <a:ea typeface="Verdana" panose="020B0604030504040204" pitchFamily="34" charset="0"/>
-                <a:cs typeface="Arial" panose="020B0604020202020204" pitchFamily="34" charset="0"/>
-              </a:endParaRPr>
+              <a:r>
+                <a:rPr lang="en-US" sz="1800" dirty="0">
+                  <a:ea typeface="Verdana" panose="020B0604030504040204" pitchFamily="34" charset="0"/>
+                  <a:cs typeface="Arial" panose="020B0604020202020204" pitchFamily="34" charset="0"/>
+                </a:rPr>
+                <a:t>, a </a:t>
+              </a:r>
+              <a:r>
+                <a:rPr lang="en-US" sz="1800" b="1" dirty="0">
+                  <a:ea typeface="Verdana" panose="020B0604030504040204" pitchFamily="34" charset="0"/>
+                  <a:cs typeface="Arial" panose="020B0604020202020204" pitchFamily="34" charset="0"/>
+                </a:rPr>
+                <a:t>generative programming</a:t>
+              </a:r>
+              <a:r>
+                <a:rPr lang="en-US" sz="1800" dirty="0">
+                  <a:ea typeface="Verdana" panose="020B0604030504040204" pitchFamily="34" charset="0"/>
+                  <a:cs typeface="Arial" panose="020B0604020202020204" pitchFamily="34" charset="0"/>
+                </a:rPr>
+                <a:t> framework.</a:t>
+              </a:r>
             </a:p>
             <a:p>
-              <a:endParaRPr lang="en-US" sz="1800" dirty="0">
+              <a:endParaRPr lang="en-CA" sz="1800" b="1" dirty="0">
+                <a:solidFill>
+                  <a:srgbClr val="7A003C"/>
+                </a:solidFill>
                 <a:ea typeface="Verdana" panose="020B0604030504040204" pitchFamily="34" charset="0"/>
                 <a:cs typeface="Arial" panose="020B0604020202020204" pitchFamily="34" charset="0"/>
               </a:endParaRPr>
@@ -10018,79 +10063,69 @@
                   <a:ea typeface="Verdana" panose="020B0604030504040204" pitchFamily="34" charset="0"/>
                   <a:cs typeface="Arial" panose="020B0604020202020204" pitchFamily="34" charset="0"/>
                 </a:rPr>
-                <a:t>Solution:</a:t>
+                <a:t>What is </a:t>
               </a:r>
-              <a:endParaRPr lang="en-CA" sz="1800" b="1" dirty="0">
-                <a:ea typeface="Verdana" panose="020B0604030504040204" pitchFamily="34" charset="0"/>
-                <a:cs typeface="Arial" panose="020B0604020202020204" pitchFamily="34" charset="0"/>
-              </a:endParaRPr>
-            </a:p>
-            <a:p>
-              <a:pPr marL="342900" indent="-342900">
-                <a:buFont typeface="Arial" panose="020B0604020202020204" pitchFamily="34" charset="0"/>
-                <a:buChar char="•"/>
-              </a:pPr>
               <a:r>
-                <a:rPr lang="en-US" sz="1800" b="1" dirty="0" err="1">
+                <a:rPr lang="en-CA" sz="1800" b="1" dirty="0" err="1">
+                  <a:solidFill>
+                    <a:srgbClr val="7A003C"/>
+                  </a:solidFill>
                   <a:ea typeface="Verdana" panose="020B0604030504040204" pitchFamily="34" charset="0"/>
                   <a:cs typeface="Arial" panose="020B0604020202020204" pitchFamily="34" charset="0"/>
                 </a:rPr>
-                <a:t>Drasil</a:t>
+                <a:t>mdBook</a:t>
+              </a:r>
+              <a:r>
+                <a:rPr lang="en-CA" sz="1800" b="1" dirty="0">
+                  <a:solidFill>
+                    <a:srgbClr val="7A003C"/>
+                  </a:solidFill>
+                  <a:ea typeface="Verdana" panose="020B0604030504040204" pitchFamily="34" charset="0"/>
+                  <a:cs typeface="Arial" panose="020B0604020202020204" pitchFamily="34" charset="0"/>
+                </a:rPr>
+                <a:t>? </a:t>
+              </a:r>
+              <a:r>
+                <a:rPr lang="en-US" sz="1800" dirty="0">
+                  <a:ea typeface="Verdana" panose="020B0604030504040204" pitchFamily="34" charset="0"/>
+                  <a:cs typeface="Arial" panose="020B0604020202020204" pitchFamily="34" charset="0"/>
+                </a:rPr>
+                <a:t>A command line tool for creating books in </a:t>
               </a:r>
               <a:r>
                 <a:rPr lang="en-US" sz="1800" b="1" dirty="0">
                   <a:ea typeface="Verdana" panose="020B0604030504040204" pitchFamily="34" charset="0"/>
                   <a:cs typeface="Arial" panose="020B0604020202020204" pitchFamily="34" charset="0"/>
                 </a:rPr>
-                <a:t>:</a:t>
+                <a:t>Markdown</a:t>
               </a:r>
               <a:r>
                 <a:rPr lang="en-US" sz="1800" dirty="0">
                   <a:ea typeface="Verdana" panose="020B0604030504040204" pitchFamily="34" charset="0"/>
                   <a:cs typeface="Arial" panose="020B0604020202020204" pitchFamily="34" charset="0"/>
                 </a:rPr>
-                <a:t> a software framework written in </a:t>
+                <a:t>, converting content into styled </a:t>
               </a:r>
               <a:r>
                 <a:rPr lang="en-US" sz="1800" b="1" dirty="0">
                   <a:ea typeface="Verdana" panose="020B0604030504040204" pitchFamily="34" charset="0"/>
                   <a:cs typeface="Arial" panose="020B0604020202020204" pitchFamily="34" charset="0"/>
                 </a:rPr>
-                <a:t>Haskell</a:t>
+                <a:t>HTML</a:t>
               </a:r>
               <a:r>
                 <a:rPr lang="en-US" sz="1800" dirty="0">
                   <a:ea typeface="Verdana" panose="020B0604030504040204" pitchFamily="34" charset="0"/>
                   <a:cs typeface="Arial" panose="020B0604020202020204" pitchFamily="34" charset="0"/>
                 </a:rPr>
-                <a:t> that generates all software artifacts (requirements, design, code, tests, build scripts, documentation, etc.) based on a single specification in a domain-specific language (DSL). </a:t>
+                <a:t>. </a:t>
               </a:r>
               <a:r>
                 <a:rPr lang="en-US" sz="1800" baseline="30000" dirty="0">
                   <a:ea typeface="Verdana" panose="020B0604030504040204" pitchFamily="34" charset="0"/>
                   <a:cs typeface="Arial" panose="020B0604020202020204" pitchFamily="34" charset="0"/>
                 </a:rPr>
-                <a:t>[2]</a:t>
-              </a:r>
-            </a:p>
-            <a:p>
-              <a:pPr marL="342900" indent="-342900">
-                <a:buFont typeface="Arial" panose="020B0604020202020204" pitchFamily="34" charset="0"/>
-                <a:buChar char="•"/>
-              </a:pPr>
-              <a:r>
-                <a:rPr lang="en-US" sz="1800" dirty="0">
-                  <a:ea typeface="Verdana" panose="020B0604030504040204" pitchFamily="34" charset="0"/>
-                  <a:cs typeface="Arial" panose="020B0604020202020204" pitchFamily="34" charset="0"/>
-                </a:rPr>
-                <a:t>Accomplishes two primary objectives: complete traceability and elimination of knowledge duplication. </a:t>
-              </a:r>
-              <a:r>
-                <a:rPr lang="en-US" sz="1800" baseline="30000" dirty="0">
-                  <a:ea typeface="Verdana" panose="020B0604030504040204" pitchFamily="34" charset="0"/>
-                  <a:cs typeface="Arial" panose="020B0604020202020204" pitchFamily="34" charset="0"/>
-                </a:rPr>
-                <a:t>[2]</a:t>
+                <a:t>[1]</a:t>
               </a:r>
               <a:endParaRPr lang="en-US" sz="1800" dirty="0">
                 <a:ea typeface="Verdana" panose="020B0604030504040204" pitchFamily="34" charset="0"/>
@@ -10098,7 +10133,7 @@
               </a:endParaRPr>
             </a:p>
             <a:p>
-              <a:endParaRPr lang="en-US" sz="1800" dirty="0">
+              <a:endParaRPr lang="en-CA" sz="1800" dirty="0">
                 <a:ea typeface="Verdana" panose="020B0604030504040204" pitchFamily="34" charset="0"/>
                 <a:cs typeface="Arial" panose="020B0604020202020204" pitchFamily="34" charset="0"/>
               </a:endParaRPr>
@@ -10112,38 +10147,27 @@
                   <a:ea typeface="Verdana" panose="020B0604030504040204" pitchFamily="34" charset="0"/>
                   <a:cs typeface="Arial" panose="020B0604020202020204" pitchFamily="34" charset="0"/>
                 </a:rPr>
-                <a:t>Area of Focus:</a:t>
+                <a:t>Advantages of </a:t>
               </a:r>
-              <a:endParaRPr lang="en-CA" sz="1800" b="1" dirty="0">
-                <a:ea typeface="Verdana" panose="020B0604030504040204" pitchFamily="34" charset="0"/>
-                <a:cs typeface="Arial" panose="020B0604020202020204" pitchFamily="34" charset="0"/>
-              </a:endParaRPr>
-            </a:p>
-            <a:p>
-              <a:pPr marL="342900" indent="-342900">
-                <a:buFont typeface="Arial" panose="020B0604020202020204" pitchFamily="34" charset="0"/>
-                <a:buChar char="•"/>
-              </a:pPr>
               <a:r>
-                <a:rPr lang="en-US" sz="1800" dirty="0">
+                <a:rPr lang="en-CA" sz="1800" b="1" dirty="0" err="1">
+                  <a:solidFill>
+                    <a:srgbClr val="7A003C"/>
+                  </a:solidFill>
                   <a:ea typeface="Verdana" panose="020B0604030504040204" pitchFamily="34" charset="0"/>
                   <a:cs typeface="Arial" panose="020B0604020202020204" pitchFamily="34" charset="0"/>
                 </a:rPr>
-                <a:t>This research poster focuses on </a:t>
+                <a:t>mdBook</a:t>
               </a:r>
               <a:r>
-                <a:rPr lang="en-US" sz="1800" dirty="0" err="1">
+                <a:rPr lang="en-CA" sz="1800" b="1" dirty="0">
+                  <a:solidFill>
+                    <a:srgbClr val="7A003C"/>
+                  </a:solidFill>
                   <a:ea typeface="Verdana" panose="020B0604030504040204" pitchFamily="34" charset="0"/>
                   <a:cs typeface="Arial" panose="020B0604020202020204" pitchFamily="34" charset="0"/>
                 </a:rPr>
-                <a:t>Drasil’s</a:t>
-              </a:r>
-              <a:r>
-                <a:rPr lang="en-US" sz="1800" dirty="0">
-                  <a:ea typeface="Verdana" panose="020B0604030504040204" pitchFamily="34" charset="0"/>
-                  <a:cs typeface="Arial" panose="020B0604020202020204" pitchFamily="34" charset="0"/>
-                </a:rPr>
-                <a:t> document generation capabilities, specifically the Software Requirements Specification (SRS).</a:t>
+                <a:t>:</a:t>
               </a:r>
             </a:p>
             <a:p>
@@ -10152,25 +10176,18 @@
                 <a:buChar char="•"/>
               </a:pPr>
               <a:r>
-                <a:rPr lang="en-US" sz="1800" dirty="0">
+                <a:rPr lang="en-US" sz="1800" b="1" dirty="0">
                   <a:ea typeface="Verdana" panose="020B0604030504040204" pitchFamily="34" charset="0"/>
                   <a:cs typeface="Arial" panose="020B0604020202020204" pitchFamily="34" charset="0"/>
                 </a:rPr>
-                <a:t>Users define the SRS once in a single location, and </a:t>
-              </a:r>
-              <a:r>
-                <a:rPr lang="en-US" sz="1800" dirty="0" err="1">
-                  <a:ea typeface="Verdana" panose="020B0604030504040204" pitchFamily="34" charset="0"/>
-                  <a:cs typeface="Arial" panose="020B0604020202020204" pitchFamily="34" charset="0"/>
-                </a:rPr>
-                <a:t>Drasil</a:t>
+                <a:t>Navigation: </a:t>
               </a:r>
               <a:r>
                 <a:rPr lang="en-US" sz="1800" dirty="0">
                   <a:ea typeface="Verdana" panose="020B0604030504040204" pitchFamily="34" charset="0"/>
                   <a:cs typeface="Arial" panose="020B0604020202020204" pitchFamily="34" charset="0"/>
                 </a:rPr>
-                <a:t> generates the SRS in various output formats.</a:t>
+                <a:t>Sections are separated into individual pages.</a:t>
               </a:r>
             </a:p>
             <a:p>
@@ -10179,82 +10196,57 @@
                 <a:buChar char="•"/>
               </a:pPr>
               <a:r>
-                <a:rPr lang="en-US" sz="1800" dirty="0">
+                <a:rPr lang="en-US" sz="1800" b="1" dirty="0">
                   <a:ea typeface="Verdana" panose="020B0604030504040204" pitchFamily="34" charset="0"/>
                   <a:cs typeface="Arial" panose="020B0604020202020204" pitchFamily="34" charset="0"/>
                 </a:rPr>
-                <a:t>Prior to the work done in this research poster, </a:t>
-              </a:r>
-              <a:r>
-                <a:rPr lang="en-US" sz="1800" dirty="0" err="1">
-                  <a:ea typeface="Verdana" panose="020B0604030504040204" pitchFamily="34" charset="0"/>
-                  <a:cs typeface="Arial" panose="020B0604020202020204" pitchFamily="34" charset="0"/>
-                </a:rPr>
-                <a:t>Drasil</a:t>
+                <a:t>Styling: </a:t>
               </a:r>
               <a:r>
                 <a:rPr lang="en-US" sz="1800" dirty="0">
                   <a:ea typeface="Verdana" panose="020B0604030504040204" pitchFamily="34" charset="0"/>
                   <a:cs typeface="Arial" panose="020B0604020202020204" pitchFamily="34" charset="0"/>
                 </a:rPr>
-                <a:t> could generate documentation in </a:t>
+                <a:t>Advanced styling options for better readability and organization.</a:t>
+              </a:r>
+            </a:p>
+            <a:p>
+              <a:pPr marL="342900" indent="-342900">
+                <a:buFont typeface="Arial" panose="020B0604020202020204" pitchFamily="34" charset="0"/>
+                <a:buChar char="•"/>
+              </a:pPr>
+              <a:r>
+                <a:rPr lang="en-US" sz="1800" b="1" dirty="0" err="1">
+                  <a:ea typeface="Verdana" panose="020B0604030504040204" pitchFamily="34" charset="0"/>
+                  <a:cs typeface="Arial" panose="020B0604020202020204" pitchFamily="34" charset="0"/>
+                </a:rPr>
+                <a:t>MathJax</a:t>
               </a:r>
               <a:r>
                 <a:rPr lang="en-US" sz="1800" b="1" dirty="0">
                   <a:ea typeface="Verdana" panose="020B0604030504040204" pitchFamily="34" charset="0"/>
                   <a:cs typeface="Arial" panose="020B0604020202020204" pitchFamily="34" charset="0"/>
                 </a:rPr>
-                <a:t>HTML</a:t>
+                <a:t> Support: </a:t>
               </a:r>
               <a:r>
                 <a:rPr lang="en-US" sz="1800" dirty="0">
                   <a:ea typeface="Verdana" panose="020B0604030504040204" pitchFamily="34" charset="0"/>
                   <a:cs typeface="Arial" panose="020B0604020202020204" pitchFamily="34" charset="0"/>
                 </a:rPr>
-                <a:t>, </a:t>
+                <a:t>Includes LaTeX for mathematical equations and symbols. </a:t>
               </a:r>
               <a:r>
-                <a:rPr lang="en-US" sz="1800" b="1" dirty="0">
+                <a:rPr lang="en-US" sz="1800" baseline="30000" dirty="0">
                   <a:ea typeface="Verdana" panose="020B0604030504040204" pitchFamily="34" charset="0"/>
                   <a:cs typeface="Arial" panose="020B0604020202020204" pitchFamily="34" charset="0"/>
                 </a:rPr>
-                <a:t>LaTeX</a:t>
+                <a:t>[1]</a:t>
               </a:r>
-              <a:r>
-                <a:rPr lang="en-US" sz="1800" dirty="0">
-                  <a:ea typeface="Verdana" panose="020B0604030504040204" pitchFamily="34" charset="0"/>
-                  <a:cs typeface="Arial" panose="020B0604020202020204" pitchFamily="34" charset="0"/>
-                </a:rPr>
-                <a:t>, and </a:t>
-              </a:r>
-              <a:r>
-                <a:rPr lang="en-US" sz="1800" b="1" dirty="0" err="1">
-                  <a:ea typeface="Verdana" panose="020B0604030504040204" pitchFamily="34" charset="0"/>
-                  <a:cs typeface="Arial" panose="020B0604020202020204" pitchFamily="34" charset="0"/>
-                </a:rPr>
-                <a:t>Jupyter</a:t>
-              </a:r>
-              <a:r>
-                <a:rPr lang="en-US" sz="1800" dirty="0">
-                  <a:ea typeface="Verdana" panose="020B0604030504040204" pitchFamily="34" charset="0"/>
-                  <a:cs typeface="Arial" panose="020B0604020202020204" pitchFamily="34" charset="0"/>
-                </a:rPr>
-                <a:t> </a:t>
-              </a:r>
-              <a:r>
-                <a:rPr lang="en-US" sz="1800" b="1" dirty="0">
-                  <a:ea typeface="Verdana" panose="020B0604030504040204" pitchFamily="34" charset="0"/>
-                  <a:cs typeface="Arial" panose="020B0604020202020204" pitchFamily="34" charset="0"/>
-                </a:rPr>
-                <a:t>Notebook</a:t>
-              </a:r>
-              <a:r>
-                <a:rPr lang="en-US" sz="1800" dirty="0">
-                  <a:ea typeface="Verdana" panose="020B0604030504040204" pitchFamily="34" charset="0"/>
-                  <a:cs typeface="Arial" panose="020B0604020202020204" pitchFamily="34" charset="0"/>
-                </a:rPr>
-                <a:t>.</a:t>
-              </a:r>
+              <a:endParaRPr lang="en-US" sz="1800" dirty="0">
+                <a:ea typeface="Verdana" panose="020B0604030504040204" pitchFamily="34" charset="0"/>
+                <a:cs typeface="Arial" panose="020B0604020202020204" pitchFamily="34" charset="0"/>
+              </a:endParaRPr>
             </a:p>
           </p:txBody>
         </p:sp>
@@ -10664,10 +10656,10 @@
         </p:nvGrpSpPr>
         <p:grpSpPr>
           <a:xfrm>
-            <a:off x="873142" y="11081519"/>
-            <a:ext cx="7762858" cy="5832413"/>
+            <a:off x="873142" y="8280290"/>
+            <a:ext cx="7762858" cy="7125075"/>
             <a:chOff x="873142" y="10979921"/>
-            <a:chExt cx="7762858" cy="5832413"/>
+            <a:chExt cx="7762858" cy="7125075"/>
           </a:xfrm>
         </p:grpSpPr>
         <p:sp>
@@ -10685,7 +10677,7 @@
           <p:spPr>
             <a:xfrm>
               <a:off x="873142" y="11734021"/>
-              <a:ext cx="7762857" cy="5078313"/>
+              <a:ext cx="7762857" cy="6370975"/>
             </a:xfrm>
             <a:prstGeom prst="rect">
               <a:avLst/>
@@ -10706,63 +10698,100 @@
                   <a:ea typeface="Verdana" panose="020B0604030504040204" pitchFamily="34" charset="0"/>
                   <a:cs typeface="Arial" panose="020B0604020202020204" pitchFamily="34" charset="0"/>
                 </a:rPr>
-                <a:t>Goal:</a:t>
+                <a:t>Problem:</a:t>
               </a:r>
-              <a:endParaRPr lang="en-CA" sz="1800" b="1" dirty="0">
+            </a:p>
+            <a:p>
+              <a:pPr marL="285750" indent="-285750">
+                <a:buFont typeface="Arial" panose="020B0604020202020204" pitchFamily="34" charset="0"/>
+                <a:buChar char="•"/>
+              </a:pPr>
+              <a:r>
+                <a:rPr lang="en-CA" sz="1800" b="1" dirty="0">
+                  <a:ea typeface="Verdana" panose="020B0604030504040204" pitchFamily="34" charset="0"/>
+                  <a:cs typeface="Arial" panose="020B0604020202020204" pitchFamily="34" charset="0"/>
+                </a:rPr>
+                <a:t>Duplication: </a:t>
+              </a:r>
+              <a:r>
+                <a:rPr lang="en-CA" sz="1800" dirty="0">
+                  <a:ea typeface="Verdana" panose="020B0604030504040204" pitchFamily="34" charset="0"/>
+                  <a:cs typeface="Arial" panose="020B0604020202020204" pitchFamily="34" charset="0"/>
+                </a:rPr>
+                <a:t>Handwritten software artifacts often repeat information. </a:t>
+              </a:r>
+              <a:r>
+                <a:rPr lang="en-CA" sz="1800" baseline="30000" dirty="0">
+                  <a:ea typeface="Verdana" panose="020B0604030504040204" pitchFamily="34" charset="0"/>
+                  <a:cs typeface="Arial" panose="020B0604020202020204" pitchFamily="34" charset="0"/>
+                </a:rPr>
+                <a:t>[2]</a:t>
+              </a:r>
+              <a:endParaRPr lang="en-CA" sz="1800" dirty="0">
                 <a:ea typeface="Verdana" panose="020B0604030504040204" pitchFamily="34" charset="0"/>
                 <a:cs typeface="Arial" panose="020B0604020202020204" pitchFamily="34" charset="0"/>
               </a:endParaRPr>
             </a:p>
             <a:p>
-              <a:pPr marL="342900" indent="-342900">
+              <a:pPr marL="285750" indent="-285750">
                 <a:buFont typeface="Arial" panose="020B0604020202020204" pitchFamily="34" charset="0"/>
                 <a:buChar char="•"/>
               </a:pPr>
               <a:r>
-                <a:rPr lang="en-US" sz="1800" dirty="0">
+                <a:rPr lang="en-CA" sz="1800" b="1" dirty="0">
                   <a:ea typeface="Verdana" panose="020B0604030504040204" pitchFamily="34" charset="0"/>
                   <a:cs typeface="Arial" panose="020B0604020202020204" pitchFamily="34" charset="0"/>
                 </a:rPr>
-                <a:t>Expand </a:t>
+                <a:t>Traceability: </a:t>
               </a:r>
               <a:r>
-                <a:rPr lang="en-US" sz="1800" dirty="0" err="1">
+                <a:rPr lang="en-CA" sz="1800" dirty="0">
                   <a:ea typeface="Verdana" panose="020B0604030504040204" pitchFamily="34" charset="0"/>
                   <a:cs typeface="Arial" panose="020B0604020202020204" pitchFamily="34" charset="0"/>
                 </a:rPr>
-                <a:t>Drasil’s</a:t>
+                <a:t>Tracking origins and dependencies of software components is difficult. </a:t>
               </a:r>
               <a:r>
-                <a:rPr lang="en-US" sz="1800" dirty="0">
+                <a:rPr lang="en-CA" sz="1800" baseline="30000" dirty="0">
                   <a:ea typeface="Verdana" panose="020B0604030504040204" pitchFamily="34" charset="0"/>
                   <a:cs typeface="Arial" panose="020B0604020202020204" pitchFamily="34" charset="0"/>
                 </a:rPr>
-                <a:t> document generation capabilities by generating Software Requirement Specifications (SRS) in </a:t>
+                <a:t>[3]</a:t>
               </a:r>
+              <a:endParaRPr lang="en-CA" sz="1800" dirty="0">
+                <a:ea typeface="Verdana" panose="020B0604030504040204" pitchFamily="34" charset="0"/>
+                <a:cs typeface="Arial" panose="020B0604020202020204" pitchFamily="34" charset="0"/>
+              </a:endParaRPr>
+            </a:p>
+            <a:p>
+              <a:pPr marL="285750" indent="-285750">
+                <a:buFont typeface="Arial" panose="020B0604020202020204" pitchFamily="34" charset="0"/>
+                <a:buChar char="•"/>
+              </a:pPr>
               <a:r>
-                <a:rPr lang="en-US" sz="1800" b="1" dirty="0" err="1">
+                <a:rPr lang="en-CA" sz="1800" b="1" dirty="0">
                   <a:ea typeface="Verdana" panose="020B0604030504040204" pitchFamily="34" charset="0"/>
                   <a:cs typeface="Arial" panose="020B0604020202020204" pitchFamily="34" charset="0"/>
                 </a:rPr>
-                <a:t>mdBook</a:t>
+                <a:t>Maintainability: </a:t>
               </a:r>
               <a:r>
-                <a:rPr lang="en-US" sz="1800" dirty="0">
+                <a:rPr lang="en-CA" sz="1800" dirty="0">
                   <a:ea typeface="Verdana" panose="020B0604030504040204" pitchFamily="34" charset="0"/>
                   <a:cs typeface="Arial" panose="020B0604020202020204" pitchFamily="34" charset="0"/>
                 </a:rPr>
-                <a:t>.</a:t>
+                <a:t>Updating handwritten software is cumbersome and time-consuming. </a:t>
+              </a:r>
+              <a:r>
+                <a:rPr lang="en-CA" sz="1800" baseline="30000" dirty="0">
+                  <a:ea typeface="Verdana" panose="020B0604030504040204" pitchFamily="34" charset="0"/>
+                  <a:cs typeface="Arial" panose="020B0604020202020204" pitchFamily="34" charset="0"/>
+                </a:rPr>
+                <a:t>[3]</a:t>
               </a:r>
             </a:p>
             <a:p>
-              <a:pPr marL="342900" indent="-342900">
-                <a:buFont typeface="Arial" panose="020B0604020202020204" pitchFamily="34" charset="0"/>
-                <a:buChar char="•"/>
-              </a:pPr>
-              <a:endParaRPr lang="en-CA" sz="1800" b="1" dirty="0">
-                <a:solidFill>
-                  <a:srgbClr val="7A003C"/>
-                </a:solidFill>
+              <a:endParaRPr lang="en-US" sz="1800" dirty="0">
                 <a:ea typeface="Verdana" panose="020B0604030504040204" pitchFamily="34" charset="0"/>
                 <a:cs typeface="Arial" panose="020B0604020202020204" pitchFamily="34" charset="0"/>
               </a:endParaRPr>
@@ -10776,27 +10805,101 @@
                   <a:ea typeface="Verdana" panose="020B0604030504040204" pitchFamily="34" charset="0"/>
                   <a:cs typeface="Arial" panose="020B0604020202020204" pitchFamily="34" charset="0"/>
                 </a:rPr>
-                <a:t>What is </a:t>
+                <a:t>Solution:</a:t>
               </a:r>
+              <a:endParaRPr lang="en-CA" sz="1800" b="1" dirty="0">
+                <a:ea typeface="Verdana" panose="020B0604030504040204" pitchFamily="34" charset="0"/>
+                <a:cs typeface="Arial" panose="020B0604020202020204" pitchFamily="34" charset="0"/>
+              </a:endParaRPr>
+            </a:p>
+            <a:p>
+              <a:pPr marL="342900" indent="-342900">
+                <a:buFont typeface="Arial" panose="020B0604020202020204" pitchFamily="34" charset="0"/>
+                <a:buChar char="•"/>
+              </a:pPr>
               <a:r>
-                <a:rPr lang="en-CA" sz="1800" b="1" dirty="0" err="1">
-                  <a:solidFill>
-                    <a:srgbClr val="7A003C"/>
-                  </a:solidFill>
+                <a:rPr lang="en-US" sz="1800" b="1" dirty="0" err="1">
                   <a:ea typeface="Verdana" panose="020B0604030504040204" pitchFamily="34" charset="0"/>
                   <a:cs typeface="Arial" panose="020B0604020202020204" pitchFamily="34" charset="0"/>
                 </a:rPr>
-                <a:t>mdBook</a:t>
+                <a:t>Drasil</a:t>
               </a:r>
               <a:r>
-                <a:rPr lang="en-CA" sz="1800" b="1" dirty="0">
-                  <a:solidFill>
-                    <a:srgbClr val="7A003C"/>
-                  </a:solidFill>
+                <a:rPr lang="en-US" sz="1800" b="1" dirty="0">
                   <a:ea typeface="Verdana" panose="020B0604030504040204" pitchFamily="34" charset="0"/>
                   <a:cs typeface="Arial" panose="020B0604020202020204" pitchFamily="34" charset="0"/>
                 </a:rPr>
-                <a:t>?</a:t>
+                <a:t>:</a:t>
+              </a:r>
+              <a:r>
+                <a:rPr lang="en-US" sz="1800" dirty="0">
+                  <a:ea typeface="Verdana" panose="020B0604030504040204" pitchFamily="34" charset="0"/>
+                  <a:cs typeface="Arial" panose="020B0604020202020204" pitchFamily="34" charset="0"/>
+                </a:rPr>
+                <a:t> a software framework written in </a:t>
+              </a:r>
+              <a:r>
+                <a:rPr lang="en-US" sz="1800" b="1" dirty="0">
+                  <a:ea typeface="Verdana" panose="020B0604030504040204" pitchFamily="34" charset="0"/>
+                  <a:cs typeface="Arial" panose="020B0604020202020204" pitchFamily="34" charset="0"/>
+                </a:rPr>
+                <a:t>Haskell</a:t>
+              </a:r>
+              <a:r>
+                <a:rPr lang="en-US" sz="1800" dirty="0">
+                  <a:ea typeface="Verdana" panose="020B0604030504040204" pitchFamily="34" charset="0"/>
+                  <a:cs typeface="Arial" panose="020B0604020202020204" pitchFamily="34" charset="0"/>
+                </a:rPr>
+                <a:t> that generates </a:t>
+              </a:r>
+              <a:r>
+                <a:rPr lang="en-US" sz="1800" b="1" dirty="0">
+                  <a:ea typeface="Verdana" panose="020B0604030504040204" pitchFamily="34" charset="0"/>
+                  <a:cs typeface="Arial" panose="020B0604020202020204" pitchFamily="34" charset="0"/>
+                </a:rPr>
+                <a:t>all software artifacts</a:t>
+              </a:r>
+              <a:r>
+                <a:rPr lang="en-US" sz="1800" dirty="0">
+                  <a:ea typeface="Verdana" panose="020B0604030504040204" pitchFamily="34" charset="0"/>
+                  <a:cs typeface="Arial" panose="020B0604020202020204" pitchFamily="34" charset="0"/>
+                </a:rPr>
+                <a:t> (requirements, design, code, tests, build scripts, documentation, etc.) based on a </a:t>
+              </a:r>
+              <a:r>
+                <a:rPr lang="en-US" sz="1800" b="1" dirty="0">
+                  <a:ea typeface="Verdana" panose="020B0604030504040204" pitchFamily="34" charset="0"/>
+                  <a:cs typeface="Arial" panose="020B0604020202020204" pitchFamily="34" charset="0"/>
+                </a:rPr>
+                <a:t>single specification </a:t>
+              </a:r>
+              <a:r>
+                <a:rPr lang="en-US" sz="1800" dirty="0">
+                  <a:ea typeface="Verdana" panose="020B0604030504040204" pitchFamily="34" charset="0"/>
+                  <a:cs typeface="Arial" panose="020B0604020202020204" pitchFamily="34" charset="0"/>
+                </a:rPr>
+                <a:t>in </a:t>
+              </a:r>
+              <a:r>
+                <a:rPr lang="en-US" sz="1800" b="1" dirty="0">
+                  <a:ea typeface="Verdana" panose="020B0604030504040204" pitchFamily="34" charset="0"/>
+                  <a:cs typeface="Arial" panose="020B0604020202020204" pitchFamily="34" charset="0"/>
+                </a:rPr>
+                <a:t>a domain-specific language</a:t>
+              </a:r>
+              <a:r>
+                <a:rPr lang="en-US" sz="1800" dirty="0">
+                  <a:ea typeface="Verdana" panose="020B0604030504040204" pitchFamily="34" charset="0"/>
+                  <a:cs typeface="Arial" panose="020B0604020202020204" pitchFamily="34" charset="0"/>
+                </a:rPr>
+                <a:t> (DSL). </a:t>
+              </a:r>
+              <a:r>
+                <a:rPr lang="en-US" sz="1800" baseline="30000" dirty="0">
+                  <a:ea typeface="Verdana" panose="020B0604030504040204" pitchFamily="34" charset="0"/>
+                  <a:cs typeface="Arial" panose="020B0604020202020204" pitchFamily="34" charset="0"/>
+                </a:rPr>
+                <a:t>[3]</a:t>
               </a:r>
             </a:p>
             <a:p>
@@ -10805,18 +10908,39 @@
                 <a:buChar char="•"/>
               </a:pPr>
               <a:r>
-                <a:rPr lang="en-US" sz="1800" dirty="0" err="1">
+                <a:rPr lang="en-US" sz="1800" dirty="0">
                   <a:ea typeface="Verdana" panose="020B0604030504040204" pitchFamily="34" charset="0"/>
                   <a:cs typeface="Arial" panose="020B0604020202020204" pitchFamily="34" charset="0"/>
                 </a:rPr>
-                <a:t>mdBook</a:t>
+                <a:t>Objectives: </a:t>
+              </a:r>
+              <a:r>
+                <a:rPr lang="en-US" sz="1800" b="1" dirty="0">
+                  <a:ea typeface="Verdana" panose="020B0604030504040204" pitchFamily="34" charset="0"/>
+                  <a:cs typeface="Arial" panose="020B0604020202020204" pitchFamily="34" charset="0"/>
+                </a:rPr>
+                <a:t>Improves traceability </a:t>
               </a:r>
               <a:r>
                 <a:rPr lang="en-US" sz="1800" dirty="0">
                   <a:ea typeface="Verdana" panose="020B0604030504040204" pitchFamily="34" charset="0"/>
                   <a:cs typeface="Arial" panose="020B0604020202020204" pitchFamily="34" charset="0"/>
                 </a:rPr>
-                <a:t> is a command line tool designed for creating books in Markdown.</a:t>
+                <a:t>and </a:t>
+              </a:r>
+              <a:r>
+                <a:rPr lang="en-US" sz="1800" b="1" dirty="0">
+                  <a:ea typeface="Verdana" panose="020B0604030504040204" pitchFamily="34" charset="0"/>
+                  <a:cs typeface="Arial" panose="020B0604020202020204" pitchFamily="34" charset="0"/>
+                </a:rPr>
+                <a:t>eliminates knowledge duplication</a:t>
+              </a:r>
+              <a:r>
+                <a:rPr lang="en-US" sz="1800" dirty="0">
+                  <a:ea typeface="Verdana" panose="020B0604030504040204" pitchFamily="34" charset="0"/>
+                  <a:cs typeface="Arial" panose="020B0604020202020204" pitchFamily="34" charset="0"/>
+                </a:rPr>
+                <a:t>. </a:t>
               </a:r>
               <a:r>
                 <a:rPr lang="en-US" sz="1800" baseline="30000" dirty="0">
@@ -10835,19 +10959,86 @@
                 <a:buFont typeface="Arial" panose="020B0604020202020204" pitchFamily="34" charset="0"/>
                 <a:buChar char="•"/>
               </a:pPr>
+              <a:endParaRPr lang="en-US" sz="1800" dirty="0">
+                <a:ea typeface="Verdana" panose="020B0604030504040204" pitchFamily="34" charset="0"/>
+                <a:cs typeface="Arial" panose="020B0604020202020204" pitchFamily="34" charset="0"/>
+              </a:endParaRPr>
+            </a:p>
+            <a:p>
+              <a:r>
+                <a:rPr lang="en-CA" sz="1800" b="1" dirty="0">
+                  <a:solidFill>
+                    <a:srgbClr val="7A003C"/>
+                  </a:solidFill>
+                  <a:ea typeface="Verdana" panose="020B0604030504040204" pitchFamily="34" charset="0"/>
+                  <a:cs typeface="Arial" panose="020B0604020202020204" pitchFamily="34" charset="0"/>
+                </a:rPr>
+                <a:t>Area of Focus:</a:t>
+              </a:r>
+              <a:endParaRPr lang="en-CA" sz="1800" b="1" dirty="0">
+                <a:ea typeface="Verdana" panose="020B0604030504040204" pitchFamily="34" charset="0"/>
+                <a:cs typeface="Arial" panose="020B0604020202020204" pitchFamily="34" charset="0"/>
+              </a:endParaRPr>
+            </a:p>
+            <a:p>
+              <a:pPr marL="342900" indent="-342900">
+                <a:buFont typeface="Arial" panose="020B0604020202020204" pitchFamily="34" charset="0"/>
+                <a:buChar char="•"/>
+              </a:pPr>
               <a:r>
                 <a:rPr lang="en-US" sz="1800" dirty="0">
                   <a:ea typeface="Verdana" panose="020B0604030504040204" pitchFamily="34" charset="0"/>
                   <a:cs typeface="Arial" panose="020B0604020202020204" pitchFamily="34" charset="0"/>
                 </a:rPr>
-                <a:t>Content is authored in </a:t>
+                <a:t>This research poster focuses on </a:t>
+              </a:r>
+              <a:r>
+                <a:rPr lang="en-US" sz="1800" dirty="0" err="1">
+                  <a:ea typeface="Verdana" panose="020B0604030504040204" pitchFamily="34" charset="0"/>
+                  <a:cs typeface="Arial" panose="020B0604020202020204" pitchFamily="34" charset="0"/>
+                </a:rPr>
+                <a:t>Drasil’s</a:t>
+              </a:r>
+              <a:r>
+                <a:rPr lang="en-US" sz="1800" dirty="0">
+                  <a:ea typeface="Verdana" panose="020B0604030504040204" pitchFamily="34" charset="0"/>
+                  <a:cs typeface="Arial" panose="020B0604020202020204" pitchFamily="34" charset="0"/>
+                </a:rPr>
+                <a:t> </a:t>
               </a:r>
               <a:r>
                 <a:rPr lang="en-US" sz="1800" b="1" dirty="0">
                   <a:ea typeface="Verdana" panose="020B0604030504040204" pitchFamily="34" charset="0"/>
                   <a:cs typeface="Arial" panose="020B0604020202020204" pitchFamily="34" charset="0"/>
                 </a:rPr>
-                <a:t>Markdown</a:t>
+                <a:t>document generation </a:t>
+              </a:r>
+              <a:r>
+                <a:rPr lang="en-US" sz="1800" dirty="0">
+                  <a:ea typeface="Verdana" panose="020B0604030504040204" pitchFamily="34" charset="0"/>
+                  <a:cs typeface="Arial" panose="020B0604020202020204" pitchFamily="34" charset="0"/>
+                </a:rPr>
+                <a:t>capabilities, specifically the Software Requirements Specification (SRS).</a:t>
+              </a:r>
+            </a:p>
+            <a:p>
+              <a:pPr marL="342900" indent="-342900">
+                <a:buFont typeface="Arial" panose="020B0604020202020204" pitchFamily="34" charset="0"/>
+                <a:buChar char="•"/>
+              </a:pPr>
+              <a:r>
+                <a:rPr lang="en-US" sz="1800" dirty="0">
+                  <a:ea typeface="Verdana" panose="020B0604030504040204" pitchFamily="34" charset="0"/>
+                  <a:cs typeface="Arial" panose="020B0604020202020204" pitchFamily="34" charset="0"/>
+                </a:rPr>
+                <a:t>Users define the SRS once in a </a:t>
+              </a:r>
+              <a:r>
+                <a:rPr lang="en-US" sz="1800" b="1" dirty="0">
+                  <a:ea typeface="Verdana" panose="020B0604030504040204" pitchFamily="34" charset="0"/>
+                  <a:cs typeface="Arial" panose="020B0604020202020204" pitchFamily="34" charset="0"/>
+                </a:rPr>
+                <a:t>single location</a:t>
               </a:r>
               <a:r>
                 <a:rPr lang="en-US" sz="1800" dirty="0">
@@ -10861,56 +11052,14 @@
                   <a:ea typeface="Verdana" panose="020B0604030504040204" pitchFamily="34" charset="0"/>
                   <a:cs typeface="Arial" panose="020B0604020202020204" pitchFamily="34" charset="0"/>
                 </a:rPr>
-                <a:t>mdBook</a:t>
+                <a:t>Drasil</a:t>
               </a:r>
               <a:r>
                 <a:rPr lang="en-US" sz="1800" dirty="0">
                   <a:ea typeface="Verdana" panose="020B0604030504040204" pitchFamily="34" charset="0"/>
                   <a:cs typeface="Arial" panose="020B0604020202020204" pitchFamily="34" charset="0"/>
                 </a:rPr>
-                <a:t> converts it into HTML, automatically applying styles and layout to enhance presentation.</a:t>
-              </a:r>
-            </a:p>
-            <a:p>
-              <a:pPr marL="342900" indent="-342900">
-                <a:buFont typeface="Arial" panose="020B0604020202020204" pitchFamily="34" charset="0"/>
-                <a:buChar char="•"/>
-              </a:pPr>
-              <a:endParaRPr lang="en-CA" sz="1800" dirty="0">
-                <a:ea typeface="Verdana" panose="020B0604030504040204" pitchFamily="34" charset="0"/>
-                <a:cs typeface="Arial" panose="020B0604020202020204" pitchFamily="34" charset="0"/>
-              </a:endParaRPr>
-            </a:p>
-            <a:p>
-              <a:r>
-                <a:rPr lang="en-CA" sz="1800" b="1" dirty="0">
-                  <a:solidFill>
-                    <a:srgbClr val="7A003C"/>
-                  </a:solidFill>
-                  <a:ea typeface="Verdana" panose="020B0604030504040204" pitchFamily="34" charset="0"/>
-                  <a:cs typeface="Arial" panose="020B0604020202020204" pitchFamily="34" charset="0"/>
-                </a:rPr>
-                <a:t>Advantages of </a:t>
-              </a:r>
-              <a:r>
-                <a:rPr lang="en-CA" sz="1800" b="1" dirty="0" err="1">
-                  <a:solidFill>
-                    <a:srgbClr val="7A003C"/>
-                  </a:solidFill>
-                  <a:ea typeface="Verdana" panose="020B0604030504040204" pitchFamily="34" charset="0"/>
-                  <a:cs typeface="Arial" panose="020B0604020202020204" pitchFamily="34" charset="0"/>
-                </a:rPr>
-                <a:t>mdBook</a:t>
-              </a:r>
-              <a:r>
-                <a:rPr lang="en-CA" sz="1800" b="1" dirty="0">
-                  <a:solidFill>
-                    <a:srgbClr val="7A003C"/>
-                  </a:solidFill>
-                  <a:ea typeface="Verdana" panose="020B0604030504040204" pitchFamily="34" charset="0"/>
-                  <a:cs typeface="Arial" panose="020B0604020202020204" pitchFamily="34" charset="0"/>
-                </a:rPr>
-                <a:t>:</a:t>
+                <a:t> generates the SRS in various output formats.</a:t>
               </a:r>
             </a:p>
             <a:p>
@@ -10919,97 +11068,82 @@
                 <a:buChar char="•"/>
               </a:pPr>
               <a:r>
-                <a:rPr lang="en-US" sz="1800" b="1" dirty="0">
+                <a:rPr lang="en-US" sz="1800" dirty="0">
                   <a:ea typeface="Verdana" panose="020B0604030504040204" pitchFamily="34" charset="0"/>
                   <a:cs typeface="Arial" panose="020B0604020202020204" pitchFamily="34" charset="0"/>
                 </a:rPr>
-                <a:t>Improved Navigation: </a:t>
+                <a:t>Prior to the work done in this research poster, </a:t>
+              </a:r>
+              <a:r>
+                <a:rPr lang="en-US" sz="1800" dirty="0" err="1">
+                  <a:ea typeface="Verdana" panose="020B0604030504040204" pitchFamily="34" charset="0"/>
+                  <a:cs typeface="Arial" panose="020B0604020202020204" pitchFamily="34" charset="0"/>
+                </a:rPr>
+                <a:t>Drasil</a:t>
               </a:r>
               <a:r>
                 <a:rPr lang="en-US" sz="1800" dirty="0">
                   <a:ea typeface="Verdana" panose="020B0604030504040204" pitchFamily="34" charset="0"/>
                   <a:cs typeface="Arial" panose="020B0604020202020204" pitchFamily="34" charset="0"/>
                 </a:rPr>
-                <a:t>Unlike the existing single-page formats, </a:t>
+                <a:t> could generate documentation in </a:t>
               </a:r>
               <a:r>
-                <a:rPr lang="en-US" sz="1800" dirty="0" err="1">
+                <a:rPr lang="en-US" sz="1800" b="1" dirty="0">
                   <a:ea typeface="Verdana" panose="020B0604030504040204" pitchFamily="34" charset="0"/>
                   <a:cs typeface="Arial" panose="020B0604020202020204" pitchFamily="34" charset="0"/>
                 </a:rPr>
-                <a:t>mdBook</a:t>
+                <a:t>HTML</a:t>
               </a:r>
               <a:r>
                 <a:rPr lang="en-US" sz="1800" dirty="0">
                   <a:ea typeface="Verdana" panose="020B0604030504040204" pitchFamily="34" charset="0"/>
                   <a:cs typeface="Arial" panose="020B0604020202020204" pitchFamily="34" charset="0"/>
                 </a:rPr>
-                <a:t> separates each section into its own page.</a:t>
+                <a:t>, </a:t>
               </a:r>
-            </a:p>
-            <a:p>
-              <a:pPr marL="342900" indent="-342900">
-                <a:buFont typeface="Arial" panose="020B0604020202020204" pitchFamily="34" charset="0"/>
-                <a:buChar char="•"/>
-              </a:pPr>
               <a:r>
                 <a:rPr lang="en-US" sz="1800" b="1" dirty="0">
                   <a:ea typeface="Verdana" panose="020B0604030504040204" pitchFamily="34" charset="0"/>
                   <a:cs typeface="Arial" panose="020B0604020202020204" pitchFamily="34" charset="0"/>
                 </a:rPr>
-                <a:t>Enhanced Styling: </a:t>
+                <a:t>LaTeX</a:t>
               </a:r>
               <a:r>
                 <a:rPr lang="en-US" sz="1800" dirty="0">
                   <a:ea typeface="Verdana" panose="020B0604030504040204" pitchFamily="34" charset="0"/>
                   <a:cs typeface="Arial" panose="020B0604020202020204" pitchFamily="34" charset="0"/>
                 </a:rPr>
-                <a:t>Offers advanced styling and layout options for better readability and organization.</a:t>
+                <a:t>, and </a:t>
               </a:r>
-            </a:p>
-            <a:p>
-              <a:pPr marL="342900" indent="-342900">
-                <a:buFont typeface="Arial" panose="020B0604020202020204" pitchFamily="34" charset="0"/>
-                <a:buChar char="•"/>
-              </a:pPr>
               <a:r>
                 <a:rPr lang="en-US" sz="1800" b="1" dirty="0" err="1">
                   <a:ea typeface="Verdana" panose="020B0604030504040204" pitchFamily="34" charset="0"/>
                   <a:cs typeface="Arial" panose="020B0604020202020204" pitchFamily="34" charset="0"/>
                 </a:rPr>
-                <a:t>MathJax</a:t>
+                <a:t>Jupyter</a:t>
+              </a:r>
+              <a:r>
+                <a:rPr lang="en-US" sz="1800" dirty="0">
+                  <a:ea typeface="Verdana" panose="020B0604030504040204" pitchFamily="34" charset="0"/>
+                  <a:cs typeface="Arial" panose="020B0604020202020204" pitchFamily="34" charset="0"/>
+                </a:rPr>
+                <a:t> </a:t>
               </a:r>
               <a:r>
                 <a:rPr lang="en-US" sz="1800" b="1" dirty="0">
                   <a:ea typeface="Verdana" panose="020B0604030504040204" pitchFamily="34" charset="0"/>
                   <a:cs typeface="Arial" panose="020B0604020202020204" pitchFamily="34" charset="0"/>
                 </a:rPr>
-                <a:t> Support: </a:t>
+                <a:t>Notebook</a:t>
               </a:r>
               <a:r>
                 <a:rPr lang="en-US" sz="1800" dirty="0">
                   <a:ea typeface="Verdana" panose="020B0604030504040204" pitchFamily="34" charset="0"/>
                   <a:cs typeface="Arial" panose="020B0604020202020204" pitchFamily="34" charset="0"/>
                 </a:rPr>
-                <a:t>Allows you to include mathematical equations and symbols in your documentation using LaTeX. </a:t>
+                <a:t>.</a:t>
               </a:r>
-              <a:r>
-                <a:rPr lang="en-US" sz="1800" baseline="30000" dirty="0">
-                  <a:ea typeface="Verdana" panose="020B0604030504040204" pitchFamily="34" charset="0"/>
-                  <a:cs typeface="Arial" panose="020B0604020202020204" pitchFamily="34" charset="0"/>
-                </a:rPr>
-                <a:t>[3]</a:t>
-              </a:r>
-              <a:endParaRPr lang="en-US" sz="1800" dirty="0">
-                <a:ea typeface="Verdana" panose="020B0604030504040204" pitchFamily="34" charset="0"/>
-                <a:cs typeface="Arial" panose="020B0604020202020204" pitchFamily="34" charset="0"/>
-              </a:endParaRPr>
-            </a:p>
-            <a:p>
-              <a:endParaRPr lang="en-CA" sz="1800" dirty="0">
-                <a:ea typeface="Verdana" panose="020B0604030504040204" pitchFamily="34" charset="0"/>
-                <a:cs typeface="Arial" panose="020B0604020202020204" pitchFamily="34" charset="0"/>
-              </a:endParaRPr>
             </a:p>
           </p:txBody>
         </p:sp>
@@ -11107,8 +11241,25 @@
                   <a:latin typeface="+mj-lt"/>
                   <a:cs typeface="Arial" panose="020B0604020202020204" pitchFamily="34" charset="0"/>
                 </a:rPr>
-                <a:t>Objective</a:t>
+                <a:t>Motivation for </a:t>
               </a:r>
+              <a:r>
+                <a:rPr lang="en-CA" sz="3200" b="1" dirty="0" err="1">
+                  <a:solidFill>
+                    <a:schemeClr val="bg1"/>
+                  </a:solidFill>
+                  <a:latin typeface="+mj-lt"/>
+                  <a:cs typeface="Arial" panose="020B0604020202020204" pitchFamily="34" charset="0"/>
+                </a:rPr>
+                <a:t>Drasil</a:t>
+              </a:r>
+              <a:endParaRPr lang="en-CA" sz="3200" b="1" dirty="0">
+                <a:solidFill>
+                  <a:schemeClr val="bg1"/>
+                </a:solidFill>
+                <a:latin typeface="+mj-lt"/>
+                <a:cs typeface="Arial" panose="020B0604020202020204" pitchFamily="34" charset="0"/>
+              </a:endParaRPr>
             </a:p>
           </p:txBody>
         </p:sp>
@@ -11127,10 +11278,10 @@
         </p:nvGrpSpPr>
         <p:grpSpPr>
           <a:xfrm>
-            <a:off x="873142" y="16764938"/>
-            <a:ext cx="7762858" cy="4457443"/>
-            <a:chOff x="873142" y="16764938"/>
-            <a:chExt cx="7762858" cy="4457443"/>
+            <a:off x="873142" y="15545738"/>
+            <a:ext cx="7762858" cy="5522368"/>
+            <a:chOff x="873142" y="16612538"/>
+            <a:chExt cx="7762858" cy="5522368"/>
           </a:xfrm>
         </p:grpSpPr>
         <p:graphicFrame>
@@ -11146,14 +11297,14 @@
             <p:nvPr>
               <p:extLst>
                 <p:ext uri="{D42A27DB-BD31-4B8C-83A1-F6EECF244321}">
-                  <p14:modId xmlns:p14="http://schemas.microsoft.com/office/powerpoint/2010/main" val="1666116365"/>
+                  <p14:modId xmlns:p14="http://schemas.microsoft.com/office/powerpoint/2010/main" val="1891308666"/>
                 </p:ext>
               </p:extLst>
             </p:nvPr>
           </p:nvGraphicFramePr>
           <p:xfrm>
-            <a:off x="873142" y="17585473"/>
-            <a:ext cx="7762857" cy="3087670"/>
+            <a:off x="873142" y="17585472"/>
+            <a:ext cx="7762857" cy="3915925"/>
           </p:xfrm>
           <a:graphic>
             <a:graphicData uri="http://schemas.openxmlformats.org/drawingml/2006/diagram">
@@ -11175,7 +11326,7 @@
           </p:nvSpPr>
           <p:spPr>
             <a:xfrm>
-              <a:off x="1282139" y="20883827"/>
+              <a:off x="1305563" y="21796352"/>
               <a:ext cx="6898013" cy="338554"/>
             </a:xfrm>
             <a:prstGeom prst="rect">
@@ -11231,7 +11382,7 @@
           </p:nvSpPr>
           <p:spPr>
             <a:xfrm>
-              <a:off x="873143" y="16764938"/>
+              <a:off x="873143" y="16612538"/>
               <a:ext cx="7762857" cy="584775"/>
             </a:xfrm>
             <a:prstGeom prst="rect">
@@ -11288,7 +11439,7 @@
           </p:nvSpPr>
           <p:spPr>
             <a:xfrm>
-              <a:off x="1305563" y="16773912"/>
+              <a:off x="1305563" y="16621512"/>
               <a:ext cx="6898013" cy="584775"/>
             </a:xfrm>
             <a:prstGeom prst="rect">
@@ -11730,9 +11881,9 @@
         <p:grpSpPr>
           <a:xfrm>
             <a:off x="24345898" y="15170204"/>
-            <a:ext cx="7762860" cy="3371585"/>
+            <a:ext cx="7762860" cy="3356196"/>
             <a:chOff x="24345898" y="15170204"/>
-            <a:chExt cx="7762860" cy="3371585"/>
+            <a:chExt cx="7762860" cy="3356196"/>
           </a:xfrm>
         </p:grpSpPr>
         <p:sp>
@@ -11849,7 +12000,7 @@
           <p:spPr>
             <a:xfrm>
               <a:off x="24345898" y="15910299"/>
-              <a:ext cx="7699359" cy="2631490"/>
+              <a:ext cx="7699359" cy="2616101"/>
             </a:xfrm>
             <a:prstGeom prst="rect">
               <a:avLst/>
@@ -11863,62 +12014,8 @@
             <a:lstStyle/>
             <a:p>
               <a:r>
-                <a:rPr lang="en-CA" sz="1800" dirty="0"/>
-                <a:t>[1] </a:t>
-              </a:r>
-              <a:r>
-                <a:rPr lang="en-CA" sz="1800" dirty="0" err="1"/>
-                <a:t>Carette</a:t>
-              </a:r>
-              <a:r>
-                <a:rPr lang="en-CA" sz="1800" dirty="0"/>
-                <a:t>, Jacques &amp; Smith, Spencer &amp; </a:t>
-              </a:r>
-              <a:r>
-                <a:rPr lang="en-CA" sz="1800" dirty="0" err="1"/>
-                <a:t>Balaci</a:t>
-              </a:r>
-              <a:r>
-                <a:rPr lang="en-CA" sz="1800" dirty="0"/>
-                <a:t>, Jason. (2023). Generating 	Software for Well-Understood Domains. 10.48550/arXiv.2302.00740.</a:t>
-              </a:r>
-            </a:p>
-            <a:p>
-              <a:endParaRPr lang="en-CA" sz="1000" dirty="0"/>
-            </a:p>
-            <a:p>
-              <a:r>
-                <a:rPr lang="en-CA" sz="1800" dirty="0"/>
-                <a:t>[2] </a:t>
-              </a:r>
-              <a:r>
                 <a:rPr lang="en-US" sz="1800" dirty="0"/>
-                <a:t>D. </a:t>
-              </a:r>
-              <a:r>
-                <a:rPr lang="en-US" sz="1800" dirty="0" err="1"/>
-                <a:t>Szymczak</a:t>
-              </a:r>
-              <a:r>
-                <a:rPr lang="en-US" sz="1800" dirty="0"/>
-                <a:t>, S. Smith and J. </a:t>
-              </a:r>
-              <a:r>
-                <a:rPr lang="en-US" sz="1800" dirty="0" err="1"/>
-                <a:t>Carette</a:t>
-              </a:r>
-              <a:r>
-                <a:rPr lang="en-US" sz="1800" dirty="0"/>
-                <a:t>, "POSITION PAPER: A Knowledge-	Based Approach to Scientific Software Development," 2016 IEEE/ACM 	International Workshop on Software Engineering for Science 	(SE4Science), Austin, TX, USA, 2016, pp. 23-26.</a:t>
-              </a:r>
-            </a:p>
-            <a:p>
-              <a:endParaRPr lang="en-US" sz="1000" dirty="0"/>
-            </a:p>
-            <a:p>
-              <a:r>
-                <a:rPr lang="en-US" sz="1800" dirty="0"/>
-                <a:t>[3]  “</a:t>
+                <a:t>[1]  “</a:t>
               </a:r>
               <a:r>
                 <a:rPr lang="en-US" sz="1800" dirty="0" err="1"/>
@@ -11948,6 +12045,60 @@
               </a:r>
               <a:endParaRPr lang="en-CA" sz="1800" dirty="0"/>
             </a:p>
+            <a:p>
+              <a:endParaRPr lang="en-CA" sz="1000" dirty="0"/>
+            </a:p>
+            <a:p>
+              <a:r>
+                <a:rPr lang="en-CA" sz="1800" dirty="0"/>
+                <a:t>[2] </a:t>
+              </a:r>
+              <a:r>
+                <a:rPr lang="en-CA" sz="1800" dirty="0" err="1"/>
+                <a:t>Carette</a:t>
+              </a:r>
+              <a:r>
+                <a:rPr lang="en-CA" sz="1800" dirty="0"/>
+                <a:t>, Jacques &amp; Smith, Spencer &amp; </a:t>
+              </a:r>
+              <a:r>
+                <a:rPr lang="en-CA" sz="1800" dirty="0" err="1"/>
+                <a:t>Balaci</a:t>
+              </a:r>
+              <a:r>
+                <a:rPr lang="en-CA" sz="1800" dirty="0"/>
+                <a:t>, Jason. (2023). Generating 	Software for Well-Understood Domains. 10.48550/arXiv.2302.00740.</a:t>
+              </a:r>
+            </a:p>
+            <a:p>
+              <a:endParaRPr lang="en-CA" sz="1000" dirty="0"/>
+            </a:p>
+            <a:p>
+              <a:r>
+                <a:rPr lang="en-CA" sz="1800" dirty="0"/>
+                <a:t>[3] </a:t>
+              </a:r>
+              <a:r>
+                <a:rPr lang="en-US" sz="1800" dirty="0"/>
+                <a:t>D. </a:t>
+              </a:r>
+              <a:r>
+                <a:rPr lang="en-US" sz="1800" dirty="0" err="1"/>
+                <a:t>Szymczak</a:t>
+              </a:r>
+              <a:r>
+                <a:rPr lang="en-US" sz="1800" dirty="0"/>
+                <a:t>, S. Smith and J. </a:t>
+              </a:r>
+              <a:r>
+                <a:rPr lang="en-US" sz="1800" dirty="0" err="1"/>
+                <a:t>Carette</a:t>
+              </a:r>
+              <a:r>
+                <a:rPr lang="en-US" sz="1800" dirty="0"/>
+                <a:t>, "POSITION PAPER: A Knowledge-	Based Approach to Scientific Software Development," 2016 IEEE/ACM 	International Workshop on Software Engineering for Science 	(SE4Science), Austin, TX, USA, 2016, pp. 23-26.</a:t>
+              </a:r>
+            </a:p>
           </p:txBody>
         </p:sp>
       </p:grpSp>
@@ -11965,8 +12116,8 @@
         </p:nvSpPr>
         <p:spPr>
           <a:xfrm>
-            <a:off x="24318891" y="4531142"/>
-            <a:ext cx="7762857" cy="3447098"/>
+            <a:off x="24318891" y="4607342"/>
+            <a:ext cx="7762857" cy="2862322"/>
           </a:xfrm>
           <a:prstGeom prst="rect">
             <a:avLst/>
@@ -11988,7 +12139,7 @@
                 <a:ea typeface="Verdana" panose="020B0604030504040204" pitchFamily="34" charset="0"/>
                 <a:cs typeface="Arial" panose="020B0604020202020204" pitchFamily="34" charset="0"/>
               </a:rPr>
-              <a:t>The adoption of </a:t>
+              <a:t>Adopting </a:t>
             </a:r>
             <a:r>
               <a:rPr lang="en-US" sz="1800" dirty="0" err="1">
@@ -12002,21 +12153,7 @@
                 <a:ea typeface="Verdana" panose="020B0604030504040204" pitchFamily="34" charset="0"/>
                 <a:cs typeface="Arial" panose="020B0604020202020204" pitchFamily="34" charset="0"/>
               </a:rPr>
-              <a:t> for </a:t>
-            </a:r>
-            <a:r>
-              <a:rPr lang="en-US" sz="1800">
-                <a:ea typeface="Verdana" panose="020B0604030504040204" pitchFamily="34" charset="0"/>
-                <a:cs typeface="Arial" panose="020B0604020202020204" pitchFamily="34" charset="0"/>
-              </a:rPr>
-              <a:t>generating documents </a:t>
-            </a:r>
-            <a:r>
-              <a:rPr lang="en-US" sz="1800" dirty="0">
-                <a:ea typeface="Verdana" panose="020B0604030504040204" pitchFamily="34" charset="0"/>
-                <a:cs typeface="Arial" panose="020B0604020202020204" pitchFamily="34" charset="0"/>
-              </a:rPr>
-              <a:t>within </a:t>
+              <a:t> in </a:t>
             </a:r>
             <a:r>
               <a:rPr lang="en-US" sz="1800" dirty="0" err="1">
@@ -12030,11 +12167,37 @@
                 <a:ea typeface="Verdana" panose="020B0604030504040204" pitchFamily="34" charset="0"/>
                 <a:cs typeface="Arial" panose="020B0604020202020204" pitchFamily="34" charset="0"/>
               </a:rPr>
-              <a:t> not only enhances the quality and usability of the documentation but also aligns with the framework’s goals of achieving complete traceability and eliminating knowledge duplication.</a:t>
+              <a:t> enhances documentation quality and usability, aligning with goals of </a:t>
             </a:r>
-          </a:p>
-          <a:p>
-            <a:endParaRPr lang="en-US" sz="500" dirty="0">
+            <a:r>
+              <a:rPr lang="en-US" sz="1800" b="1" dirty="0">
+                <a:ea typeface="Verdana" panose="020B0604030504040204" pitchFamily="34" charset="0"/>
+                <a:cs typeface="Arial" panose="020B0604020202020204" pitchFamily="34" charset="0"/>
+              </a:rPr>
+              <a:t>improved traceability </a:t>
+            </a:r>
+            <a:r>
+              <a:rPr lang="en-US" sz="1800" dirty="0">
+                <a:ea typeface="Verdana" panose="020B0604030504040204" pitchFamily="34" charset="0"/>
+                <a:cs typeface="Arial" panose="020B0604020202020204" pitchFamily="34" charset="0"/>
+              </a:rPr>
+              <a:t>and </a:t>
+            </a:r>
+            <a:r>
+              <a:rPr lang="en-US" sz="1800" b="1" dirty="0">
+                <a:ea typeface="Verdana" panose="020B0604030504040204" pitchFamily="34" charset="0"/>
+                <a:cs typeface="Arial" panose="020B0604020202020204" pitchFamily="34" charset="0"/>
+              </a:rPr>
+              <a:t>eliminating duplication</a:t>
+            </a:r>
+            <a:r>
+              <a:rPr lang="en-US" sz="1800" dirty="0">
+                <a:ea typeface="Verdana" panose="020B0604030504040204" pitchFamily="34" charset="0"/>
+                <a:cs typeface="Arial" panose="020B0604020202020204" pitchFamily="34" charset="0"/>
+              </a:rPr>
+              <a:t>.</a:t>
+            </a:r>
+            <a:endParaRPr lang="en-US" sz="800" dirty="0">
               <a:ea typeface="Verdana" panose="020B0604030504040204" pitchFamily="34" charset="0"/>
               <a:cs typeface="Arial" panose="020B0604020202020204" pitchFamily="34" charset="0"/>
             </a:endParaRPr>
@@ -12065,10 +12228,7 @@
               </a:rPr>
               <a:t> documentation.</a:t>
             </a:r>
-          </a:p>
-          <a:p>
-            <a:pPr lvl="1"/>
-            <a:endParaRPr lang="en-US" sz="500" dirty="0">
+            <a:endParaRPr lang="en-US" sz="800" dirty="0">
               <a:ea typeface="Verdana" panose="020B0604030504040204" pitchFamily="34" charset="0"/>
               <a:cs typeface="Arial" panose="020B0604020202020204" pitchFamily="34" charset="0"/>
             </a:endParaRPr>
@@ -12102,7 +12262,7 @@
           </a:p>
           <a:p>
             <a:pPr lvl="1"/>
-            <a:endParaRPr lang="en-US" sz="1000" dirty="0">
+            <a:endParaRPr lang="en-US" sz="1800" dirty="0">
               <a:ea typeface="Verdana" panose="020B0604030504040204" pitchFamily="34" charset="0"/>
               <a:cs typeface="Arial" panose="020B0604020202020204" pitchFamily="34" charset="0"/>
             </a:endParaRPr>
@@ -12150,10 +12310,10 @@
         </p:nvGrpSpPr>
         <p:grpSpPr>
           <a:xfrm>
-            <a:off x="9473975" y="4735581"/>
-            <a:ext cx="13970449" cy="16578746"/>
-            <a:chOff x="9473975" y="4735581"/>
-            <a:chExt cx="13970449" cy="16578746"/>
+            <a:off x="9598855" y="4735581"/>
+            <a:ext cx="13845569" cy="16578746"/>
+            <a:chOff x="9598855" y="4735581"/>
+            <a:chExt cx="13845569" cy="16578746"/>
           </a:xfrm>
         </p:grpSpPr>
         <p:pic>
@@ -12170,16 +12330,15 @@
             </p:cNvPicPr>
             <p:nvPr/>
           </p:nvPicPr>
-          <p:blipFill>
+          <p:blipFill rotWithShape="1">
             <a:blip r:embed="rId11"/>
-            <a:stretch>
-              <a:fillRect/>
-            </a:stretch>
+            <a:srcRect t="14865"/>
+            <a:stretch/>
           </p:blipFill>
           <p:spPr>
             <a:xfrm>
-              <a:off x="13301331" y="10230487"/>
-              <a:ext cx="3348049" cy="1832702"/>
+              <a:off x="13301331" y="10214400"/>
+              <a:ext cx="3348049" cy="1848789"/>
             </a:xfrm>
             <a:prstGeom prst="rect">
               <a:avLst/>
@@ -12215,8 +12374,8 @@
           </p:blipFill>
           <p:spPr>
             <a:xfrm>
-              <a:off x="9473975" y="16262123"/>
-              <a:ext cx="3546841" cy="3576878"/>
+              <a:off x="9672767" y="16262123"/>
+              <a:ext cx="3348049" cy="3576878"/>
             </a:xfrm>
             <a:prstGeom prst="rect">
               <a:avLst/>
@@ -12250,8 +12409,8 @@
           </p:blipFill>
           <p:spPr>
             <a:xfrm>
-              <a:off x="13429582" y="16262125"/>
-              <a:ext cx="3083929" cy="3576878"/>
+              <a:off x="13301331" y="16262125"/>
+              <a:ext cx="3358335" cy="3576878"/>
             </a:xfrm>
             <a:prstGeom prst="rect">
               <a:avLst/>
@@ -12280,8 +12439,8 @@
           </p:blipFill>
           <p:spPr>
             <a:xfrm>
-              <a:off x="17179328" y="16267016"/>
-              <a:ext cx="2838754" cy="3576878"/>
+              <a:off x="16852793" y="16267016"/>
+              <a:ext cx="3320811" cy="3576878"/>
             </a:xfrm>
             <a:prstGeom prst="rect">
               <a:avLst/>
@@ -12302,7 +12461,7 @@
           </p:nvSpPr>
           <p:spPr>
             <a:xfrm>
-              <a:off x="11161225" y="15514552"/>
+              <a:off x="11271723" y="15528174"/>
               <a:ext cx="150136" cy="515561"/>
             </a:xfrm>
             <a:prstGeom prst="downArrow">
@@ -12356,61 +12515,7 @@
           </p:nvSpPr>
           <p:spPr>
             <a:xfrm>
-              <a:off x="14896477" y="15517970"/>
-              <a:ext cx="150136" cy="515561"/>
-            </a:xfrm>
-            <a:prstGeom prst="downArrow">
-              <a:avLst/>
-            </a:prstGeom>
-            <a:solidFill>
-              <a:srgbClr val="7A003C"/>
-            </a:solidFill>
-            <a:ln>
-              <a:solidFill>
-                <a:srgbClr val="7A003C"/>
-              </a:solidFill>
-            </a:ln>
-          </p:spPr>
-          <p:style>
-            <a:lnRef idx="2">
-              <a:schemeClr val="accent1">
-                <a:shade val="15000"/>
-              </a:schemeClr>
-            </a:lnRef>
-            <a:fillRef idx="1">
-              <a:schemeClr val="accent1"/>
-            </a:fillRef>
-            <a:effectRef idx="0">
-              <a:schemeClr val="accent1"/>
-            </a:effectRef>
-            <a:fontRef idx="minor">
-              <a:schemeClr val="lt1"/>
-            </a:fontRef>
-          </p:style>
-          <p:txBody>
-            <a:bodyPr rtlCol="0" anchor="ctr"/>
-            <a:lstStyle/>
-            <a:p>
-              <a:pPr algn="ctr"/>
-              <a:endParaRPr lang="en-CA"/>
-            </a:p>
-          </p:txBody>
-        </p:sp>
-        <p:sp>
-          <p:nvSpPr>
-            <p:cNvPr id="74" name="Arrow: Down 73">
-              <a:extLst>
-                <a:ext uri="{FF2B5EF4-FFF2-40B4-BE49-F238E27FC236}">
-                  <a16:creationId xmlns:a16="http://schemas.microsoft.com/office/drawing/2014/main" id="{27DF02F4-8B93-7909-EA33-8AE54A53E9CA}"/>
-                </a:ext>
-              </a:extLst>
-            </p:cNvPr>
-            <p:cNvSpPr/>
-            <p:nvPr/>
-          </p:nvSpPr>
-          <p:spPr>
-            <a:xfrm>
-              <a:off x="18442420" y="15512729"/>
+              <a:off x="14905430" y="15528173"/>
               <a:ext cx="150136" cy="515561"/>
             </a:xfrm>
             <a:prstGeom prst="downArrow">
@@ -12464,16 +12569,15 @@
             </p:cNvPicPr>
             <p:nvPr/>
           </p:nvPicPr>
-          <p:blipFill>
+          <p:blipFill rotWithShape="1">
             <a:blip r:embed="rId15"/>
-            <a:stretch>
-              <a:fillRect/>
-            </a:stretch>
+            <a:srcRect t="12040"/>
+            <a:stretch/>
           </p:blipFill>
           <p:spPr>
             <a:xfrm>
-              <a:off x="9648209" y="12885373"/>
-              <a:ext cx="3298157" cy="2424413"/>
+              <a:off x="9672767" y="12884550"/>
+              <a:ext cx="3348049" cy="2425236"/>
             </a:xfrm>
             <a:prstGeom prst="rect">
               <a:avLst/>
@@ -12499,16 +12603,15 @@
             </p:cNvPicPr>
             <p:nvPr/>
           </p:nvPicPr>
-          <p:blipFill>
+          <p:blipFill rotWithShape="1">
             <a:blip r:embed="rId16"/>
-            <a:stretch>
-              <a:fillRect/>
-            </a:stretch>
+            <a:srcRect t="12618"/>
+            <a:stretch/>
           </p:blipFill>
           <p:spPr>
             <a:xfrm>
-              <a:off x="13323505" y="12885373"/>
-              <a:ext cx="3298157" cy="2424413"/>
+              <a:off x="13301331" y="12884550"/>
+              <a:ext cx="3341739" cy="2425236"/>
             </a:xfrm>
             <a:prstGeom prst="rect">
               <a:avLst/>
@@ -12537,16 +12640,15 @@
             </p:cNvPicPr>
             <p:nvPr/>
           </p:nvPicPr>
-          <p:blipFill>
+          <p:blipFill rotWithShape="1">
             <a:blip r:embed="rId17"/>
-            <a:stretch>
-              <a:fillRect/>
-            </a:stretch>
+            <a:srcRect t="12040"/>
+            <a:stretch/>
           </p:blipFill>
           <p:spPr>
             <a:xfrm>
-              <a:off x="16956796" y="12885372"/>
-              <a:ext cx="3198974" cy="2424413"/>
+              <a:off x="16852794" y="12884550"/>
+              <a:ext cx="3320811" cy="2425235"/>
             </a:xfrm>
             <a:prstGeom prst="rect">
               <a:avLst/>
@@ -12673,16 +12775,15 @@
             </p:cNvPicPr>
             <p:nvPr/>
           </p:nvPicPr>
-          <p:blipFill>
+          <p:blipFill rotWithShape="1">
             <a:blip r:embed="rId18"/>
-            <a:stretch>
-              <a:fillRect/>
-            </a:stretch>
+            <a:srcRect t="13698"/>
+            <a:stretch/>
           </p:blipFill>
           <p:spPr>
             <a:xfrm>
-              <a:off x="9672768" y="10220315"/>
-              <a:ext cx="3348049" cy="1807944"/>
+              <a:off x="9672768" y="10214400"/>
+              <a:ext cx="3348049" cy="1842874"/>
             </a:xfrm>
             <a:prstGeom prst="rect">
               <a:avLst/>
@@ -12708,16 +12809,15 @@
             </p:cNvPicPr>
             <p:nvPr/>
           </p:nvPicPr>
-          <p:blipFill>
+          <p:blipFill rotWithShape="1">
             <a:blip r:embed="rId19"/>
-            <a:stretch>
-              <a:fillRect/>
-            </a:stretch>
+            <a:srcRect t="18930"/>
+            <a:stretch/>
           </p:blipFill>
           <p:spPr>
             <a:xfrm>
-              <a:off x="16852794" y="10237780"/>
-              <a:ext cx="3320811" cy="1825410"/>
+              <a:off x="16852794" y="10221296"/>
+              <a:ext cx="3320811" cy="1842875"/>
             </a:xfrm>
             <a:prstGeom prst="rect">
               <a:avLst/>
@@ -12770,330 +12870,6 @@
             </a:effectRef>
             <a:fontRef idx="minor">
               <a:schemeClr val="tx1"/>
-            </a:fontRef>
-          </p:style>
-          <p:txBody>
-            <a:bodyPr rtlCol="0" anchor="ctr"/>
-            <a:lstStyle/>
-            <a:p>
-              <a:pPr algn="ctr"/>
-              <a:endParaRPr lang="en-CA"/>
-            </a:p>
-          </p:txBody>
-        </p:sp>
-        <p:sp>
-          <p:nvSpPr>
-            <p:cNvPr id="97" name="Arrow: Down 96">
-              <a:extLst>
-                <a:ext uri="{FF2B5EF4-FFF2-40B4-BE49-F238E27FC236}">
-                  <a16:creationId xmlns:a16="http://schemas.microsoft.com/office/drawing/2014/main" id="{CBDF711D-554B-9A7A-690E-529E7D25C308}"/>
-                </a:ext>
-              </a:extLst>
-            </p:cNvPr>
-            <p:cNvSpPr/>
-            <p:nvPr/>
-          </p:nvSpPr>
-          <p:spPr>
-            <a:xfrm>
-              <a:off x="11165159" y="12178382"/>
-              <a:ext cx="150136" cy="515561"/>
-            </a:xfrm>
-            <a:prstGeom prst="downArrow">
-              <a:avLst/>
-            </a:prstGeom>
-            <a:solidFill>
-              <a:srgbClr val="7A003C"/>
-            </a:solidFill>
-            <a:ln>
-              <a:solidFill>
-                <a:srgbClr val="7A003C"/>
-              </a:solidFill>
-            </a:ln>
-          </p:spPr>
-          <p:style>
-            <a:lnRef idx="2">
-              <a:schemeClr val="accent1">
-                <a:shade val="15000"/>
-              </a:schemeClr>
-            </a:lnRef>
-            <a:fillRef idx="1">
-              <a:schemeClr val="accent1"/>
-            </a:fillRef>
-            <a:effectRef idx="0">
-              <a:schemeClr val="accent1"/>
-            </a:effectRef>
-            <a:fontRef idx="minor">
-              <a:schemeClr val="lt1"/>
-            </a:fontRef>
-          </p:style>
-          <p:txBody>
-            <a:bodyPr rtlCol="0" anchor="ctr"/>
-            <a:lstStyle/>
-            <a:p>
-              <a:pPr algn="ctr"/>
-              <a:endParaRPr lang="en-CA"/>
-            </a:p>
-          </p:txBody>
-        </p:sp>
-        <p:sp>
-          <p:nvSpPr>
-            <p:cNvPr id="98" name="Arrow: Down 97">
-              <a:extLst>
-                <a:ext uri="{FF2B5EF4-FFF2-40B4-BE49-F238E27FC236}">
-                  <a16:creationId xmlns:a16="http://schemas.microsoft.com/office/drawing/2014/main" id="{DBAADFFC-32F9-6F3A-F27E-0B8CC562A7F7}"/>
-                </a:ext>
-              </a:extLst>
-            </p:cNvPr>
-            <p:cNvSpPr/>
-            <p:nvPr/>
-          </p:nvSpPr>
-          <p:spPr>
-            <a:xfrm>
-              <a:off x="14900410" y="12181800"/>
-              <a:ext cx="150136" cy="515561"/>
-            </a:xfrm>
-            <a:prstGeom prst="downArrow">
-              <a:avLst/>
-            </a:prstGeom>
-            <a:solidFill>
-              <a:srgbClr val="7A003C"/>
-            </a:solidFill>
-            <a:ln>
-              <a:solidFill>
-                <a:srgbClr val="7A003C"/>
-              </a:solidFill>
-            </a:ln>
-          </p:spPr>
-          <p:style>
-            <a:lnRef idx="2">
-              <a:schemeClr val="accent1">
-                <a:shade val="15000"/>
-              </a:schemeClr>
-            </a:lnRef>
-            <a:fillRef idx="1">
-              <a:schemeClr val="accent1"/>
-            </a:fillRef>
-            <a:effectRef idx="0">
-              <a:schemeClr val="accent1"/>
-            </a:effectRef>
-            <a:fontRef idx="minor">
-              <a:schemeClr val="lt1"/>
-            </a:fontRef>
-          </p:style>
-          <p:txBody>
-            <a:bodyPr rtlCol="0" anchor="ctr"/>
-            <a:lstStyle/>
-            <a:p>
-              <a:pPr algn="ctr"/>
-              <a:endParaRPr lang="en-CA"/>
-            </a:p>
-          </p:txBody>
-        </p:sp>
-        <p:sp>
-          <p:nvSpPr>
-            <p:cNvPr id="99" name="Arrow: Down 98">
-              <a:extLst>
-                <a:ext uri="{FF2B5EF4-FFF2-40B4-BE49-F238E27FC236}">
-                  <a16:creationId xmlns:a16="http://schemas.microsoft.com/office/drawing/2014/main" id="{7FAA080E-0B90-0D90-BD60-5FCA4CB6D73A}"/>
-                </a:ext>
-              </a:extLst>
-            </p:cNvPr>
-            <p:cNvSpPr/>
-            <p:nvPr/>
-          </p:nvSpPr>
-          <p:spPr>
-            <a:xfrm>
-              <a:off x="18446353" y="12176559"/>
-              <a:ext cx="150136" cy="515561"/>
-            </a:xfrm>
-            <a:prstGeom prst="downArrow">
-              <a:avLst/>
-            </a:prstGeom>
-            <a:solidFill>
-              <a:srgbClr val="7A003C"/>
-            </a:solidFill>
-            <a:ln>
-              <a:solidFill>
-                <a:srgbClr val="7A003C"/>
-              </a:solidFill>
-            </a:ln>
-          </p:spPr>
-          <p:style>
-            <a:lnRef idx="2">
-              <a:schemeClr val="accent1">
-                <a:shade val="15000"/>
-              </a:schemeClr>
-            </a:lnRef>
-            <a:fillRef idx="1">
-              <a:schemeClr val="accent1"/>
-            </a:fillRef>
-            <a:effectRef idx="0">
-              <a:schemeClr val="accent1"/>
-            </a:effectRef>
-            <a:fontRef idx="minor">
-              <a:schemeClr val="lt1"/>
-            </a:fontRef>
-          </p:style>
-          <p:txBody>
-            <a:bodyPr rtlCol="0" anchor="ctr"/>
-            <a:lstStyle/>
-            <a:p>
-              <a:pPr algn="ctr"/>
-              <a:endParaRPr lang="en-CA"/>
-            </a:p>
-          </p:txBody>
-        </p:sp>
-        <p:sp>
-          <p:nvSpPr>
-            <p:cNvPr id="100" name="Arrow: Down 99">
-              <a:extLst>
-                <a:ext uri="{FF2B5EF4-FFF2-40B4-BE49-F238E27FC236}">
-                  <a16:creationId xmlns:a16="http://schemas.microsoft.com/office/drawing/2014/main" id="{9F810912-4502-9B89-DB00-BA1056252010}"/>
-                </a:ext>
-              </a:extLst>
-            </p:cNvPr>
-            <p:cNvSpPr/>
-            <p:nvPr/>
-          </p:nvSpPr>
-          <p:spPr>
-            <a:xfrm rot="1901763">
-              <a:off x="12788655" y="9470565"/>
-              <a:ext cx="150136" cy="515561"/>
-            </a:xfrm>
-            <a:prstGeom prst="downArrow">
-              <a:avLst/>
-            </a:prstGeom>
-            <a:solidFill>
-              <a:srgbClr val="7A003C"/>
-            </a:solidFill>
-            <a:ln>
-              <a:solidFill>
-                <a:srgbClr val="7A003C"/>
-              </a:solidFill>
-            </a:ln>
-          </p:spPr>
-          <p:style>
-            <a:lnRef idx="2">
-              <a:schemeClr val="accent1">
-                <a:shade val="15000"/>
-              </a:schemeClr>
-            </a:lnRef>
-            <a:fillRef idx="1">
-              <a:schemeClr val="accent1"/>
-            </a:fillRef>
-            <a:effectRef idx="0">
-              <a:schemeClr val="accent1"/>
-            </a:effectRef>
-            <a:fontRef idx="minor">
-              <a:schemeClr val="lt1"/>
-            </a:fontRef>
-          </p:style>
-          <p:txBody>
-            <a:bodyPr rtlCol="0" anchor="ctr"/>
-            <a:lstStyle/>
-            <a:p>
-              <a:pPr algn="ctr"/>
-              <a:endParaRPr lang="en-CA"/>
-            </a:p>
-          </p:txBody>
-        </p:sp>
-        <p:sp>
-          <p:nvSpPr>
-            <p:cNvPr id="101" name="Arrow: Down 100">
-              <a:extLst>
-                <a:ext uri="{FF2B5EF4-FFF2-40B4-BE49-F238E27FC236}">
-                  <a16:creationId xmlns:a16="http://schemas.microsoft.com/office/drawing/2014/main" id="{A8520A3D-DBCF-B1D9-0F52-7C39B7E4E1D7}"/>
-                </a:ext>
-              </a:extLst>
-            </p:cNvPr>
-            <p:cNvSpPr/>
-            <p:nvPr/>
-          </p:nvSpPr>
-          <p:spPr>
-            <a:xfrm>
-              <a:off x="14871239" y="9510827"/>
-              <a:ext cx="150136" cy="515561"/>
-            </a:xfrm>
-            <a:prstGeom prst="downArrow">
-              <a:avLst/>
-            </a:prstGeom>
-            <a:solidFill>
-              <a:srgbClr val="7A003C"/>
-            </a:solidFill>
-            <a:ln>
-              <a:solidFill>
-                <a:srgbClr val="7A003C"/>
-              </a:solidFill>
-            </a:ln>
-          </p:spPr>
-          <p:style>
-            <a:lnRef idx="2">
-              <a:schemeClr val="accent1">
-                <a:shade val="15000"/>
-              </a:schemeClr>
-            </a:lnRef>
-            <a:fillRef idx="1">
-              <a:schemeClr val="accent1"/>
-            </a:fillRef>
-            <a:effectRef idx="0">
-              <a:schemeClr val="accent1"/>
-            </a:effectRef>
-            <a:fontRef idx="minor">
-              <a:schemeClr val="lt1"/>
-            </a:fontRef>
-          </p:style>
-          <p:txBody>
-            <a:bodyPr rtlCol="0" anchor="ctr"/>
-            <a:lstStyle/>
-            <a:p>
-              <a:pPr algn="ctr"/>
-              <a:endParaRPr lang="en-CA" dirty="0"/>
-            </a:p>
-          </p:txBody>
-        </p:sp>
-        <p:sp>
-          <p:nvSpPr>
-            <p:cNvPr id="102" name="Arrow: Down 101">
-              <a:extLst>
-                <a:ext uri="{FF2B5EF4-FFF2-40B4-BE49-F238E27FC236}">
-                  <a16:creationId xmlns:a16="http://schemas.microsoft.com/office/drawing/2014/main" id="{4107020F-43FA-3997-23D6-CB026516601D}"/>
-                </a:ext>
-              </a:extLst>
-            </p:cNvPr>
-            <p:cNvSpPr/>
-            <p:nvPr/>
-          </p:nvSpPr>
-          <p:spPr>
-            <a:xfrm rot="19899391">
-              <a:off x="16777726" y="9510827"/>
-              <a:ext cx="150136" cy="515561"/>
-            </a:xfrm>
-            <a:prstGeom prst="downArrow">
-              <a:avLst/>
-            </a:prstGeom>
-            <a:solidFill>
-              <a:srgbClr val="7A003C"/>
-            </a:solidFill>
-            <a:ln>
-              <a:solidFill>
-                <a:srgbClr val="7A003C"/>
-              </a:solidFill>
-            </a:ln>
-          </p:spPr>
-          <p:style>
-            <a:lnRef idx="2">
-              <a:schemeClr val="accent1">
-                <a:shade val="15000"/>
-              </a:schemeClr>
-            </a:lnRef>
-            <a:fillRef idx="1">
-              <a:schemeClr val="accent1"/>
-            </a:fillRef>
-            <a:effectRef idx="0">
-              <a:schemeClr val="accent1"/>
-            </a:effectRef>
-            <a:fontRef idx="minor">
-              <a:schemeClr val="lt1"/>
             </a:fontRef>
           </p:style>
           <p:txBody>
@@ -13168,7 +12944,7 @@
           </p:nvSpPr>
           <p:spPr>
             <a:xfrm>
-              <a:off x="10578418" y="20043655"/>
+              <a:off x="10647003" y="19944131"/>
               <a:ext cx="1399575" cy="400110"/>
             </a:xfrm>
             <a:prstGeom prst="rect">
@@ -13182,6 +12958,7 @@
             </a:bodyPr>
             <a:lstStyle/>
             <a:p>
+              <a:pPr algn="ctr"/>
               <a:r>
                 <a:rPr lang="en-CA" sz="2000" b="1" dirty="0" err="1">
                   <a:solidFill>
@@ -13216,7 +12993,7 @@
           </p:nvSpPr>
           <p:spPr>
             <a:xfrm>
-              <a:off x="14539248" y="20038073"/>
+              <a:off x="14434625" y="19971765"/>
               <a:ext cx="1044148" cy="400110"/>
             </a:xfrm>
             <a:prstGeom prst="rect">
@@ -13230,6 +13007,7 @@
             </a:bodyPr>
             <a:lstStyle/>
             <a:p>
+              <a:pPr algn="ctr"/>
               <a:r>
                 <a:rPr lang="en-CA" sz="2000" b="1" dirty="0">
                   <a:solidFill>
@@ -13257,7 +13035,7 @@
           </p:nvSpPr>
           <p:spPr>
             <a:xfrm>
-              <a:off x="18216156" y="20036324"/>
+              <a:off x="17930733" y="19971765"/>
               <a:ext cx="1164930" cy="400110"/>
             </a:xfrm>
             <a:prstGeom prst="rect">
@@ -13271,6 +13049,7 @@
             </a:bodyPr>
             <a:lstStyle/>
             <a:p>
+              <a:pPr algn="ctr"/>
               <a:r>
                 <a:rPr lang="en-CA" sz="2000" b="1" dirty="0">
                   <a:solidFill>
@@ -13298,16 +13077,15 @@
             </p:cNvPicPr>
             <p:nvPr/>
           </p:nvPicPr>
-          <p:blipFill>
+          <p:blipFill rotWithShape="1">
             <a:blip r:embed="rId20"/>
-            <a:stretch>
-              <a:fillRect/>
-            </a:stretch>
+            <a:srcRect t="12921"/>
+            <a:stretch/>
           </p:blipFill>
           <p:spPr>
             <a:xfrm>
-              <a:off x="12972431" y="7410968"/>
-              <a:ext cx="3881975" cy="1891675"/>
+              <a:off x="12652330" y="7398834"/>
+              <a:ext cx="4587239" cy="2011805"/>
             </a:xfrm>
             <a:prstGeom prst="rect">
               <a:avLst/>
@@ -13322,60 +13100,6 @@
             </a:ln>
           </p:spPr>
         </p:pic>
-        <p:sp>
-          <p:nvSpPr>
-            <p:cNvPr id="113" name="Arrow: Down 112">
-              <a:extLst>
-                <a:ext uri="{FF2B5EF4-FFF2-40B4-BE49-F238E27FC236}">
-                  <a16:creationId xmlns:a16="http://schemas.microsoft.com/office/drawing/2014/main" id="{7BDFD38A-2BC4-CAF1-D352-DB41E304DA8F}"/>
-                </a:ext>
-              </a:extLst>
-            </p:cNvPr>
-            <p:cNvSpPr/>
-            <p:nvPr/>
-          </p:nvSpPr>
-          <p:spPr>
-            <a:xfrm>
-              <a:off x="14870882" y="6734613"/>
-              <a:ext cx="150136" cy="515561"/>
-            </a:xfrm>
-            <a:prstGeom prst="downArrow">
-              <a:avLst/>
-            </a:prstGeom>
-            <a:solidFill>
-              <a:srgbClr val="7A003C"/>
-            </a:solidFill>
-            <a:ln>
-              <a:solidFill>
-                <a:srgbClr val="7A003C"/>
-              </a:solidFill>
-            </a:ln>
-          </p:spPr>
-          <p:style>
-            <a:lnRef idx="2">
-              <a:schemeClr val="accent1">
-                <a:shade val="15000"/>
-              </a:schemeClr>
-            </a:lnRef>
-            <a:fillRef idx="1">
-              <a:schemeClr val="accent1"/>
-            </a:fillRef>
-            <a:effectRef idx="0">
-              <a:schemeClr val="accent1"/>
-            </a:effectRef>
-            <a:fontRef idx="minor">
-              <a:schemeClr val="lt1"/>
-            </a:fontRef>
-          </p:style>
-          <p:txBody>
-            <a:bodyPr rtlCol="0" anchor="ctr"/>
-            <a:lstStyle/>
-            <a:p>
-              <a:pPr algn="ctr"/>
-              <a:endParaRPr lang="en-CA"/>
-            </a:p>
-          </p:txBody>
-        </p:sp>
         <p:sp>
           <p:nvSpPr>
             <p:cNvPr id="114" name="Right Brace 113">
@@ -13729,16 +13453,15 @@
             </p:cNvPicPr>
             <p:nvPr/>
           </p:nvPicPr>
-          <p:blipFill>
+          <p:blipFill rotWithShape="1">
             <a:blip r:embed="rId21"/>
-            <a:stretch>
-              <a:fillRect/>
-            </a:stretch>
+            <a:srcRect t="20096" b="8878"/>
+            <a:stretch/>
           </p:blipFill>
           <p:spPr>
             <a:xfrm>
-              <a:off x="10643754" y="4735581"/>
-              <a:ext cx="8655582" cy="1840236"/>
+              <a:off x="9845037" y="4735581"/>
+              <a:ext cx="10228432" cy="1826040"/>
             </a:xfrm>
             <a:prstGeom prst="rect">
               <a:avLst/>
@@ -13768,7 +13491,7 @@
         </p:nvSpPr>
         <p:spPr>
           <a:xfrm>
-            <a:off x="24345901" y="8028120"/>
+            <a:off x="24345901" y="7592694"/>
             <a:ext cx="7762857" cy="584775"/>
           </a:xfrm>
           <a:prstGeom prst="rect">
@@ -13825,7 +13548,7 @@
         </p:nvSpPr>
         <p:spPr>
           <a:xfrm>
-            <a:off x="24778321" y="8037094"/>
+            <a:off x="24778321" y="7601668"/>
             <a:ext cx="6898013" cy="584775"/>
           </a:xfrm>
           <a:prstGeom prst="rect">
@@ -13868,14 +13591,14 @@
           <p:nvPr>
             <p:extLst>
               <p:ext uri="{D42A27DB-BD31-4B8C-83A1-F6EECF244321}">
-                <p14:modId xmlns:p14="http://schemas.microsoft.com/office/powerpoint/2010/main" val="2434413368"/>
+                <p14:modId xmlns:p14="http://schemas.microsoft.com/office/powerpoint/2010/main" val="2780746030"/>
               </p:ext>
             </p:extLst>
           </p:nvPr>
         </p:nvGraphicFramePr>
         <p:xfrm>
-          <a:off x="24345897" y="11065096"/>
-          <a:ext cx="7762857" cy="3622750"/>
+          <a:off x="24345897" y="10592310"/>
+          <a:ext cx="7762857" cy="4095536"/>
         </p:xfrm>
         <a:graphic>
           <a:graphicData uri="http://schemas.openxmlformats.org/drawingml/2006/chart">
@@ -13954,7 +13677,7 @@
         </p:nvSpPr>
         <p:spPr>
           <a:xfrm>
-            <a:off x="24324728" y="8710438"/>
+            <a:off x="24324728" y="8275012"/>
             <a:ext cx="7762857" cy="2308324"/>
           </a:xfrm>
           <a:prstGeom prst="rect">
@@ -13983,14 +13706,14 @@
                 <a:ea typeface="Verdana" panose="020B0604030504040204" pitchFamily="34" charset="0"/>
                 <a:cs typeface="Arial" panose="020B0604020202020204" pitchFamily="34" charset="0"/>
               </a:rPr>
-              <a:t>The rendering of the multiplication operator in LaTeX was updated, requiring only a </a:t>
+              <a:t>Updating the multiplication operator in LaTeX required just </a:t>
             </a:r>
             <a:r>
               <a:rPr lang="en-US" sz="1800" b="1" dirty="0">
                 <a:ea typeface="Verdana" panose="020B0604030504040204" pitchFamily="34" charset="0"/>
                 <a:cs typeface="Arial" panose="020B0604020202020204" pitchFamily="34" charset="0"/>
               </a:rPr>
-              <a:t>4-line change of </a:t>
+              <a:t>a 4-line change in </a:t>
             </a:r>
             <a:r>
               <a:rPr lang="en-US" sz="1800" b="1" dirty="0" err="1">
@@ -14011,35 +13734,35 @@
                 <a:ea typeface="Verdana" panose="020B0604030504040204" pitchFamily="34" charset="0"/>
                 <a:cs typeface="Arial" panose="020B0604020202020204" pitchFamily="34" charset="0"/>
               </a:rPr>
-              <a:t>. This small adjustment resulted in approximately </a:t>
+              <a:t>. This minor adjustment led to around </a:t>
             </a:r>
             <a:r>
               <a:rPr lang="en-US" sz="1800" b="1" dirty="0">
                 <a:ea typeface="Verdana" panose="020B0604030504040204" pitchFamily="34" charset="0"/>
                 <a:cs typeface="Arial" panose="020B0604020202020204" pitchFamily="34" charset="0"/>
               </a:rPr>
-              <a:t>1360 modifications</a:t>
+              <a:t>1,360 modifications </a:t>
             </a:r>
             <a:r>
               <a:rPr lang="en-US" sz="1800" dirty="0">
                 <a:ea typeface="Verdana" panose="020B0604030504040204" pitchFamily="34" charset="0"/>
                 <a:cs typeface="Arial" panose="020B0604020202020204" pitchFamily="34" charset="0"/>
               </a:rPr>
-              <a:t> across </a:t>
+              <a:t>across </a:t>
             </a:r>
             <a:r>
               <a:rPr lang="en-US" sz="1800" b="1" dirty="0">
                 <a:ea typeface="Verdana" panose="020B0604030504040204" pitchFamily="34" charset="0"/>
                 <a:cs typeface="Arial" panose="020B0604020202020204" pitchFamily="34" charset="0"/>
               </a:rPr>
-              <a:t>67 files </a:t>
+              <a:t>67 generated files</a:t>
             </a:r>
             <a:r>
               <a:rPr lang="en-US" sz="1800" dirty="0">
                 <a:ea typeface="Verdana" panose="020B0604030504040204" pitchFamily="34" charset="0"/>
                 <a:cs typeface="Arial" panose="020B0604020202020204" pitchFamily="34" charset="0"/>
               </a:rPr>
-              <a:t>of generated code, showcasing the efficiency of </a:t>
+              <a:t>, highlighting </a:t>
             </a:r>
             <a:r>
               <a:rPr lang="en-US" sz="1800" dirty="0" err="1">
@@ -14053,7 +13776,7 @@
                 <a:ea typeface="Verdana" panose="020B0604030504040204" pitchFamily="34" charset="0"/>
                 <a:cs typeface="Arial" panose="020B0604020202020204" pitchFamily="34" charset="0"/>
               </a:rPr>
-              <a:t> generative approach.</a:t>
+              <a:t> efficiency.</a:t>
             </a:r>
           </a:p>
           <a:p>
@@ -14068,7 +13791,7 @@
                 <a:ea typeface="Verdana" panose="020B0604030504040204" pitchFamily="34" charset="0"/>
                 <a:cs typeface="Arial" panose="020B0604020202020204" pitchFamily="34" charset="0"/>
               </a:rPr>
-              <a:t>In the graph below, software documentation generated using </a:t>
+              <a:t>The graph below shows that software documentation generated with </a:t>
             </a:r>
             <a:r>
               <a:rPr lang="en-US" sz="1800" dirty="0" err="1">
@@ -14082,35 +13805,35 @@
                 <a:ea typeface="Verdana" panose="020B0604030504040204" pitchFamily="34" charset="0"/>
                 <a:cs typeface="Arial" panose="020B0604020202020204" pitchFamily="34" charset="0"/>
               </a:rPr>
-              <a:t> required only </a:t>
+              <a:t> needed only </a:t>
             </a:r>
             <a:r>
               <a:rPr lang="en-US" sz="1800" b="1" dirty="0">
                 <a:ea typeface="Verdana" panose="020B0604030504040204" pitchFamily="34" charset="0"/>
                 <a:cs typeface="Arial" panose="020B0604020202020204" pitchFamily="34" charset="0"/>
               </a:rPr>
-              <a:t>1,422</a:t>
+              <a:t>1,422 lines of user-written code</a:t>
             </a:r>
             <a:r>
               <a:rPr lang="en-US" sz="1800" dirty="0">
                 <a:ea typeface="Verdana" panose="020B0604030504040204" pitchFamily="34" charset="0"/>
                 <a:cs typeface="Arial" panose="020B0604020202020204" pitchFamily="34" charset="0"/>
               </a:rPr>
-              <a:t> lines of user-written code, resulting in </a:t>
+              <a:t>, producing </a:t>
             </a:r>
             <a:r>
               <a:rPr lang="en-US" sz="1800" b="1" dirty="0">
                 <a:ea typeface="Verdana" panose="020B0604030504040204" pitchFamily="34" charset="0"/>
                 <a:cs typeface="Arial" panose="020B0604020202020204" pitchFamily="34" charset="0"/>
               </a:rPr>
-              <a:t>7,243</a:t>
+              <a:t>7,243 lines of generated code</a:t>
             </a:r>
             <a:r>
               <a:rPr lang="en-US" sz="1800" dirty="0">
                 <a:ea typeface="Verdana" panose="020B0604030504040204" pitchFamily="34" charset="0"/>
                 <a:cs typeface="Arial" panose="020B0604020202020204" pitchFamily="34" charset="0"/>
               </a:rPr>
-              <a:t> lines of generated code. That is approximately a </a:t>
+              <a:t>—a </a:t>
             </a:r>
             <a:r>
               <a:rPr lang="en-US" sz="1800" b="1" dirty="0">
@@ -14169,6 +13892,438 @@
           </a:prstGeom>
         </p:spPr>
       </p:pic>
+      <p:sp>
+        <p:nvSpPr>
+          <p:cNvPr id="3" name="Arrow: Down 2">
+            <a:extLst>
+              <a:ext uri="{FF2B5EF4-FFF2-40B4-BE49-F238E27FC236}">
+                <a16:creationId xmlns:a16="http://schemas.microsoft.com/office/drawing/2014/main" id="{53DC95C1-0D2E-8614-03EC-6596C4D11ED0}"/>
+              </a:ext>
+            </a:extLst>
+          </p:cNvPr>
+          <p:cNvSpPr/>
+          <p:nvPr/>
+        </p:nvSpPr>
+        <p:spPr>
+          <a:xfrm>
+            <a:off x="18438130" y="15525252"/>
+            <a:ext cx="150136" cy="515561"/>
+          </a:xfrm>
+          <a:prstGeom prst="downArrow">
+            <a:avLst/>
+          </a:prstGeom>
+          <a:solidFill>
+            <a:srgbClr val="7A003C"/>
+          </a:solidFill>
+          <a:ln>
+            <a:solidFill>
+              <a:srgbClr val="7A003C"/>
+            </a:solidFill>
+          </a:ln>
+        </p:spPr>
+        <p:style>
+          <a:lnRef idx="2">
+            <a:schemeClr val="accent1">
+              <a:shade val="15000"/>
+            </a:schemeClr>
+          </a:lnRef>
+          <a:fillRef idx="1">
+            <a:schemeClr val="accent1"/>
+          </a:fillRef>
+          <a:effectRef idx="0">
+            <a:schemeClr val="accent1"/>
+          </a:effectRef>
+          <a:fontRef idx="minor">
+            <a:schemeClr val="lt1"/>
+          </a:fontRef>
+        </p:style>
+        <p:txBody>
+          <a:bodyPr rtlCol="0" anchor="ctr"/>
+          <a:lstStyle/>
+          <a:p>
+            <a:pPr algn="ctr"/>
+            <a:endParaRPr lang="en-CA"/>
+          </a:p>
+        </p:txBody>
+      </p:sp>
+      <p:sp>
+        <p:nvSpPr>
+          <p:cNvPr id="4" name="Arrow: Down 3">
+            <a:extLst>
+              <a:ext uri="{FF2B5EF4-FFF2-40B4-BE49-F238E27FC236}">
+                <a16:creationId xmlns:a16="http://schemas.microsoft.com/office/drawing/2014/main" id="{398D50D5-C715-6626-B00C-52180850CC4D}"/>
+              </a:ext>
+            </a:extLst>
+          </p:cNvPr>
+          <p:cNvSpPr/>
+          <p:nvPr/>
+        </p:nvSpPr>
+        <p:spPr>
+          <a:xfrm>
+            <a:off x="11271723" y="12213131"/>
+            <a:ext cx="150136" cy="515561"/>
+          </a:xfrm>
+          <a:prstGeom prst="downArrow">
+            <a:avLst/>
+          </a:prstGeom>
+          <a:solidFill>
+            <a:srgbClr val="7A003C"/>
+          </a:solidFill>
+          <a:ln>
+            <a:solidFill>
+              <a:srgbClr val="7A003C"/>
+            </a:solidFill>
+          </a:ln>
+        </p:spPr>
+        <p:style>
+          <a:lnRef idx="2">
+            <a:schemeClr val="accent1">
+              <a:shade val="15000"/>
+            </a:schemeClr>
+          </a:lnRef>
+          <a:fillRef idx="1">
+            <a:schemeClr val="accent1"/>
+          </a:fillRef>
+          <a:effectRef idx="0">
+            <a:schemeClr val="accent1"/>
+          </a:effectRef>
+          <a:fontRef idx="minor">
+            <a:schemeClr val="lt1"/>
+          </a:fontRef>
+        </p:style>
+        <p:txBody>
+          <a:bodyPr rtlCol="0" anchor="ctr"/>
+          <a:lstStyle/>
+          <a:p>
+            <a:pPr algn="ctr"/>
+            <a:endParaRPr lang="en-CA"/>
+          </a:p>
+        </p:txBody>
+      </p:sp>
+      <p:sp>
+        <p:nvSpPr>
+          <p:cNvPr id="6" name="Arrow: Down 5">
+            <a:extLst>
+              <a:ext uri="{FF2B5EF4-FFF2-40B4-BE49-F238E27FC236}">
+                <a16:creationId xmlns:a16="http://schemas.microsoft.com/office/drawing/2014/main" id="{2C8E3598-EA35-0942-C272-224A441D05D1}"/>
+              </a:ext>
+            </a:extLst>
+          </p:cNvPr>
+          <p:cNvSpPr/>
+          <p:nvPr/>
+        </p:nvSpPr>
+        <p:spPr>
+          <a:xfrm>
+            <a:off x="14870882" y="12213131"/>
+            <a:ext cx="150136" cy="515561"/>
+          </a:xfrm>
+          <a:prstGeom prst="downArrow">
+            <a:avLst/>
+          </a:prstGeom>
+          <a:solidFill>
+            <a:srgbClr val="7A003C"/>
+          </a:solidFill>
+          <a:ln>
+            <a:solidFill>
+              <a:srgbClr val="7A003C"/>
+            </a:solidFill>
+          </a:ln>
+        </p:spPr>
+        <p:style>
+          <a:lnRef idx="2">
+            <a:schemeClr val="accent1">
+              <a:shade val="15000"/>
+            </a:schemeClr>
+          </a:lnRef>
+          <a:fillRef idx="1">
+            <a:schemeClr val="accent1"/>
+          </a:fillRef>
+          <a:effectRef idx="0">
+            <a:schemeClr val="accent1"/>
+          </a:effectRef>
+          <a:fontRef idx="minor">
+            <a:schemeClr val="lt1"/>
+          </a:fontRef>
+        </p:style>
+        <p:txBody>
+          <a:bodyPr rtlCol="0" anchor="ctr"/>
+          <a:lstStyle/>
+          <a:p>
+            <a:pPr algn="ctr"/>
+            <a:endParaRPr lang="en-CA"/>
+          </a:p>
+        </p:txBody>
+      </p:sp>
+      <p:sp>
+        <p:nvSpPr>
+          <p:cNvPr id="11" name="Arrow: Down 10">
+            <a:extLst>
+              <a:ext uri="{FF2B5EF4-FFF2-40B4-BE49-F238E27FC236}">
+                <a16:creationId xmlns:a16="http://schemas.microsoft.com/office/drawing/2014/main" id="{37A70703-1E45-1924-F6BE-67F006EA5F7B}"/>
+              </a:ext>
+            </a:extLst>
+          </p:cNvPr>
+          <p:cNvSpPr/>
+          <p:nvPr/>
+        </p:nvSpPr>
+        <p:spPr>
+          <a:xfrm>
+            <a:off x="18440556" y="12213131"/>
+            <a:ext cx="150136" cy="515561"/>
+          </a:xfrm>
+          <a:prstGeom prst="downArrow">
+            <a:avLst/>
+          </a:prstGeom>
+          <a:solidFill>
+            <a:srgbClr val="7A003C"/>
+          </a:solidFill>
+          <a:ln>
+            <a:solidFill>
+              <a:srgbClr val="7A003C"/>
+            </a:solidFill>
+          </a:ln>
+        </p:spPr>
+        <p:style>
+          <a:lnRef idx="2">
+            <a:schemeClr val="accent1">
+              <a:shade val="15000"/>
+            </a:schemeClr>
+          </a:lnRef>
+          <a:fillRef idx="1">
+            <a:schemeClr val="accent1"/>
+          </a:fillRef>
+          <a:effectRef idx="0">
+            <a:schemeClr val="accent1"/>
+          </a:effectRef>
+          <a:fontRef idx="minor">
+            <a:schemeClr val="lt1"/>
+          </a:fontRef>
+        </p:style>
+        <p:txBody>
+          <a:bodyPr rtlCol="0" anchor="ctr"/>
+          <a:lstStyle/>
+          <a:p>
+            <a:pPr algn="ctr"/>
+            <a:endParaRPr lang="en-CA"/>
+          </a:p>
+        </p:txBody>
+      </p:sp>
+      <p:sp>
+        <p:nvSpPr>
+          <p:cNvPr id="15" name="Arrow: Down 14">
+            <a:extLst>
+              <a:ext uri="{FF2B5EF4-FFF2-40B4-BE49-F238E27FC236}">
+                <a16:creationId xmlns:a16="http://schemas.microsoft.com/office/drawing/2014/main" id="{D6CBB618-486E-B6BC-4CC5-F89743EAFC07}"/>
+              </a:ext>
+            </a:extLst>
+          </p:cNvPr>
+          <p:cNvSpPr/>
+          <p:nvPr/>
+        </p:nvSpPr>
+        <p:spPr>
+          <a:xfrm>
+            <a:off x="14881631" y="9554739"/>
+            <a:ext cx="150136" cy="515561"/>
+          </a:xfrm>
+          <a:prstGeom prst="downArrow">
+            <a:avLst/>
+          </a:prstGeom>
+          <a:solidFill>
+            <a:srgbClr val="7A003C"/>
+          </a:solidFill>
+          <a:ln>
+            <a:solidFill>
+              <a:srgbClr val="7A003C"/>
+            </a:solidFill>
+          </a:ln>
+        </p:spPr>
+        <p:style>
+          <a:lnRef idx="2">
+            <a:schemeClr val="accent1">
+              <a:shade val="15000"/>
+            </a:schemeClr>
+          </a:lnRef>
+          <a:fillRef idx="1">
+            <a:schemeClr val="accent1"/>
+          </a:fillRef>
+          <a:effectRef idx="0">
+            <a:schemeClr val="accent1"/>
+          </a:effectRef>
+          <a:fontRef idx="minor">
+            <a:schemeClr val="lt1"/>
+          </a:fontRef>
+        </p:style>
+        <p:txBody>
+          <a:bodyPr rtlCol="0" anchor="ctr"/>
+          <a:lstStyle/>
+          <a:p>
+            <a:pPr algn="ctr"/>
+            <a:endParaRPr lang="en-CA"/>
+          </a:p>
+        </p:txBody>
+      </p:sp>
+      <p:sp>
+        <p:nvSpPr>
+          <p:cNvPr id="17" name="Arrow: Down 16">
+            <a:extLst>
+              <a:ext uri="{FF2B5EF4-FFF2-40B4-BE49-F238E27FC236}">
+                <a16:creationId xmlns:a16="http://schemas.microsoft.com/office/drawing/2014/main" id="{6523B1C2-FC3C-5DFF-5FCA-ABA2545C8B38}"/>
+              </a:ext>
+            </a:extLst>
+          </p:cNvPr>
+          <p:cNvSpPr/>
+          <p:nvPr/>
+        </p:nvSpPr>
+        <p:spPr>
+          <a:xfrm>
+            <a:off x="14870881" y="6731355"/>
+            <a:ext cx="150136" cy="515561"/>
+          </a:xfrm>
+          <a:prstGeom prst="downArrow">
+            <a:avLst/>
+          </a:prstGeom>
+          <a:solidFill>
+            <a:srgbClr val="7A003C"/>
+          </a:solidFill>
+          <a:ln>
+            <a:solidFill>
+              <a:srgbClr val="7A003C"/>
+            </a:solidFill>
+          </a:ln>
+        </p:spPr>
+        <p:style>
+          <a:lnRef idx="2">
+            <a:schemeClr val="accent1">
+              <a:shade val="15000"/>
+            </a:schemeClr>
+          </a:lnRef>
+          <a:fillRef idx="1">
+            <a:schemeClr val="accent1"/>
+          </a:fillRef>
+          <a:effectRef idx="0">
+            <a:schemeClr val="accent1"/>
+          </a:effectRef>
+          <a:fontRef idx="minor">
+            <a:schemeClr val="lt1"/>
+          </a:fontRef>
+        </p:style>
+        <p:txBody>
+          <a:bodyPr rtlCol="0" anchor="ctr"/>
+          <a:lstStyle/>
+          <a:p>
+            <a:pPr algn="ctr"/>
+            <a:endParaRPr lang="en-CA"/>
+          </a:p>
+        </p:txBody>
+      </p:sp>
+      <p:sp>
+        <p:nvSpPr>
+          <p:cNvPr id="18" name="Arrow: Down 17">
+            <a:extLst>
+              <a:ext uri="{FF2B5EF4-FFF2-40B4-BE49-F238E27FC236}">
+                <a16:creationId xmlns:a16="http://schemas.microsoft.com/office/drawing/2014/main" id="{8656AD6B-39C2-B11F-5659-1740435EFCFF}"/>
+              </a:ext>
+            </a:extLst>
+          </p:cNvPr>
+          <p:cNvSpPr/>
+          <p:nvPr/>
+        </p:nvSpPr>
+        <p:spPr>
+          <a:xfrm rot="2324071">
+            <a:off x="12673143" y="9545726"/>
+            <a:ext cx="150136" cy="515561"/>
+          </a:xfrm>
+          <a:prstGeom prst="downArrow">
+            <a:avLst/>
+          </a:prstGeom>
+          <a:solidFill>
+            <a:srgbClr val="7A003C"/>
+          </a:solidFill>
+          <a:ln>
+            <a:solidFill>
+              <a:srgbClr val="7A003C"/>
+            </a:solidFill>
+          </a:ln>
+        </p:spPr>
+        <p:style>
+          <a:lnRef idx="2">
+            <a:schemeClr val="accent1">
+              <a:shade val="15000"/>
+            </a:schemeClr>
+          </a:lnRef>
+          <a:fillRef idx="1">
+            <a:schemeClr val="accent1"/>
+          </a:fillRef>
+          <a:effectRef idx="0">
+            <a:schemeClr val="accent1"/>
+          </a:effectRef>
+          <a:fontRef idx="minor">
+            <a:schemeClr val="lt1"/>
+          </a:fontRef>
+        </p:style>
+        <p:txBody>
+          <a:bodyPr rtlCol="0" anchor="ctr"/>
+          <a:lstStyle/>
+          <a:p>
+            <a:pPr algn="ctr"/>
+            <a:endParaRPr lang="en-CA"/>
+          </a:p>
+        </p:txBody>
+      </p:sp>
+      <p:sp>
+        <p:nvSpPr>
+          <p:cNvPr id="21" name="Arrow: Down 20">
+            <a:extLst>
+              <a:ext uri="{FF2B5EF4-FFF2-40B4-BE49-F238E27FC236}">
+                <a16:creationId xmlns:a16="http://schemas.microsoft.com/office/drawing/2014/main" id="{C6776E2C-F6C4-9D2B-435C-CA9EE5B55FEB}"/>
+              </a:ext>
+            </a:extLst>
+          </p:cNvPr>
+          <p:cNvSpPr/>
+          <p:nvPr/>
+        </p:nvSpPr>
+        <p:spPr>
+          <a:xfrm rot="19260000">
+            <a:off x="17090830" y="9546206"/>
+            <a:ext cx="150136" cy="515561"/>
+          </a:xfrm>
+          <a:prstGeom prst="downArrow">
+            <a:avLst/>
+          </a:prstGeom>
+          <a:solidFill>
+            <a:srgbClr val="7A003C"/>
+          </a:solidFill>
+          <a:ln>
+            <a:solidFill>
+              <a:srgbClr val="7A003C"/>
+            </a:solidFill>
+          </a:ln>
+        </p:spPr>
+        <p:style>
+          <a:lnRef idx="2">
+            <a:schemeClr val="accent1">
+              <a:shade val="15000"/>
+            </a:schemeClr>
+          </a:lnRef>
+          <a:fillRef idx="1">
+            <a:schemeClr val="accent1"/>
+          </a:fillRef>
+          <a:effectRef idx="0">
+            <a:schemeClr val="accent1"/>
+          </a:effectRef>
+          <a:fontRef idx="minor">
+            <a:schemeClr val="lt1"/>
+          </a:fontRef>
+        </p:style>
+        <p:txBody>
+          <a:bodyPr rtlCol="0" anchor="ctr"/>
+          <a:lstStyle/>
+          <a:p>
+            <a:pPr algn="ctr"/>
+            <a:endParaRPr lang="en-CA"/>
+          </a:p>
+        </p:txBody>
+      </p:sp>
     </p:spTree>
     <p:extLst>
       <p:ext uri="{BB962C8B-B14F-4D97-AF65-F5344CB8AC3E}">

</xml_diff>

<commit_message>
fixed graph and rearranged order
</commit_message>
<xml_diff>
--- a/People/Mohd-Bilal/research-poster/MohammadBilal_Poster.pptx
+++ b/People/Mohd-Bilal/research-poster/MohammadBilal_Poster.pptx
@@ -118,7 +118,7 @@
 <file path=ppt/revisionInfo.xml><?xml version="1.0" encoding="utf-8"?>
 <p1510:revInfo xmlns:a="http://schemas.openxmlformats.org/drawingml/2006/main" xmlns:r="http://schemas.openxmlformats.org/officeDocument/2006/relationships" xmlns:p1510="http://schemas.microsoft.com/office/powerpoint/2015/10/main">
   <p1510:revLst>
-    <p1510:client id="{0364F51A-C767-46A3-907C-27262140D749}" v="563" dt="2024-08-12T14:33:15.262"/>
+    <p1510:client id="{0364F51A-C767-46A3-907C-27262140D749}" v="578" dt="2024-08-12T20:46:41.917"/>
   </p1510:revLst>
 </p1510:revInfo>
 </file>
@@ -128,12 +128,12 @@
   <pc:docChgLst>
     <pc:chgData name="Bilal Mohammad" userId="fd6debca6fc80796" providerId="LiveId" clId="{0364F51A-C767-46A3-907C-27262140D749}"/>
     <pc:docChg chg="undo redo custSel modSld">
-      <pc:chgData name="Bilal Mohammad" userId="fd6debca6fc80796" providerId="LiveId" clId="{0364F51A-C767-46A3-907C-27262140D749}" dt="2024-08-12T14:43:55.648" v="6357" actId="20577"/>
+      <pc:chgData name="Bilal Mohammad" userId="fd6debca6fc80796" providerId="LiveId" clId="{0364F51A-C767-46A3-907C-27262140D749}" dt="2024-08-13T13:26:00.045" v="6731" actId="1035"/>
       <pc:docMkLst>
         <pc:docMk/>
       </pc:docMkLst>
       <pc:sldChg chg="addSp delSp modSp mod">
-        <pc:chgData name="Bilal Mohammad" userId="fd6debca6fc80796" providerId="LiveId" clId="{0364F51A-C767-46A3-907C-27262140D749}" dt="2024-08-12T14:43:55.648" v="6357" actId="20577"/>
+        <pc:chgData name="Bilal Mohammad" userId="fd6debca6fc80796" providerId="LiveId" clId="{0364F51A-C767-46A3-907C-27262140D749}" dt="2024-08-13T13:26:00.045" v="6731" actId="1035"/>
         <pc:sldMkLst>
           <pc:docMk/>
           <pc:sldMk cId="1069475902" sldId="256"/>
@@ -251,7 +251,7 @@
           </ac:spMkLst>
         </pc:spChg>
         <pc:spChg chg="add mod">
-          <ac:chgData name="Bilal Mohammad" userId="fd6debca6fc80796" providerId="LiveId" clId="{0364F51A-C767-46A3-907C-27262140D749}" dt="2024-08-08T16:15:16.909" v="4196" actId="2711"/>
+          <ac:chgData name="Bilal Mohammad" userId="fd6debca6fc80796" providerId="LiveId" clId="{0364F51A-C767-46A3-907C-27262140D749}" dt="2024-08-13T13:26:00.045" v="6731" actId="1035"/>
           <ac:spMkLst>
             <pc:docMk/>
             <pc:sldMk cId="1069475902" sldId="256"/>
@@ -267,7 +267,7 @@
           </ac:spMkLst>
         </pc:spChg>
         <pc:spChg chg="add mod">
-          <ac:chgData name="Bilal Mohammad" userId="fd6debca6fc80796" providerId="LiveId" clId="{0364F51A-C767-46A3-907C-27262140D749}" dt="2024-08-08T16:15:16.909" v="4196" actId="2711"/>
+          <ac:chgData name="Bilal Mohammad" userId="fd6debca6fc80796" providerId="LiveId" clId="{0364F51A-C767-46A3-907C-27262140D749}" dt="2024-08-13T13:26:00.045" v="6731" actId="1035"/>
           <ac:spMkLst>
             <pc:docMk/>
             <pc:sldMk cId="1069475902" sldId="256"/>
@@ -571,7 +571,7 @@
           </ac:spMkLst>
         </pc:spChg>
         <pc:spChg chg="add mod">
-          <ac:chgData name="Bilal Mohammad" userId="fd6debca6fc80796" providerId="LiveId" clId="{0364F51A-C767-46A3-907C-27262140D749}" dt="2024-08-08T15:49:53.132" v="4161" actId="1076"/>
+          <ac:chgData name="Bilal Mohammad" userId="fd6debca6fc80796" providerId="LiveId" clId="{0364F51A-C767-46A3-907C-27262140D749}" dt="2024-08-12T20:12:43.616" v="6404" actId="164"/>
           <ac:spMkLst>
             <pc:docMk/>
             <pc:sldMk cId="1069475902" sldId="256"/>
@@ -579,7 +579,7 @@
           </ac:spMkLst>
         </pc:spChg>
         <pc:spChg chg="add mod">
-          <ac:chgData name="Bilal Mohammad" userId="fd6debca6fc80796" providerId="LiveId" clId="{0364F51A-C767-46A3-907C-27262140D749}" dt="2024-08-08T16:15:16.909" v="4196" actId="2711"/>
+          <ac:chgData name="Bilal Mohammad" userId="fd6debca6fc80796" providerId="LiveId" clId="{0364F51A-C767-46A3-907C-27262140D749}" dt="2024-08-12T20:50:08.022" v="6722" actId="20577"/>
           <ac:spMkLst>
             <pc:docMk/>
             <pc:sldMk cId="1069475902" sldId="256"/>
@@ -659,7 +659,7 @@
           </ac:spMkLst>
         </pc:spChg>
         <pc:spChg chg="add mod">
-          <ac:chgData name="Bilal Mohammad" userId="fd6debca6fc80796" providerId="LiveId" clId="{0364F51A-C767-46A3-907C-27262140D749}" dt="2024-08-12T13:53:41.106" v="5948" actId="20577"/>
+          <ac:chgData name="Bilal Mohammad" userId="fd6debca6fc80796" providerId="LiveId" clId="{0364F51A-C767-46A3-907C-27262140D749}" dt="2024-08-12T20:47:00.246" v="6690" actId="113"/>
           <ac:spMkLst>
             <pc:docMk/>
             <pc:sldMk cId="1069475902" sldId="256"/>
@@ -675,7 +675,7 @@
           </ac:spMkLst>
         </pc:spChg>
         <pc:spChg chg="add mod">
-          <ac:chgData name="Bilal Mohammad" userId="fd6debca6fc80796" providerId="LiveId" clId="{0364F51A-C767-46A3-907C-27262140D749}" dt="2024-08-12T13:54:08.122" v="5984" actId="1035"/>
+          <ac:chgData name="Bilal Mohammad" userId="fd6debca6fc80796" providerId="LiveId" clId="{0364F51A-C767-46A3-907C-27262140D749}" dt="2024-08-12T20:12:58.300" v="6406" actId="164"/>
           <ac:spMkLst>
             <pc:docMk/>
             <pc:sldMk cId="1069475902" sldId="256"/>
@@ -683,7 +683,7 @@
           </ac:spMkLst>
         </pc:spChg>
         <pc:spChg chg="add mod">
-          <ac:chgData name="Bilal Mohammad" userId="fd6debca6fc80796" providerId="LiveId" clId="{0364F51A-C767-46A3-907C-27262140D749}" dt="2024-08-12T13:54:08.122" v="5984" actId="1035"/>
+          <ac:chgData name="Bilal Mohammad" userId="fd6debca6fc80796" providerId="LiveId" clId="{0364F51A-C767-46A3-907C-27262140D749}" dt="2024-08-12T20:12:58.300" v="6406" actId="164"/>
           <ac:spMkLst>
             <pc:docMk/>
             <pc:sldMk cId="1069475902" sldId="256"/>
@@ -699,7 +699,7 @@
           </ac:spMkLst>
         </pc:spChg>
         <pc:spChg chg="add mod">
-          <ac:chgData name="Bilal Mohammad" userId="fd6debca6fc80796" providerId="LiveId" clId="{0364F51A-C767-46A3-907C-27262140D749}" dt="2024-08-12T13:54:00.295" v="5961" actId="1035"/>
+          <ac:chgData name="Bilal Mohammad" userId="fd6debca6fc80796" providerId="LiveId" clId="{0364F51A-C767-46A3-907C-27262140D749}" dt="2024-08-12T20:12:58.300" v="6406" actId="164"/>
           <ac:spMkLst>
             <pc:docMk/>
             <pc:sldMk cId="1069475902" sldId="256"/>
@@ -707,7 +707,7 @@
           </ac:spMkLst>
         </pc:spChg>
         <pc:spChg chg="add mod">
-          <ac:chgData name="Bilal Mohammad" userId="fd6debca6fc80796" providerId="LiveId" clId="{0364F51A-C767-46A3-907C-27262140D749}" dt="2024-08-12T14:43:55.648" v="6357" actId="20577"/>
+          <ac:chgData name="Bilal Mohammad" userId="fd6debca6fc80796" providerId="LiveId" clId="{0364F51A-C767-46A3-907C-27262140D749}" dt="2024-08-12T20:43:16.720" v="6639" actId="404"/>
           <ac:spMkLst>
             <pc:docMk/>
             <pc:sldMk cId="1069475902" sldId="256"/>
@@ -859,7 +859,7 @@
           </ac:spMkLst>
         </pc:spChg>
         <pc:spChg chg="add mod topLvl">
-          <ac:chgData name="Bilal Mohammad" userId="fd6debca6fc80796" providerId="LiveId" clId="{0364F51A-C767-46A3-907C-27262140D749}" dt="2024-08-08T19:01:18.694" v="4531" actId="164"/>
+          <ac:chgData name="Bilal Mohammad" userId="fd6debca6fc80796" providerId="LiveId" clId="{0364F51A-C767-46A3-907C-27262140D749}" dt="2024-08-12T19:24:29.747" v="6392" actId="1076"/>
           <ac:spMkLst>
             <pc:docMk/>
             <pc:sldMk cId="1069475902" sldId="256"/>
@@ -883,7 +883,7 @@
           </ac:spMkLst>
         </pc:spChg>
         <pc:spChg chg="add mod topLvl">
-          <ac:chgData name="Bilal Mohammad" userId="fd6debca6fc80796" providerId="LiveId" clId="{0364F51A-C767-46A3-907C-27262140D749}" dt="2024-08-08T19:01:18.694" v="4531" actId="164"/>
+          <ac:chgData name="Bilal Mohammad" userId="fd6debca6fc80796" providerId="LiveId" clId="{0364F51A-C767-46A3-907C-27262140D749}" dt="2024-08-12T19:24:24.308" v="6391" actId="1076"/>
           <ac:spMkLst>
             <pc:docMk/>
             <pc:sldMk cId="1069475902" sldId="256"/>
@@ -904,6 +904,22 @@
             <pc:docMk/>
             <pc:sldMk cId="1069475902" sldId="256"/>
             <ac:grpSpMk id="22" creationId="{19C2F60B-ABF3-A604-0D32-702E6A08E41D}"/>
+          </ac:grpSpMkLst>
+        </pc:grpChg>
+        <pc:grpChg chg="add mod">
+          <ac:chgData name="Bilal Mohammad" userId="fd6debca6fc80796" providerId="LiveId" clId="{0364F51A-C767-46A3-907C-27262140D749}" dt="2024-08-12T20:13:36.107" v="6410" actId="1035"/>
+          <ac:grpSpMkLst>
+            <pc:docMk/>
+            <pc:sldMk cId="1069475902" sldId="256"/>
+            <ac:grpSpMk id="22" creationId="{68443CBD-BDBF-1FE1-5B5C-D7EBDE5F5417}"/>
+          </ac:grpSpMkLst>
+        </pc:grpChg>
+        <pc:grpChg chg="add mod">
+          <ac:chgData name="Bilal Mohammad" userId="fd6debca6fc80796" providerId="LiveId" clId="{0364F51A-C767-46A3-907C-27262140D749}" dt="2024-08-12T20:13:05.633" v="6407" actId="1076"/>
+          <ac:grpSpMkLst>
+            <pc:docMk/>
+            <pc:sldMk cId="1069475902" sldId="256"/>
+            <ac:grpSpMk id="23" creationId="{1AAE86F0-DF93-682E-75DC-70ECB4763A5C}"/>
           </ac:grpSpMkLst>
         </pc:grpChg>
         <pc:grpChg chg="add del mod">
@@ -994,6 +1010,14 @@
             <ac:graphicFrameMk id="3" creationId="{78964DCA-CFCE-FE2E-04A2-50E3D01A274B}"/>
           </ac:graphicFrameMkLst>
         </pc:graphicFrameChg>
+        <pc:graphicFrameChg chg="add del mod">
+          <ac:chgData name="Bilal Mohammad" userId="fd6debca6fc80796" providerId="LiveId" clId="{0364F51A-C767-46A3-907C-27262140D749}" dt="2024-08-12T20:21:06.243" v="6575" actId="478"/>
+          <ac:graphicFrameMkLst>
+            <pc:docMk/>
+            <pc:sldMk cId="1069475902" sldId="256"/>
+            <ac:graphicFrameMk id="25" creationId="{25EA1F5A-434E-790C-6ED6-C0317EBA4649}"/>
+          </ac:graphicFrameMkLst>
+        </pc:graphicFrameChg>
         <pc:graphicFrameChg chg="add mod modGraphic">
           <ac:chgData name="Bilal Mohammad" userId="fd6debca6fc80796" providerId="LiveId" clId="{0364F51A-C767-46A3-907C-27262140D749}" dt="2024-08-12T14:09:20.476" v="6119" actId="255"/>
           <ac:graphicFrameMkLst>
@@ -1003,7 +1027,31 @@
           </ac:graphicFrameMkLst>
         </pc:graphicFrameChg>
         <pc:graphicFrameChg chg="add mod">
-          <ac:chgData name="Bilal Mohammad" userId="fd6debca6fc80796" providerId="LiveId" clId="{0364F51A-C767-46A3-907C-27262140D749}" dt="2024-08-12T14:33:15.262" v="6315"/>
+          <ac:chgData name="Bilal Mohammad" userId="fd6debca6fc80796" providerId="LiveId" clId="{0364F51A-C767-46A3-907C-27262140D749}" dt="2024-08-12T20:21:17.785" v="6577" actId="1957"/>
+          <ac:graphicFrameMkLst>
+            <pc:docMk/>
+            <pc:sldMk cId="1069475902" sldId="256"/>
+            <ac:graphicFrameMk id="36" creationId="{361486DB-D713-2D10-6C21-254B9F239E82}"/>
+          </ac:graphicFrameMkLst>
+        </pc:graphicFrameChg>
+        <pc:graphicFrameChg chg="add del mod">
+          <ac:chgData name="Bilal Mohammad" userId="fd6debca6fc80796" providerId="LiveId" clId="{0364F51A-C767-46A3-907C-27262140D749}" dt="2024-08-12T20:23:05.335" v="6603" actId="478"/>
+          <ac:graphicFrameMkLst>
+            <pc:docMk/>
+            <pc:sldMk cId="1069475902" sldId="256"/>
+            <ac:graphicFrameMk id="40" creationId="{C48D53E8-B54E-BD4A-5520-7CB0D5293AF3}"/>
+          </ac:graphicFrameMkLst>
+        </pc:graphicFrameChg>
+        <pc:graphicFrameChg chg="add mod ord">
+          <ac:chgData name="Bilal Mohammad" userId="fd6debca6fc80796" providerId="LiveId" clId="{0364F51A-C767-46A3-907C-27262140D749}" dt="2024-08-12T20:41:24.227" v="6621" actId="14100"/>
+          <ac:graphicFrameMkLst>
+            <pc:docMk/>
+            <pc:sldMk cId="1069475902" sldId="256"/>
+            <ac:graphicFrameMk id="41" creationId="{DF643C4D-E1EE-3A9A-0CF2-0781210787CE}"/>
+          </ac:graphicFrameMkLst>
+        </pc:graphicFrameChg>
+        <pc:graphicFrameChg chg="add del mod">
+          <ac:chgData name="Bilal Mohammad" userId="fd6debca6fc80796" providerId="LiveId" clId="{0364F51A-C767-46A3-907C-27262140D749}" dt="2024-08-12T20:40:58.463" v="6619" actId="478"/>
           <ac:graphicFrameMkLst>
             <pc:docMk/>
             <pc:sldMk cId="1069475902" sldId="256"/>
@@ -1432,7 +1480,7 @@
                   <c:v>Generated Jupyter</c:v>
                 </c:pt>
                 <c:pt idx="5">
-                  <c:v>Total Generated Formats</c:v>
+                  <c:v>Total Generated Documentation</c:v>
                 </c:pt>
               </c:strCache>
             </c:strRef>
@@ -1466,7 +1514,7 @@
           </c:val>
           <c:extLst>
             <c:ext xmlns:c16="http://schemas.microsoft.com/office/drawing/2014/chart" uri="{C3380CC4-5D6E-409C-BE32-E72D297353CC}">
-              <c16:uniqueId val="{00000000-BFC5-41E0-A891-537AD31E8D90}"/>
+              <c16:uniqueId val="{00000000-13A4-49A9-A74F-D763BE4A528B}"/>
             </c:ext>
           </c:extLst>
         </c:ser>
@@ -3501,7 +3549,7 @@
   <dgm:whole/>
   <dgm:extLst>
     <a:ext uri="http://schemas.microsoft.com/office/drawing/2008/diagram">
-      <dsp:dataModelExt xmlns:dsp="http://schemas.microsoft.com/office/drawing/2008/diagram" relId="rId9" minVer="http://schemas.openxmlformats.org/drawingml/2006/diagram"/>
+      <dsp:dataModelExt xmlns:dsp="http://schemas.microsoft.com/office/drawing/2008/diagram" relId="rId10" minVer="http://schemas.openxmlformats.org/drawingml/2006/diagram"/>
     </a:ext>
   </dgm:extLst>
 </dgm:dataModel>
@@ -6581,7 +6629,7 @@
           <a:p>
             <a:fld id="{3A24CFE0-DC6F-4009-8160-9F80C8F0B444}" type="datetimeFigureOut">
               <a:rPr lang="en-CA" smtClean="0"/>
-              <a:t>2024-08-12</a:t>
+              <a:t>2024-08-13</a:t>
             </a:fld>
             <a:endParaRPr lang="en-CA"/>
           </a:p>
@@ -7064,7 +7112,7 @@
           <a:p>
             <a:fld id="{861E132A-DEB2-4D7F-AB88-2444701CC7A8}" type="datetimeFigureOut">
               <a:rPr lang="en-CA" smtClean="0"/>
-              <a:t>2024-08-12</a:t>
+              <a:t>2024-08-13</a:t>
             </a:fld>
             <a:endParaRPr lang="en-CA"/>
           </a:p>
@@ -7234,7 +7282,7 @@
           <a:p>
             <a:fld id="{861E132A-DEB2-4D7F-AB88-2444701CC7A8}" type="datetimeFigureOut">
               <a:rPr lang="en-CA" smtClean="0"/>
-              <a:t>2024-08-12</a:t>
+              <a:t>2024-08-13</a:t>
             </a:fld>
             <a:endParaRPr lang="en-CA"/>
           </a:p>
@@ -7414,7 +7462,7 @@
           <a:p>
             <a:fld id="{861E132A-DEB2-4D7F-AB88-2444701CC7A8}" type="datetimeFigureOut">
               <a:rPr lang="en-CA" smtClean="0"/>
-              <a:t>2024-08-12</a:t>
+              <a:t>2024-08-13</a:t>
             </a:fld>
             <a:endParaRPr lang="en-CA"/>
           </a:p>
@@ -7584,7 +7632,7 @@
           <a:p>
             <a:fld id="{861E132A-DEB2-4D7F-AB88-2444701CC7A8}" type="datetimeFigureOut">
               <a:rPr lang="en-CA" smtClean="0"/>
-              <a:t>2024-08-12</a:t>
+              <a:t>2024-08-13</a:t>
             </a:fld>
             <a:endParaRPr lang="en-CA"/>
           </a:p>
@@ -7830,7 +7878,7 @@
           <a:p>
             <a:fld id="{861E132A-DEB2-4D7F-AB88-2444701CC7A8}" type="datetimeFigureOut">
               <a:rPr lang="en-CA" smtClean="0"/>
-              <a:t>2024-08-12</a:t>
+              <a:t>2024-08-13</a:t>
             </a:fld>
             <a:endParaRPr lang="en-CA"/>
           </a:p>
@@ -8062,7 +8110,7 @@
           <a:p>
             <a:fld id="{861E132A-DEB2-4D7F-AB88-2444701CC7A8}" type="datetimeFigureOut">
               <a:rPr lang="en-CA" smtClean="0"/>
-              <a:t>2024-08-12</a:t>
+              <a:t>2024-08-13</a:t>
             </a:fld>
             <a:endParaRPr lang="en-CA"/>
           </a:p>
@@ -8429,7 +8477,7 @@
           <a:p>
             <a:fld id="{861E132A-DEB2-4D7F-AB88-2444701CC7A8}" type="datetimeFigureOut">
               <a:rPr lang="en-CA" smtClean="0"/>
-              <a:t>2024-08-12</a:t>
+              <a:t>2024-08-13</a:t>
             </a:fld>
             <a:endParaRPr lang="en-CA"/>
           </a:p>
@@ -8547,7 +8595,7 @@
           <a:p>
             <a:fld id="{861E132A-DEB2-4D7F-AB88-2444701CC7A8}" type="datetimeFigureOut">
               <a:rPr lang="en-CA" smtClean="0"/>
-              <a:t>2024-08-12</a:t>
+              <a:t>2024-08-13</a:t>
             </a:fld>
             <a:endParaRPr lang="en-CA"/>
           </a:p>
@@ -8642,7 +8690,7 @@
           <a:p>
             <a:fld id="{861E132A-DEB2-4D7F-AB88-2444701CC7A8}" type="datetimeFigureOut">
               <a:rPr lang="en-CA" smtClean="0"/>
-              <a:t>2024-08-12</a:t>
+              <a:t>2024-08-13</a:t>
             </a:fld>
             <a:endParaRPr lang="en-CA"/>
           </a:p>
@@ -8919,7 +8967,7 @@
           <a:p>
             <a:fld id="{861E132A-DEB2-4D7F-AB88-2444701CC7A8}" type="datetimeFigureOut">
               <a:rPr lang="en-CA" smtClean="0"/>
-              <a:t>2024-08-12</a:t>
+              <a:t>2024-08-13</a:t>
             </a:fld>
             <a:endParaRPr lang="en-CA"/>
           </a:p>
@@ -9176,7 +9224,7 @@
           <a:p>
             <a:fld id="{861E132A-DEB2-4D7F-AB88-2444701CC7A8}" type="datetimeFigureOut">
               <a:rPr lang="en-CA" smtClean="0"/>
-              <a:t>2024-08-12</a:t>
+              <a:t>2024-08-13</a:t>
             </a:fld>
             <a:endParaRPr lang="en-CA"/>
           </a:p>
@@ -9389,7 +9437,7 @@
           <a:p>
             <a:fld id="{861E132A-DEB2-4D7F-AB88-2444701CC7A8}" type="datetimeFigureOut">
               <a:rPr lang="en-CA" smtClean="0"/>
-              <a:t>2024-08-12</a:t>
+              <a:t>2024-08-13</a:t>
             </a:fld>
             <a:endParaRPr lang="en-CA"/>
           </a:p>
@@ -9794,6 +9842,36 @@
           <a:chExt cx="0" cy="0"/>
         </a:xfrm>
       </p:grpSpPr>
+      <p:graphicFrame>
+        <p:nvGraphicFramePr>
+          <p:cNvPr id="41" name="Chart 40">
+            <a:extLst>
+              <a:ext uri="{FF2B5EF4-FFF2-40B4-BE49-F238E27FC236}">
+                <a16:creationId xmlns:a16="http://schemas.microsoft.com/office/drawing/2014/main" id="{DF643C4D-E1EE-3A9A-0CF2-0781210787CE}"/>
+              </a:ext>
+            </a:extLst>
+          </p:cNvPr>
+          <p:cNvGraphicFramePr>
+            <a:graphicFrameLocks/>
+          </p:cNvGraphicFramePr>
+          <p:nvPr>
+            <p:extLst>
+              <p:ext uri="{D42A27DB-BD31-4B8C-83A1-F6EECF244321}">
+                <p14:modId xmlns:p14="http://schemas.microsoft.com/office/powerpoint/2010/main" val="3841108967"/>
+              </p:ext>
+            </p:extLst>
+          </p:nvPr>
+        </p:nvGraphicFramePr>
+        <p:xfrm>
+          <a:off x="24295238" y="6790088"/>
+          <a:ext cx="7784029" cy="4092278"/>
+        </p:xfrm>
+        <a:graphic>
+          <a:graphicData uri="http://schemas.openxmlformats.org/drawingml/2006/chart">
+            <c:chart xmlns:c="http://schemas.openxmlformats.org/drawingml/2006/chart" xmlns:r="http://schemas.openxmlformats.org/officeDocument/2006/relationships" r:id="rId3"/>
+          </a:graphicData>
+        </a:graphic>
+      </p:graphicFrame>
       <p:sp>
         <p:nvSpPr>
           <p:cNvPr id="2" name="Rectangle 1">
@@ -9866,7 +9944,7 @@
           <p:nvPr/>
         </p:nvPicPr>
         <p:blipFill>
-          <a:blip r:embed="rId3">
+          <a:blip r:embed="rId4">
             <a:extLst>
               <a:ext uri="{28A0092B-C50C-407E-A947-70E740481C1C}">
                 <a14:useLocalDpi xmlns:a14="http://schemas.microsoft.com/office/drawing/2010/main" val="0"/>
@@ -9902,7 +9980,7 @@
           <p:nvPr/>
         </p:nvPicPr>
         <p:blipFill>
-          <a:blip r:embed="rId4">
+          <a:blip r:embed="rId5">
             <a:extLst>
               <a:ext uri="{28A0092B-C50C-407E-A947-70E740481C1C}">
                 <a14:useLocalDpi xmlns:a14="http://schemas.microsoft.com/office/drawing/2010/main" val="0"/>
@@ -10520,7 +10598,7 @@
         </p:nvSpPr>
         <p:spPr>
           <a:xfrm>
-            <a:off x="9692217" y="1894061"/>
+            <a:off x="10003696" y="1845496"/>
             <a:ext cx="12910781" cy="584775"/>
           </a:xfrm>
           <a:prstGeom prst="rect">
@@ -10572,7 +10650,7 @@
         </p:nvSpPr>
         <p:spPr>
           <a:xfrm>
-            <a:off x="8314762" y="2440175"/>
+            <a:off x="8688682" y="2341184"/>
             <a:ext cx="15665691" cy="584775"/>
           </a:xfrm>
           <a:prstGeom prst="rect">
@@ -11308,7 +11386,7 @@
           </p:xfrm>
           <a:graphic>
             <a:graphicData uri="http://schemas.openxmlformats.org/drawingml/2006/diagram">
-              <dgm:relIds xmlns:dgm="http://schemas.openxmlformats.org/drawingml/2006/diagram" xmlns:r="http://schemas.openxmlformats.org/officeDocument/2006/relationships" r:dm="rId5" r:lo="rId6" r:qs="rId7" r:cs="rId8"/>
+              <dgm:relIds xmlns:dgm="http://schemas.openxmlformats.org/drawingml/2006/diagram" xmlns:r="http://schemas.openxmlformats.org/officeDocument/2006/relationships" r:dm="rId6" r:lo="rId7" r:qs="rId8" r:cs="rId9"/>
             </a:graphicData>
           </a:graphic>
         </p:graphicFrame>
@@ -11563,105 +11641,6 @@
                 <a:cs typeface="Arial" panose="020B0604020202020204" pitchFamily="34" charset="0"/>
               </a:rPr>
               <a:t>Results</a:t>
-            </a:r>
-          </a:p>
-        </p:txBody>
-      </p:sp>
-      <p:sp>
-        <p:nvSpPr>
-          <p:cNvPr id="46" name="Rectangle 45">
-            <a:extLst>
-              <a:ext uri="{FF2B5EF4-FFF2-40B4-BE49-F238E27FC236}">
-                <a16:creationId xmlns:a16="http://schemas.microsoft.com/office/drawing/2014/main" id="{930A5DE9-0D1B-DA8A-954F-AF23A9888EC7}"/>
-              </a:ext>
-            </a:extLst>
-          </p:cNvPr>
-          <p:cNvSpPr/>
-          <p:nvPr/>
-        </p:nvSpPr>
-        <p:spPr>
-          <a:xfrm>
-            <a:off x="24345901" y="3780669"/>
-            <a:ext cx="7762857" cy="584775"/>
-          </a:xfrm>
-          <a:prstGeom prst="rect">
-            <a:avLst/>
-          </a:prstGeom>
-          <a:solidFill>
-            <a:srgbClr val="7A003C"/>
-          </a:solidFill>
-          <a:ln>
-            <a:solidFill>
-              <a:srgbClr val="7A003C"/>
-            </a:solidFill>
-          </a:ln>
-        </p:spPr>
-        <p:style>
-          <a:lnRef idx="2">
-            <a:schemeClr val="accent1">
-              <a:shade val="50000"/>
-            </a:schemeClr>
-          </a:lnRef>
-          <a:fillRef idx="1">
-            <a:schemeClr val="accent1"/>
-          </a:fillRef>
-          <a:effectRef idx="0">
-            <a:schemeClr val="accent1"/>
-          </a:effectRef>
-          <a:fontRef idx="minor">
-            <a:schemeClr val="lt1"/>
-          </a:fontRef>
-        </p:style>
-        <p:txBody>
-          <a:bodyPr rtlCol="0" anchor="ctr"/>
-          <a:lstStyle/>
-          <a:p>
-            <a:pPr algn="ctr"/>
-            <a:endParaRPr lang="en-CA" sz="14810" dirty="0">
-              <a:latin typeface="Arial" panose="020B0604020202020204" pitchFamily="34" charset="0"/>
-              <a:cs typeface="Arial" panose="020B0604020202020204" pitchFamily="34" charset="0"/>
-            </a:endParaRPr>
-          </a:p>
-        </p:txBody>
-      </p:sp>
-      <p:sp>
-        <p:nvSpPr>
-          <p:cNvPr id="48" name="TextBox 47">
-            <a:extLst>
-              <a:ext uri="{FF2B5EF4-FFF2-40B4-BE49-F238E27FC236}">
-                <a16:creationId xmlns:a16="http://schemas.microsoft.com/office/drawing/2014/main" id="{E4000023-5F82-6E2B-603E-F322873BA923}"/>
-              </a:ext>
-            </a:extLst>
-          </p:cNvPr>
-          <p:cNvSpPr txBox="1"/>
-          <p:nvPr/>
-        </p:nvSpPr>
-        <p:spPr>
-          <a:xfrm>
-            <a:off x="24778321" y="3789643"/>
-            <a:ext cx="6898013" cy="584775"/>
-          </a:xfrm>
-          <a:prstGeom prst="rect">
-            <a:avLst/>
-          </a:prstGeom>
-          <a:noFill/>
-        </p:spPr>
-        <p:txBody>
-          <a:bodyPr wrap="square" rtlCol="0">
-            <a:spAutoFit/>
-          </a:bodyPr>
-          <a:lstStyle/>
-          <a:p>
-            <a:pPr algn="ctr"/>
-            <a:r>
-              <a:rPr lang="en-CA" sz="3200" b="1" dirty="0">
-                <a:solidFill>
-                  <a:schemeClr val="bg1"/>
-                </a:solidFill>
-                <a:latin typeface="+mj-lt"/>
-                <a:cs typeface="Arial" panose="020B0604020202020204" pitchFamily="34" charset="0"/>
-              </a:rPr>
-              <a:t>Discussion</a:t>
             </a:r>
           </a:p>
         </p:txBody>
@@ -12035,7 +12014,7 @@
               </a:r>
               <a:r>
                 <a:rPr lang="en-US" sz="1800" dirty="0">
-                  <a:hlinkClick r:id="rId10"/>
+                  <a:hlinkClick r:id="rId11"/>
                 </a:rPr>
                 <a:t>https://rust-lang.github.io/mdBook/</a:t>
               </a:r>
@@ -12102,200 +12081,457 @@
           </p:txBody>
         </p:sp>
       </p:grpSp>
-      <p:sp>
-        <p:nvSpPr>
-          <p:cNvPr id="60" name="TextBox 59">
+      <p:grpSp>
+        <p:nvGrpSpPr>
+          <p:cNvPr id="22" name="Group 21">
             <a:extLst>
               <a:ext uri="{FF2B5EF4-FFF2-40B4-BE49-F238E27FC236}">
-                <a16:creationId xmlns:a16="http://schemas.microsoft.com/office/drawing/2014/main" id="{3AE536D3-BEC8-068D-2CA5-656A3F1310D1}"/>
+                <a16:creationId xmlns:a16="http://schemas.microsoft.com/office/drawing/2014/main" id="{68443CBD-BDBF-1FE1-5B5C-D7EBDE5F5417}"/>
               </a:ext>
             </a:extLst>
           </p:cNvPr>
-          <p:cNvSpPr txBox="1"/>
+          <p:cNvGrpSpPr/>
           <p:nvPr/>
-        </p:nvSpPr>
-        <p:spPr>
+        </p:nvGrpSpPr>
+        <p:grpSpPr>
           <a:xfrm>
-            <a:off x="24318891" y="4607342"/>
-            <a:ext cx="7762857" cy="2862322"/>
+            <a:off x="24255390" y="11405071"/>
+            <a:ext cx="7789867" cy="3790076"/>
+            <a:chOff x="24318891" y="3780669"/>
+            <a:chExt cx="7789867" cy="3790076"/>
           </a:xfrm>
-          <a:prstGeom prst="rect">
-            <a:avLst/>
-          </a:prstGeom>
-          <a:noFill/>
-        </p:spPr>
-        <p:txBody>
-          <a:bodyPr wrap="square" rtlCol="0">
-            <a:spAutoFit/>
-          </a:bodyPr>
-          <a:lstStyle/>
-          <a:p>
-            <a:pPr marL="285750" indent="-285750">
-              <a:buFont typeface="Arial" panose="020B0604020202020204" pitchFamily="34" charset="0"/>
-              <a:buChar char="•"/>
-            </a:pPr>
-            <a:r>
-              <a:rPr lang="en-US" sz="1800" dirty="0">
+        </p:grpSpPr>
+        <p:sp>
+          <p:nvSpPr>
+            <p:cNvPr id="46" name="Rectangle 45">
+              <a:extLst>
+                <a:ext uri="{FF2B5EF4-FFF2-40B4-BE49-F238E27FC236}">
+                  <a16:creationId xmlns:a16="http://schemas.microsoft.com/office/drawing/2014/main" id="{930A5DE9-0D1B-DA8A-954F-AF23A9888EC7}"/>
+                </a:ext>
+              </a:extLst>
+            </p:cNvPr>
+            <p:cNvSpPr/>
+            <p:nvPr/>
+          </p:nvSpPr>
+          <p:spPr>
+            <a:xfrm>
+              <a:off x="24345901" y="3780669"/>
+              <a:ext cx="7762857" cy="584775"/>
+            </a:xfrm>
+            <a:prstGeom prst="rect">
+              <a:avLst/>
+            </a:prstGeom>
+            <a:solidFill>
+              <a:srgbClr val="7A003C"/>
+            </a:solidFill>
+            <a:ln>
+              <a:solidFill>
+                <a:srgbClr val="7A003C"/>
+              </a:solidFill>
+            </a:ln>
+          </p:spPr>
+          <p:style>
+            <a:lnRef idx="2">
+              <a:schemeClr val="accent1">
+                <a:shade val="50000"/>
+              </a:schemeClr>
+            </a:lnRef>
+            <a:fillRef idx="1">
+              <a:schemeClr val="accent1"/>
+            </a:fillRef>
+            <a:effectRef idx="0">
+              <a:schemeClr val="accent1"/>
+            </a:effectRef>
+            <a:fontRef idx="minor">
+              <a:schemeClr val="lt1"/>
+            </a:fontRef>
+          </p:style>
+          <p:txBody>
+            <a:bodyPr rtlCol="0" anchor="ctr"/>
+            <a:lstStyle/>
+            <a:p>
+              <a:pPr algn="ctr"/>
+              <a:endParaRPr lang="en-CA" sz="14810" dirty="0">
+                <a:latin typeface="Arial" panose="020B0604020202020204" pitchFamily="34" charset="0"/>
+                <a:cs typeface="Arial" panose="020B0604020202020204" pitchFamily="34" charset="0"/>
+              </a:endParaRPr>
+            </a:p>
+          </p:txBody>
+        </p:sp>
+        <p:sp>
+          <p:nvSpPr>
+            <p:cNvPr id="48" name="TextBox 47">
+              <a:extLst>
+                <a:ext uri="{FF2B5EF4-FFF2-40B4-BE49-F238E27FC236}">
+                  <a16:creationId xmlns:a16="http://schemas.microsoft.com/office/drawing/2014/main" id="{E4000023-5F82-6E2B-603E-F322873BA923}"/>
+                </a:ext>
+              </a:extLst>
+            </p:cNvPr>
+            <p:cNvSpPr txBox="1"/>
+            <p:nvPr/>
+          </p:nvSpPr>
+          <p:spPr>
+            <a:xfrm>
+              <a:off x="24778321" y="3789643"/>
+              <a:ext cx="6898013" cy="584775"/>
+            </a:xfrm>
+            <a:prstGeom prst="rect">
+              <a:avLst/>
+            </a:prstGeom>
+            <a:noFill/>
+          </p:spPr>
+          <p:txBody>
+            <a:bodyPr wrap="square" rtlCol="0">
+              <a:spAutoFit/>
+            </a:bodyPr>
+            <a:lstStyle/>
+            <a:p>
+              <a:pPr algn="ctr"/>
+              <a:r>
+                <a:rPr lang="en-CA" sz="3200" b="1">
+                  <a:solidFill>
+                    <a:schemeClr val="bg1"/>
+                  </a:solidFill>
+                  <a:latin typeface="+mj-lt"/>
+                  <a:cs typeface="Arial" panose="020B0604020202020204" pitchFamily="34" charset="0"/>
+                </a:rPr>
+                <a:t>Conclusions</a:t>
+              </a:r>
+              <a:endParaRPr lang="en-CA" sz="3200" b="1" dirty="0">
+                <a:solidFill>
+                  <a:schemeClr val="bg1"/>
+                </a:solidFill>
+                <a:latin typeface="+mj-lt"/>
+                <a:cs typeface="Arial" panose="020B0604020202020204" pitchFamily="34" charset="0"/>
+              </a:endParaRPr>
+            </a:p>
+          </p:txBody>
+        </p:sp>
+        <p:sp>
+          <p:nvSpPr>
+            <p:cNvPr id="60" name="TextBox 59">
+              <a:extLst>
+                <a:ext uri="{FF2B5EF4-FFF2-40B4-BE49-F238E27FC236}">
+                  <a16:creationId xmlns:a16="http://schemas.microsoft.com/office/drawing/2014/main" id="{3AE536D3-BEC8-068D-2CA5-656A3F1310D1}"/>
+                </a:ext>
+              </a:extLst>
+            </p:cNvPr>
+            <p:cNvSpPr txBox="1"/>
+            <p:nvPr/>
+          </p:nvSpPr>
+          <p:spPr>
+            <a:xfrm>
+              <a:off x="24318891" y="4462202"/>
+              <a:ext cx="7762857" cy="3108543"/>
+            </a:xfrm>
+            <a:prstGeom prst="rect">
+              <a:avLst/>
+            </a:prstGeom>
+            <a:noFill/>
+          </p:spPr>
+          <p:txBody>
+            <a:bodyPr wrap="square" rtlCol="0">
+              <a:spAutoFit/>
+            </a:bodyPr>
+            <a:lstStyle/>
+            <a:p>
+              <a:pPr marL="285750" indent="-285750">
+                <a:buFont typeface="Arial" panose="020B0604020202020204" pitchFamily="34" charset="0"/>
+                <a:buChar char="•"/>
+              </a:pPr>
+              <a:r>
+                <a:rPr lang="en-US" sz="1800" dirty="0">
+                  <a:ea typeface="Verdana" panose="020B0604030504040204" pitchFamily="34" charset="0"/>
+                  <a:cs typeface="Arial" panose="020B0604020202020204" pitchFamily="34" charset="0"/>
+                </a:rPr>
+                <a:t>Adopting </a:t>
+              </a:r>
+              <a:r>
+                <a:rPr lang="en-US" sz="1800" dirty="0" err="1">
+                  <a:ea typeface="Verdana" panose="020B0604030504040204" pitchFamily="34" charset="0"/>
+                  <a:cs typeface="Arial" panose="020B0604020202020204" pitchFamily="34" charset="0"/>
+                </a:rPr>
+                <a:t>mdBook</a:t>
+              </a:r>
+              <a:r>
+                <a:rPr lang="en-US" sz="1800" dirty="0">
+                  <a:ea typeface="Verdana" panose="020B0604030504040204" pitchFamily="34" charset="0"/>
+                  <a:cs typeface="Arial" panose="020B0604020202020204" pitchFamily="34" charset="0"/>
+                </a:rPr>
+                <a:t> in </a:t>
+              </a:r>
+              <a:r>
+                <a:rPr lang="en-US" sz="1800" dirty="0" err="1">
+                  <a:ea typeface="Verdana" panose="020B0604030504040204" pitchFamily="34" charset="0"/>
+                  <a:cs typeface="Arial" panose="020B0604020202020204" pitchFamily="34" charset="0"/>
+                </a:rPr>
+                <a:t>Drasil</a:t>
+              </a:r>
+              <a:r>
+                <a:rPr lang="en-US" sz="1800" dirty="0">
+                  <a:ea typeface="Verdana" panose="020B0604030504040204" pitchFamily="34" charset="0"/>
+                  <a:cs typeface="Arial" panose="020B0604020202020204" pitchFamily="34" charset="0"/>
+                </a:rPr>
+                <a:t> enhances documentation quality and usability, aligning with goals of </a:t>
+              </a:r>
+              <a:r>
+                <a:rPr lang="en-US" sz="1800" b="1" dirty="0">
+                  <a:ea typeface="Verdana" panose="020B0604030504040204" pitchFamily="34" charset="0"/>
+                  <a:cs typeface="Arial" panose="020B0604020202020204" pitchFamily="34" charset="0"/>
+                </a:rPr>
+                <a:t>improved traceability </a:t>
+              </a:r>
+              <a:r>
+                <a:rPr lang="en-US" sz="1800" dirty="0">
+                  <a:ea typeface="Verdana" panose="020B0604030504040204" pitchFamily="34" charset="0"/>
+                  <a:cs typeface="Arial" panose="020B0604020202020204" pitchFamily="34" charset="0"/>
+                </a:rPr>
+                <a:t>and </a:t>
+              </a:r>
+              <a:r>
+                <a:rPr lang="en-US" sz="1800" b="1" dirty="0">
+                  <a:ea typeface="Verdana" panose="020B0604030504040204" pitchFamily="34" charset="0"/>
+                  <a:cs typeface="Arial" panose="020B0604020202020204" pitchFamily="34" charset="0"/>
+                </a:rPr>
+                <a:t>eliminating duplication</a:t>
+              </a:r>
+              <a:r>
+                <a:rPr lang="en-US" sz="1800" dirty="0">
+                  <a:ea typeface="Verdana" panose="020B0604030504040204" pitchFamily="34" charset="0"/>
+                  <a:cs typeface="Arial" panose="020B0604020202020204" pitchFamily="34" charset="0"/>
+                </a:rPr>
+                <a:t>.</a:t>
+              </a:r>
+            </a:p>
+            <a:p>
+              <a:pPr marL="285750" indent="-285750">
+                <a:buFont typeface="Arial" panose="020B0604020202020204" pitchFamily="34" charset="0"/>
+                <a:buChar char="•"/>
+              </a:pPr>
+              <a:endParaRPr lang="en-US" sz="300" dirty="0">
                 <a:ea typeface="Verdana" panose="020B0604030504040204" pitchFamily="34" charset="0"/>
                 <a:cs typeface="Arial" panose="020B0604020202020204" pitchFamily="34" charset="0"/>
-              </a:rPr>
-              <a:t>Adopting </a:t>
-            </a:r>
-            <a:r>
-              <a:rPr lang="en-US" sz="1800" dirty="0" err="1">
+              </a:endParaRPr>
+            </a:p>
+            <a:p>
+              <a:pPr marL="612282" lvl="1" indent="-285750">
+                <a:buFont typeface="Wingdings" panose="05000000000000000000" pitchFamily="2" charset="2"/>
+                <a:buChar char="§"/>
+              </a:pPr>
+              <a:r>
+                <a:rPr lang="en-US" sz="1800" dirty="0">
+                  <a:ea typeface="Verdana" panose="020B0604030504040204" pitchFamily="34" charset="0"/>
+                  <a:cs typeface="Arial" panose="020B0604020202020204" pitchFamily="34" charset="0"/>
+                </a:rPr>
+                <a:t>Information is defined once and </a:t>
+              </a:r>
+              <a:r>
+                <a:rPr lang="en-US" sz="1800" b="1" dirty="0">
+                  <a:ea typeface="Verdana" panose="020B0604030504040204" pitchFamily="34" charset="0"/>
+                  <a:cs typeface="Arial" panose="020B0604020202020204" pitchFamily="34" charset="0"/>
+                </a:rPr>
+                <a:t>reused</a:t>
+              </a:r>
+              <a:r>
+                <a:rPr lang="en-US" sz="1800" dirty="0">
+                  <a:ea typeface="Verdana" panose="020B0604030504040204" pitchFamily="34" charset="0"/>
+                  <a:cs typeface="Arial" panose="020B0604020202020204" pitchFamily="34" charset="0"/>
+                </a:rPr>
+                <a:t> consistently across </a:t>
+              </a:r>
+              <a:r>
+                <a:rPr lang="en-US" sz="1800" b="1" dirty="0">
+                  <a:ea typeface="Verdana" panose="020B0604030504040204" pitchFamily="34" charset="0"/>
+                  <a:cs typeface="Arial" panose="020B0604020202020204" pitchFamily="34" charset="0"/>
+                </a:rPr>
+                <a:t>all</a:t>
+              </a:r>
+              <a:r>
+                <a:rPr lang="en-US" sz="1800" dirty="0">
+                  <a:ea typeface="Verdana" panose="020B0604030504040204" pitchFamily="34" charset="0"/>
+                  <a:cs typeface="Arial" panose="020B0604020202020204" pitchFamily="34" charset="0"/>
+                </a:rPr>
+                <a:t> documentation.</a:t>
+              </a:r>
+            </a:p>
+            <a:p>
+              <a:pPr marL="938814" lvl="2" indent="-285750">
+                <a:buFont typeface="Courier New" panose="02070309020205020404" pitchFamily="49" charset="0"/>
+                <a:buChar char="o"/>
+              </a:pPr>
+              <a:r>
+                <a:rPr lang="en-US" sz="1800" dirty="0">
+                  <a:ea typeface="Verdana" panose="020B0604030504040204" pitchFamily="34" charset="0"/>
+                  <a:cs typeface="Arial" panose="020B0604020202020204" pitchFamily="34" charset="0"/>
+                </a:rPr>
+                <a:t>Ex. </a:t>
+              </a:r>
+              <a:r>
+                <a:rPr lang="en-US" sz="1800" b="1" dirty="0">
+                  <a:ea typeface="Verdana" panose="020B0604030504040204" pitchFamily="34" charset="0"/>
+                  <a:cs typeface="Arial" panose="020B0604020202020204" pitchFamily="34" charset="0"/>
+                </a:rPr>
+                <a:t>1,422</a:t>
+              </a:r>
+              <a:r>
+                <a:rPr lang="en-US" sz="1800" dirty="0">
+                  <a:ea typeface="Verdana" panose="020B0604030504040204" pitchFamily="34" charset="0"/>
+                  <a:cs typeface="Arial" panose="020B0604020202020204" pitchFamily="34" charset="0"/>
+                </a:rPr>
+                <a:t> lines of user-written code </a:t>
+              </a:r>
+              <a:r>
+                <a:rPr lang="en-US" sz="1800" dirty="0">
+                  <a:ea typeface="Verdana" panose="020B0604030504040204" pitchFamily="34" charset="0"/>
+                  <a:cs typeface="Arial" panose="020B0604020202020204" pitchFamily="34" charset="0"/>
+                  <a:sym typeface="Symbol" panose="05050102010706020507" pitchFamily="18" charset="2"/>
+                </a:rPr>
+                <a:t> </a:t>
+              </a:r>
+              <a:r>
+                <a:rPr lang="en-US" sz="1800" b="1" dirty="0">
+                  <a:ea typeface="Verdana" panose="020B0604030504040204" pitchFamily="34" charset="0"/>
+                  <a:cs typeface="Arial" panose="020B0604020202020204" pitchFamily="34" charset="0"/>
+                  <a:sym typeface="Symbol" panose="05050102010706020507" pitchFamily="18" charset="2"/>
+                </a:rPr>
+                <a:t>7,243</a:t>
+              </a:r>
+              <a:r>
+                <a:rPr lang="en-US" sz="1800" dirty="0">
+                  <a:ea typeface="Verdana" panose="020B0604030504040204" pitchFamily="34" charset="0"/>
+                  <a:cs typeface="Arial" panose="020B0604020202020204" pitchFamily="34" charset="0"/>
+                  <a:sym typeface="Symbol" panose="05050102010706020507" pitchFamily="18" charset="2"/>
+                </a:rPr>
+                <a:t> lines of generated code</a:t>
+              </a:r>
+            </a:p>
+            <a:p>
+              <a:pPr lvl="2"/>
+              <a:endParaRPr lang="en-US" sz="500" dirty="0">
                 <a:ea typeface="Verdana" panose="020B0604030504040204" pitchFamily="34" charset="0"/>
                 <a:cs typeface="Arial" panose="020B0604020202020204" pitchFamily="34" charset="0"/>
-              </a:rPr>
-              <a:t>mdBook</a:t>
-            </a:r>
-            <a:r>
-              <a:rPr lang="en-US" sz="1800" dirty="0">
+              </a:endParaRPr>
+            </a:p>
+            <a:p>
+              <a:pPr marL="612282" lvl="1" indent="-285750">
+                <a:buFont typeface="Wingdings" panose="05000000000000000000" pitchFamily="2" charset="2"/>
+                <a:buChar char="§"/>
+              </a:pPr>
+              <a:r>
+                <a:rPr lang="en-US" sz="1800" dirty="0">
+                  <a:ea typeface="Verdana" panose="020B0604030504040204" pitchFamily="34" charset="0"/>
+                  <a:cs typeface="Arial" panose="020B0604020202020204" pitchFamily="34" charset="0"/>
+                </a:rPr>
+                <a:t>Maintaining and updating documentation is simplified, as editing the </a:t>
+              </a:r>
+              <a:r>
+                <a:rPr lang="en-US" sz="1800" dirty="0" err="1">
+                  <a:ea typeface="Verdana" panose="020B0604030504040204" pitchFamily="34" charset="0"/>
+                  <a:cs typeface="Arial" panose="020B0604020202020204" pitchFamily="34" charset="0"/>
+                </a:rPr>
+                <a:t>Drasil</a:t>
+              </a:r>
+              <a:r>
+                <a:rPr lang="en-US" sz="1800" dirty="0">
+                  <a:ea typeface="Verdana" panose="020B0604030504040204" pitchFamily="34" charset="0"/>
+                  <a:cs typeface="Arial" panose="020B0604020202020204" pitchFamily="34" charset="0"/>
+                </a:rPr>
+                <a:t> source code </a:t>
+              </a:r>
+              <a:r>
+                <a:rPr lang="en-US" sz="1800" b="1" dirty="0">
+                  <a:ea typeface="Verdana" panose="020B0604030504040204" pitchFamily="34" charset="0"/>
+                  <a:cs typeface="Arial" panose="020B0604020202020204" pitchFamily="34" charset="0"/>
+                </a:rPr>
+                <a:t>automatically</a:t>
+              </a:r>
+              <a:r>
+                <a:rPr lang="en-US" sz="1800" dirty="0">
+                  <a:ea typeface="Verdana" panose="020B0604030504040204" pitchFamily="34" charset="0"/>
+                  <a:cs typeface="Arial" panose="020B0604020202020204" pitchFamily="34" charset="0"/>
+                </a:rPr>
+                <a:t> updates </a:t>
+              </a:r>
+              <a:r>
+                <a:rPr lang="en-US" sz="1800" b="1" dirty="0">
+                  <a:ea typeface="Verdana" panose="020B0604030504040204" pitchFamily="34" charset="0"/>
+                  <a:cs typeface="Arial" panose="020B0604020202020204" pitchFamily="34" charset="0"/>
+                </a:rPr>
+                <a:t>all</a:t>
+              </a:r>
+              <a:r>
+                <a:rPr lang="en-US" sz="1800" dirty="0">
+                  <a:ea typeface="Verdana" panose="020B0604030504040204" pitchFamily="34" charset="0"/>
+                  <a:cs typeface="Arial" panose="020B0604020202020204" pitchFamily="34" charset="0"/>
+                </a:rPr>
+                <a:t> related documentation.</a:t>
+              </a:r>
+            </a:p>
+            <a:p>
+              <a:pPr lvl="1"/>
+              <a:endParaRPr lang="en-US" sz="500" dirty="0">
                 <a:ea typeface="Verdana" panose="020B0604030504040204" pitchFamily="34" charset="0"/>
                 <a:cs typeface="Arial" panose="020B0604020202020204" pitchFamily="34" charset="0"/>
-              </a:rPr>
-              <a:t> in </a:t>
-            </a:r>
-            <a:r>
-              <a:rPr lang="en-US" sz="1800" dirty="0" err="1">
-                <a:ea typeface="Verdana" panose="020B0604030504040204" pitchFamily="34" charset="0"/>
-                <a:cs typeface="Arial" panose="020B0604020202020204" pitchFamily="34" charset="0"/>
-              </a:rPr>
-              <a:t>Drasil</a:t>
-            </a:r>
-            <a:r>
-              <a:rPr lang="en-US" sz="1800" dirty="0">
-                <a:ea typeface="Verdana" panose="020B0604030504040204" pitchFamily="34" charset="0"/>
-                <a:cs typeface="Arial" panose="020B0604020202020204" pitchFamily="34" charset="0"/>
-              </a:rPr>
-              <a:t> enhances documentation quality and usability, aligning with goals of </a:t>
-            </a:r>
-            <a:r>
-              <a:rPr lang="en-US" sz="1800" b="1" dirty="0">
-                <a:ea typeface="Verdana" panose="020B0604030504040204" pitchFamily="34" charset="0"/>
-                <a:cs typeface="Arial" panose="020B0604020202020204" pitchFamily="34" charset="0"/>
-              </a:rPr>
-              <a:t>improved traceability </a:t>
-            </a:r>
-            <a:r>
-              <a:rPr lang="en-US" sz="1800" dirty="0">
-                <a:ea typeface="Verdana" panose="020B0604030504040204" pitchFamily="34" charset="0"/>
-                <a:cs typeface="Arial" panose="020B0604020202020204" pitchFamily="34" charset="0"/>
-              </a:rPr>
-              <a:t>and </a:t>
-            </a:r>
-            <a:r>
-              <a:rPr lang="en-US" sz="1800" b="1" dirty="0">
-                <a:ea typeface="Verdana" panose="020B0604030504040204" pitchFamily="34" charset="0"/>
-                <a:cs typeface="Arial" panose="020B0604020202020204" pitchFamily="34" charset="0"/>
-              </a:rPr>
-              <a:t>eliminating duplication</a:t>
-            </a:r>
-            <a:r>
-              <a:rPr lang="en-US" sz="1800" dirty="0">
-                <a:ea typeface="Verdana" panose="020B0604030504040204" pitchFamily="34" charset="0"/>
-                <a:cs typeface="Arial" panose="020B0604020202020204" pitchFamily="34" charset="0"/>
-              </a:rPr>
-              <a:t>.</a:t>
-            </a:r>
-            <a:endParaRPr lang="en-US" sz="800" dirty="0">
-              <a:ea typeface="Verdana" panose="020B0604030504040204" pitchFamily="34" charset="0"/>
-              <a:cs typeface="Arial" panose="020B0604020202020204" pitchFamily="34" charset="0"/>
-            </a:endParaRPr>
-          </a:p>
-          <a:p>
-            <a:pPr marL="612282" lvl="1" indent="-285750">
-              <a:buFont typeface="Wingdings" panose="05000000000000000000" pitchFamily="2" charset="2"/>
-              <a:buChar char="§"/>
-            </a:pPr>
-            <a:r>
-              <a:rPr lang="en-US" sz="1800" dirty="0">
-                <a:ea typeface="Verdana" panose="020B0604030504040204" pitchFamily="34" charset="0"/>
-                <a:cs typeface="Arial" panose="020B0604020202020204" pitchFamily="34" charset="0"/>
-              </a:rPr>
-              <a:t>Information is defined once and reused consistently across </a:t>
-            </a:r>
-            <a:r>
-              <a:rPr lang="en-US" sz="1800" b="1" dirty="0">
-                <a:ea typeface="Verdana" panose="020B0604030504040204" pitchFamily="34" charset="0"/>
-                <a:cs typeface="Arial" panose="020B0604020202020204" pitchFamily="34" charset="0"/>
-              </a:rPr>
-              <a:t>all</a:t>
-            </a:r>
-            <a:r>
-              <a:rPr lang="en-US" sz="1800" dirty="0">
-                <a:ea typeface="Verdana" panose="020B0604030504040204" pitchFamily="34" charset="0"/>
-                <a:cs typeface="Arial" panose="020B0604020202020204" pitchFamily="34" charset="0"/>
-              </a:rPr>
-              <a:t> documentation.</a:t>
-            </a:r>
-            <a:endParaRPr lang="en-US" sz="800" dirty="0">
-              <a:ea typeface="Verdana" panose="020B0604030504040204" pitchFamily="34" charset="0"/>
-              <a:cs typeface="Arial" panose="020B0604020202020204" pitchFamily="34" charset="0"/>
-            </a:endParaRPr>
-          </a:p>
-          <a:p>
-            <a:pPr marL="612282" lvl="1" indent="-285750">
-              <a:buFont typeface="Wingdings" panose="05000000000000000000" pitchFamily="2" charset="2"/>
-              <a:buChar char="§"/>
-            </a:pPr>
-            <a:r>
-              <a:rPr lang="en-US" sz="1800" dirty="0">
-                <a:ea typeface="Verdana" panose="020B0604030504040204" pitchFamily="34" charset="0"/>
-                <a:cs typeface="Arial" panose="020B0604020202020204" pitchFamily="34" charset="0"/>
-              </a:rPr>
-              <a:t>Maintaining and updating documentation is simplified, as editing the </a:t>
-            </a:r>
-            <a:r>
-              <a:rPr lang="en-US" sz="1800" dirty="0" err="1">
-                <a:ea typeface="Verdana" panose="020B0604030504040204" pitchFamily="34" charset="0"/>
-                <a:cs typeface="Arial" panose="020B0604020202020204" pitchFamily="34" charset="0"/>
-              </a:rPr>
-              <a:t>Drasil</a:t>
-            </a:r>
-            <a:r>
-              <a:rPr lang="en-US" sz="1800" dirty="0">
-                <a:ea typeface="Verdana" panose="020B0604030504040204" pitchFamily="34" charset="0"/>
-                <a:cs typeface="Arial" panose="020B0604020202020204" pitchFamily="34" charset="0"/>
-              </a:rPr>
-              <a:t> source code automatically updates all related documentation.</a:t>
-            </a:r>
-          </a:p>
-          <a:p>
-            <a:pPr lvl="1"/>
-            <a:endParaRPr lang="en-US" sz="1800" dirty="0">
-              <a:ea typeface="Verdana" panose="020B0604030504040204" pitchFamily="34" charset="0"/>
-              <a:cs typeface="Arial" panose="020B0604020202020204" pitchFamily="34" charset="0"/>
-            </a:endParaRPr>
-          </a:p>
-          <a:p>
-            <a:pPr marL="285750" indent="-285750">
-              <a:buFont typeface="Arial" panose="020B0604020202020204" pitchFamily="34" charset="0"/>
-              <a:buChar char="•"/>
-            </a:pPr>
-            <a:r>
-              <a:rPr lang="en-US" sz="1800" dirty="0">
-                <a:ea typeface="Verdana" panose="020B0604030504040204" pitchFamily="34" charset="0"/>
-                <a:cs typeface="Arial" panose="020B0604020202020204" pitchFamily="34" charset="0"/>
-              </a:rPr>
-              <a:t>With a Markdown definition DSL now established in </a:t>
-            </a:r>
-            <a:r>
-              <a:rPr lang="en-US" sz="1800" dirty="0" err="1">
-                <a:ea typeface="Verdana" panose="020B0604030504040204" pitchFamily="34" charset="0"/>
-                <a:cs typeface="Arial" panose="020B0604020202020204" pitchFamily="34" charset="0"/>
-              </a:rPr>
-              <a:t>Drasil</a:t>
-            </a:r>
-            <a:r>
-              <a:rPr lang="en-US" sz="1800" dirty="0">
-                <a:ea typeface="Verdana" panose="020B0604030504040204" pitchFamily="34" charset="0"/>
-                <a:cs typeface="Arial" panose="020B0604020202020204" pitchFamily="34" charset="0"/>
-              </a:rPr>
-              <a:t>, future work can focus on incorporating various Markdown flavors and generating new documentation formats.</a:t>
-            </a:r>
-          </a:p>
-        </p:txBody>
-      </p:sp>
+              </a:endParaRPr>
+            </a:p>
+            <a:p>
+              <a:pPr marL="285750" indent="-285750">
+                <a:buFont typeface="Arial" panose="020B0604020202020204" pitchFamily="34" charset="0"/>
+                <a:buChar char="•"/>
+              </a:pPr>
+              <a:r>
+                <a:rPr lang="en-US" sz="1800" dirty="0">
+                  <a:ea typeface="Verdana" panose="020B0604030504040204" pitchFamily="34" charset="0"/>
+                  <a:cs typeface="Arial" panose="020B0604020202020204" pitchFamily="34" charset="0"/>
+                </a:rPr>
+                <a:t>With a Markdown definition DSL now established in </a:t>
+              </a:r>
+              <a:r>
+                <a:rPr lang="en-US" sz="1800" dirty="0" err="1">
+                  <a:ea typeface="Verdana" panose="020B0604030504040204" pitchFamily="34" charset="0"/>
+                  <a:cs typeface="Arial" panose="020B0604020202020204" pitchFamily="34" charset="0"/>
+                </a:rPr>
+                <a:t>Drasil</a:t>
+              </a:r>
+              <a:r>
+                <a:rPr lang="en-US" sz="1800" dirty="0">
+                  <a:ea typeface="Verdana" panose="020B0604030504040204" pitchFamily="34" charset="0"/>
+                  <a:cs typeface="Arial" panose="020B0604020202020204" pitchFamily="34" charset="0"/>
+                </a:rPr>
+                <a:t>, future work can focus on incorporating various </a:t>
+              </a:r>
+              <a:r>
+                <a:rPr lang="en-US" sz="1800" b="1" dirty="0">
+                  <a:ea typeface="Verdana" panose="020B0604030504040204" pitchFamily="34" charset="0"/>
+                  <a:cs typeface="Arial" panose="020B0604020202020204" pitchFamily="34" charset="0"/>
+                </a:rPr>
+                <a:t>Markdown flavors </a:t>
+              </a:r>
+              <a:r>
+                <a:rPr lang="en-US" sz="1800" dirty="0">
+                  <a:ea typeface="Verdana" panose="020B0604030504040204" pitchFamily="34" charset="0"/>
+                  <a:cs typeface="Arial" panose="020B0604020202020204" pitchFamily="34" charset="0"/>
+                </a:rPr>
+                <a:t>and generating </a:t>
+              </a:r>
+              <a:r>
+                <a:rPr lang="en-US" sz="1800" b="1" dirty="0">
+                  <a:ea typeface="Verdana" panose="020B0604030504040204" pitchFamily="34" charset="0"/>
+                  <a:cs typeface="Arial" panose="020B0604020202020204" pitchFamily="34" charset="0"/>
+                </a:rPr>
+                <a:t>new documentation formats</a:t>
+              </a:r>
+              <a:r>
+                <a:rPr lang="en-US" sz="1800" dirty="0">
+                  <a:ea typeface="Verdana" panose="020B0604030504040204" pitchFamily="34" charset="0"/>
+                  <a:cs typeface="Arial" panose="020B0604020202020204" pitchFamily="34" charset="0"/>
+                </a:rPr>
+                <a:t>.</a:t>
+              </a:r>
+            </a:p>
+          </p:txBody>
+        </p:sp>
+      </p:grpSp>
       <p:grpSp>
         <p:nvGrpSpPr>
           <p:cNvPr id="65" name="Group 64">
@@ -12331,7 +12567,7 @@
             <p:nvPr/>
           </p:nvPicPr>
           <p:blipFill rotWithShape="1">
-            <a:blip r:embed="rId11"/>
+            <a:blip r:embed="rId12"/>
             <a:srcRect t="14865"/>
             <a:stretch/>
           </p:blipFill>
@@ -12368,7 +12604,7 @@
             <p:nvPr/>
           </p:nvPicPr>
           <p:blipFill rotWithShape="1">
-            <a:blip r:embed="rId12"/>
+            <a:blip r:embed="rId13"/>
             <a:srcRect t="4925"/>
             <a:stretch/>
           </p:blipFill>
@@ -12402,7 +12638,7 @@
             <p:nvPr/>
           </p:nvPicPr>
           <p:blipFill>
-            <a:blip r:embed="rId13"/>
+            <a:blip r:embed="rId14"/>
             <a:stretch>
               <a:fillRect/>
             </a:stretch>
@@ -12432,7 +12668,7 @@
             <p:nvPr/>
           </p:nvPicPr>
           <p:blipFill>
-            <a:blip r:embed="rId14"/>
+            <a:blip r:embed="rId15"/>
             <a:stretch>
               <a:fillRect/>
             </a:stretch>
@@ -12570,7 +12806,7 @@
             <p:nvPr/>
           </p:nvPicPr>
           <p:blipFill rotWithShape="1">
-            <a:blip r:embed="rId15"/>
+            <a:blip r:embed="rId16"/>
             <a:srcRect t="12040"/>
             <a:stretch/>
           </p:blipFill>
@@ -12604,7 +12840,7 @@
             <p:nvPr/>
           </p:nvPicPr>
           <p:blipFill rotWithShape="1">
-            <a:blip r:embed="rId16"/>
+            <a:blip r:embed="rId17"/>
             <a:srcRect t="12618"/>
             <a:stretch/>
           </p:blipFill>
@@ -12641,7 +12877,7 @@
             <p:nvPr/>
           </p:nvPicPr>
           <p:blipFill rotWithShape="1">
-            <a:blip r:embed="rId17"/>
+            <a:blip r:embed="rId18"/>
             <a:srcRect t="12040"/>
             <a:stretch/>
           </p:blipFill>
@@ -12776,7 +13012,7 @@
             <p:nvPr/>
           </p:nvPicPr>
           <p:blipFill rotWithShape="1">
-            <a:blip r:embed="rId18"/>
+            <a:blip r:embed="rId19"/>
             <a:srcRect t="13698"/>
             <a:stretch/>
           </p:blipFill>
@@ -12810,7 +13046,7 @@
             <p:nvPr/>
           </p:nvPicPr>
           <p:blipFill rotWithShape="1">
-            <a:blip r:embed="rId19"/>
+            <a:blip r:embed="rId20"/>
             <a:srcRect t="18930"/>
             <a:stretch/>
           </p:blipFill>
@@ -13078,7 +13314,7 @@
             <p:nvPr/>
           </p:nvPicPr>
           <p:blipFill rotWithShape="1">
-            <a:blip r:embed="rId20"/>
+            <a:blip r:embed="rId21"/>
             <a:srcRect t="12921"/>
             <a:stretch/>
           </p:blipFill>
@@ -13219,7 +13455,7 @@
           </p:nvSpPr>
           <p:spPr>
             <a:xfrm>
-              <a:off x="21064195" y="7877589"/>
+              <a:off x="20927144" y="7885081"/>
               <a:ext cx="2248971" cy="923330"/>
             </a:xfrm>
             <a:prstGeom prst="rect">
@@ -13340,8 +13576,8 @@
           </p:nvSpPr>
           <p:spPr>
             <a:xfrm>
-              <a:off x="20987512" y="5198554"/>
-              <a:ext cx="2248971" cy="923330"/>
+              <a:off x="20927144" y="5472352"/>
+              <a:ext cx="2248971" cy="369332"/>
             </a:xfrm>
             <a:prstGeom prst="rect">
               <a:avLst/>
@@ -13355,18 +13591,11 @@
             <a:lstStyle/>
             <a:p>
               <a:r>
-                <a:rPr lang="en-US" sz="1800" dirty="0" err="1">
-                  <a:ea typeface="Verdana" panose="020B0604030504040204" pitchFamily="34" charset="0"/>
-                  <a:cs typeface="Arial" panose="020B0604020202020204" pitchFamily="34" charset="0"/>
-                </a:rPr>
-                <a:t>Drasil</a:t>
-              </a:r>
-              <a:r>
                 <a:rPr lang="en-US" sz="1800" dirty="0">
                   <a:ea typeface="Verdana" panose="020B0604030504040204" pitchFamily="34" charset="0"/>
                   <a:cs typeface="Arial" panose="020B0604020202020204" pitchFamily="34" charset="0"/>
                 </a:rPr>
-                <a:t> source code: The code authored by the user.</a:t>
+                <a:t>User-Written Code</a:t>
               </a:r>
               <a:endParaRPr lang="en-CA" sz="1800" dirty="0">
                 <a:ea typeface="Verdana" panose="020B0604030504040204" pitchFamily="34" charset="0"/>
@@ -13454,7 +13683,7 @@
             <p:nvPr/>
           </p:nvPicPr>
           <p:blipFill rotWithShape="1">
-            <a:blip r:embed="rId21"/>
+            <a:blip r:embed="rId22"/>
             <a:srcRect t="20096" b="8878"/>
             <a:stretch/>
           </p:blipFill>
@@ -13477,385 +13706,376 @@
           </p:spPr>
         </p:pic>
       </p:grpSp>
-      <p:sp>
-        <p:nvSpPr>
-          <p:cNvPr id="72" name="Rectangle 71">
+      <p:grpSp>
+        <p:nvGrpSpPr>
+          <p:cNvPr id="23" name="Group 22">
             <a:extLst>
               <a:ext uri="{FF2B5EF4-FFF2-40B4-BE49-F238E27FC236}">
-                <a16:creationId xmlns:a16="http://schemas.microsoft.com/office/drawing/2014/main" id="{71D65D8B-570D-F406-2E1A-33AFBFC02B59}"/>
+                <a16:creationId xmlns:a16="http://schemas.microsoft.com/office/drawing/2014/main" id="{1AAE86F0-DF93-682E-75DC-70ECB4763A5C}"/>
               </a:ext>
             </a:extLst>
           </p:cNvPr>
-          <p:cNvSpPr/>
+          <p:cNvGrpSpPr/>
           <p:nvPr/>
-        </p:nvSpPr>
-        <p:spPr>
+        </p:nvGrpSpPr>
+        <p:grpSpPr>
           <a:xfrm>
-            <a:off x="24345901" y="7592694"/>
-            <a:ext cx="7762857" cy="584775"/>
+            <a:off x="24295237" y="3781498"/>
+            <a:ext cx="7784030" cy="7455186"/>
+            <a:chOff x="24324728" y="7592694"/>
+            <a:chExt cx="7784030" cy="7455186"/>
           </a:xfrm>
-          <a:prstGeom prst="rect">
-            <a:avLst/>
-          </a:prstGeom>
-          <a:solidFill>
-            <a:srgbClr val="7A003C"/>
-          </a:solidFill>
-          <a:ln>
+        </p:grpSpPr>
+        <p:sp>
+          <p:nvSpPr>
+            <p:cNvPr id="72" name="Rectangle 71">
+              <a:extLst>
+                <a:ext uri="{FF2B5EF4-FFF2-40B4-BE49-F238E27FC236}">
+                  <a16:creationId xmlns:a16="http://schemas.microsoft.com/office/drawing/2014/main" id="{71D65D8B-570D-F406-2E1A-33AFBFC02B59}"/>
+                </a:ext>
+              </a:extLst>
+            </p:cNvPr>
+            <p:cNvSpPr/>
+            <p:nvPr/>
+          </p:nvSpPr>
+          <p:spPr>
+            <a:xfrm>
+              <a:off x="24345901" y="7592694"/>
+              <a:ext cx="7762857" cy="584775"/>
+            </a:xfrm>
+            <a:prstGeom prst="rect">
+              <a:avLst/>
+            </a:prstGeom>
             <a:solidFill>
               <a:srgbClr val="7A003C"/>
             </a:solidFill>
-          </a:ln>
-        </p:spPr>
-        <p:style>
-          <a:lnRef idx="2">
-            <a:schemeClr val="accent1">
-              <a:shade val="50000"/>
-            </a:schemeClr>
-          </a:lnRef>
-          <a:fillRef idx="1">
-            <a:schemeClr val="accent1"/>
-          </a:fillRef>
-          <a:effectRef idx="0">
-            <a:schemeClr val="accent1"/>
-          </a:effectRef>
-          <a:fontRef idx="minor">
-            <a:schemeClr val="lt1"/>
-          </a:fontRef>
-        </p:style>
-        <p:txBody>
-          <a:bodyPr rtlCol="0" anchor="ctr"/>
-          <a:lstStyle/>
-          <a:p>
-            <a:pPr algn="ctr"/>
-            <a:endParaRPr lang="en-CA" sz="14810" dirty="0">
-              <a:latin typeface="Arial" panose="020B0604020202020204" pitchFamily="34" charset="0"/>
-              <a:cs typeface="Arial" panose="020B0604020202020204" pitchFamily="34" charset="0"/>
-            </a:endParaRPr>
-          </a:p>
-        </p:txBody>
-      </p:sp>
-      <p:sp>
-        <p:nvSpPr>
-          <p:cNvPr id="73" name="TextBox 72">
-            <a:extLst>
-              <a:ext uri="{FF2B5EF4-FFF2-40B4-BE49-F238E27FC236}">
-                <a16:creationId xmlns:a16="http://schemas.microsoft.com/office/drawing/2014/main" id="{DC32BF8C-EF5F-7E77-814D-F79CAEC82D00}"/>
-              </a:ext>
-            </a:extLst>
-          </p:cNvPr>
-          <p:cNvSpPr txBox="1"/>
-          <p:nvPr/>
-        </p:nvSpPr>
-        <p:spPr>
-          <a:xfrm>
-            <a:off x="24778321" y="7601668"/>
-            <a:ext cx="6898013" cy="584775"/>
-          </a:xfrm>
-          <a:prstGeom prst="rect">
-            <a:avLst/>
-          </a:prstGeom>
-          <a:noFill/>
-        </p:spPr>
-        <p:txBody>
-          <a:bodyPr wrap="square" rtlCol="0">
-            <a:spAutoFit/>
-          </a:bodyPr>
-          <a:lstStyle/>
-          <a:p>
-            <a:pPr algn="ctr"/>
-            <a:r>
-              <a:rPr lang="en-CA" sz="3200" b="1" dirty="0">
-                <a:solidFill>
-                  <a:schemeClr val="bg1"/>
-                </a:solidFill>
-                <a:latin typeface="+mj-lt"/>
+            <a:ln>
+              <a:solidFill>
+                <a:srgbClr val="7A003C"/>
+              </a:solidFill>
+            </a:ln>
+          </p:spPr>
+          <p:style>
+            <a:lnRef idx="2">
+              <a:schemeClr val="accent1">
+                <a:shade val="50000"/>
+              </a:schemeClr>
+            </a:lnRef>
+            <a:fillRef idx="1">
+              <a:schemeClr val="accent1"/>
+            </a:fillRef>
+            <a:effectRef idx="0">
+              <a:schemeClr val="accent1"/>
+            </a:effectRef>
+            <a:fontRef idx="minor">
+              <a:schemeClr val="lt1"/>
+            </a:fontRef>
+          </p:style>
+          <p:txBody>
+            <a:bodyPr rtlCol="0" anchor="ctr"/>
+            <a:lstStyle/>
+            <a:p>
+              <a:pPr algn="ctr"/>
+              <a:endParaRPr lang="en-CA" sz="14810" dirty="0">
+                <a:latin typeface="Arial" panose="020B0604020202020204" pitchFamily="34" charset="0"/>
                 <a:cs typeface="Arial" panose="020B0604020202020204" pitchFamily="34" charset="0"/>
-              </a:rPr>
-              <a:t>Benefits of Generative Programming</a:t>
-            </a:r>
-          </a:p>
-        </p:txBody>
-      </p:sp>
-      <p:graphicFrame>
-        <p:nvGraphicFramePr>
-          <p:cNvPr id="75" name="Chart 74">
-            <a:extLst>
-              <a:ext uri="{FF2B5EF4-FFF2-40B4-BE49-F238E27FC236}">
-                <a16:creationId xmlns:a16="http://schemas.microsoft.com/office/drawing/2014/main" id="{DF643C4D-E1EE-3A9A-0CF2-0781210787CE}"/>
-              </a:ext>
-            </a:extLst>
-          </p:cNvPr>
-          <p:cNvGraphicFramePr>
-            <a:graphicFrameLocks/>
-          </p:cNvGraphicFramePr>
-          <p:nvPr>
-            <p:extLst>
-              <p:ext uri="{D42A27DB-BD31-4B8C-83A1-F6EECF244321}">
-                <p14:modId xmlns:p14="http://schemas.microsoft.com/office/powerpoint/2010/main" val="2780746030"/>
-              </p:ext>
-            </p:extLst>
-          </p:nvPr>
-        </p:nvGraphicFramePr>
-        <p:xfrm>
-          <a:off x="24345897" y="10592310"/>
-          <a:ext cx="7762857" cy="4095536"/>
-        </p:xfrm>
-        <a:graphic>
-          <a:graphicData uri="http://schemas.openxmlformats.org/drawingml/2006/chart">
-            <c:chart xmlns:c="http://schemas.openxmlformats.org/drawingml/2006/chart" xmlns:r="http://schemas.openxmlformats.org/officeDocument/2006/relationships" r:id="rId22"/>
-          </a:graphicData>
-        </a:graphic>
-      </p:graphicFrame>
-      <p:sp>
-        <p:nvSpPr>
-          <p:cNvPr id="76" name="TextBox 75">
-            <a:extLst>
-              <a:ext uri="{FF2B5EF4-FFF2-40B4-BE49-F238E27FC236}">
-                <a16:creationId xmlns:a16="http://schemas.microsoft.com/office/drawing/2014/main" id="{EC9C7AF5-BDC0-7042-8053-85F30EABB756}"/>
-              </a:ext>
-            </a:extLst>
-          </p:cNvPr>
-          <p:cNvSpPr txBox="1"/>
-          <p:nvPr/>
-        </p:nvSpPr>
-        <p:spPr>
-          <a:xfrm>
-            <a:off x="24711654" y="14709326"/>
-            <a:ext cx="6898013" cy="338554"/>
-          </a:xfrm>
-          <a:prstGeom prst="rect">
-            <a:avLst/>
-          </a:prstGeom>
-          <a:noFill/>
-        </p:spPr>
-        <p:txBody>
-          <a:bodyPr wrap="square" rtlCol="0">
-            <a:spAutoFit/>
-          </a:bodyPr>
-          <a:lstStyle/>
-          <a:p>
-            <a:pPr algn="ctr"/>
-            <a:r>
-              <a:rPr lang="en-CA" sz="1600" b="1" dirty="0">
+              </a:endParaRPr>
+            </a:p>
+          </p:txBody>
+        </p:sp>
+        <p:sp>
+          <p:nvSpPr>
+            <p:cNvPr id="73" name="TextBox 72">
+              <a:extLst>
+                <a:ext uri="{FF2B5EF4-FFF2-40B4-BE49-F238E27FC236}">
+                  <a16:creationId xmlns:a16="http://schemas.microsoft.com/office/drawing/2014/main" id="{DC32BF8C-EF5F-7E77-814D-F79CAEC82D00}"/>
+                </a:ext>
+              </a:extLst>
+            </p:cNvPr>
+            <p:cNvSpPr txBox="1"/>
+            <p:nvPr/>
+          </p:nvSpPr>
+          <p:spPr>
+            <a:xfrm>
+              <a:off x="24778321" y="7601668"/>
+              <a:ext cx="6898013" cy="584775"/>
+            </a:xfrm>
+            <a:prstGeom prst="rect">
+              <a:avLst/>
+            </a:prstGeom>
+            <a:noFill/>
+          </p:spPr>
+          <p:txBody>
+            <a:bodyPr wrap="square" rtlCol="0">
+              <a:spAutoFit/>
+            </a:bodyPr>
+            <a:lstStyle/>
+            <a:p>
+              <a:pPr algn="ctr"/>
+              <a:r>
+                <a:rPr lang="en-CA" sz="3200" b="1" dirty="0">
+                  <a:solidFill>
+                    <a:schemeClr val="bg1"/>
+                  </a:solidFill>
+                  <a:latin typeface="+mj-lt"/>
+                  <a:cs typeface="Arial" panose="020B0604020202020204" pitchFamily="34" charset="0"/>
+                </a:rPr>
+                <a:t>Benefits of Generative Programming</a:t>
+              </a:r>
+            </a:p>
+          </p:txBody>
+        </p:sp>
+        <p:sp>
+          <p:nvSpPr>
+            <p:cNvPr id="76" name="TextBox 75">
+              <a:extLst>
+                <a:ext uri="{FF2B5EF4-FFF2-40B4-BE49-F238E27FC236}">
+                  <a16:creationId xmlns:a16="http://schemas.microsoft.com/office/drawing/2014/main" id="{EC9C7AF5-BDC0-7042-8053-85F30EABB756}"/>
+                </a:ext>
+              </a:extLst>
+            </p:cNvPr>
+            <p:cNvSpPr txBox="1"/>
+            <p:nvPr/>
+          </p:nvSpPr>
+          <p:spPr>
+            <a:xfrm>
+              <a:off x="24711654" y="14709326"/>
+              <a:ext cx="6898013" cy="338554"/>
+            </a:xfrm>
+            <a:prstGeom prst="rect">
+              <a:avLst/>
+            </a:prstGeom>
+            <a:noFill/>
+          </p:spPr>
+          <p:txBody>
+            <a:bodyPr wrap="square" rtlCol="0">
+              <a:spAutoFit/>
+            </a:bodyPr>
+            <a:lstStyle/>
+            <a:p>
+              <a:pPr algn="ctr"/>
+              <a:r>
+                <a:rPr lang="en-CA" sz="1600" b="1" dirty="0">
+                  <a:ea typeface="Verdana" panose="020B0604030504040204" pitchFamily="34" charset="0"/>
+                  <a:cs typeface="Arial" panose="020B0604020202020204" pitchFamily="34" charset="0"/>
+                </a:rPr>
+                <a:t>Figure 3</a:t>
+              </a:r>
+              <a:r>
+                <a:rPr lang="en-CA" sz="1600" dirty="0">
+                  <a:ea typeface="Verdana" panose="020B0604030504040204" pitchFamily="34" charset="0"/>
+                  <a:cs typeface="Arial" panose="020B0604020202020204" pitchFamily="34" charset="0"/>
+                </a:rPr>
+                <a:t>: </a:t>
+              </a:r>
+              <a:r>
+                <a:rPr lang="en-US" sz="1600" dirty="0">
+                  <a:ea typeface="Verdana" panose="020B0604030504040204" pitchFamily="34" charset="0"/>
+                  <a:cs typeface="Arial" panose="020B0604020202020204" pitchFamily="34" charset="0"/>
+                </a:rPr>
+                <a:t>A comparison of user-written code vs. generated code lines.</a:t>
+              </a:r>
+              <a:endParaRPr lang="en-CA" sz="1600" dirty="0">
                 <a:ea typeface="Verdana" panose="020B0604030504040204" pitchFamily="34" charset="0"/>
                 <a:cs typeface="Arial" panose="020B0604020202020204" pitchFamily="34" charset="0"/>
-              </a:rPr>
-              <a:t>Figure 3</a:t>
-            </a:r>
-            <a:r>
-              <a:rPr lang="en-CA" sz="1600" dirty="0">
+              </a:endParaRPr>
+            </a:p>
+          </p:txBody>
+        </p:sp>
+        <p:sp>
+          <p:nvSpPr>
+            <p:cNvPr id="77" name="TextBox 76">
+              <a:extLst>
+                <a:ext uri="{FF2B5EF4-FFF2-40B4-BE49-F238E27FC236}">
+                  <a16:creationId xmlns:a16="http://schemas.microsoft.com/office/drawing/2014/main" id="{78BE780F-2650-965F-8801-BDA657D7E2F7}"/>
+                </a:ext>
+              </a:extLst>
+            </p:cNvPr>
+            <p:cNvSpPr txBox="1"/>
+            <p:nvPr/>
+          </p:nvSpPr>
+          <p:spPr>
+            <a:xfrm>
+              <a:off x="24324728" y="8275012"/>
+              <a:ext cx="7762857" cy="2215991"/>
+            </a:xfrm>
+            <a:prstGeom prst="rect">
+              <a:avLst/>
+            </a:prstGeom>
+            <a:noFill/>
+          </p:spPr>
+          <p:txBody>
+            <a:bodyPr wrap="square" rtlCol="0">
+              <a:spAutoFit/>
+            </a:bodyPr>
+            <a:lstStyle/>
+            <a:p>
+              <a:r>
+                <a:rPr lang="en-US" sz="1800" b="1" dirty="0">
+                  <a:solidFill>
+                    <a:srgbClr val="7A003C"/>
+                  </a:solidFill>
+                  <a:ea typeface="Verdana" panose="020B0604030504040204" pitchFamily="34" charset="0"/>
+                  <a:cs typeface="Arial" panose="020B0604020202020204" pitchFamily="34" charset="0"/>
+                </a:rPr>
+                <a:t>Streamlined LaTeX updates: </a:t>
+              </a:r>
+              <a:r>
+                <a:rPr lang="en-US" sz="1800" dirty="0">
+                  <a:ea typeface="Verdana" panose="020B0604030504040204" pitchFamily="34" charset="0"/>
+                  <a:cs typeface="Arial" panose="020B0604020202020204" pitchFamily="34" charset="0"/>
+                </a:rPr>
+                <a:t>Updating the multiplication operator in LaTeX required just a </a:t>
+              </a:r>
+              <a:r>
+                <a:rPr lang="en-US" sz="1800" b="1" dirty="0">
+                  <a:ea typeface="Verdana" panose="020B0604030504040204" pitchFamily="34" charset="0"/>
+                  <a:cs typeface="Arial" panose="020B0604020202020204" pitchFamily="34" charset="0"/>
+                </a:rPr>
+                <a:t>4-line change in </a:t>
+              </a:r>
+              <a:r>
+                <a:rPr lang="en-US" sz="1800" b="1" dirty="0" err="1">
+                  <a:ea typeface="Verdana" panose="020B0604030504040204" pitchFamily="34" charset="0"/>
+                  <a:cs typeface="Arial" panose="020B0604020202020204" pitchFamily="34" charset="0"/>
+                </a:rPr>
+                <a:t>Drasil</a:t>
+              </a:r>
+              <a:r>
+                <a:rPr lang="en-US" sz="1800" b="1" dirty="0">
+                  <a:ea typeface="Verdana" panose="020B0604030504040204" pitchFamily="34" charset="0"/>
+                  <a:cs typeface="Arial" panose="020B0604020202020204" pitchFamily="34" charset="0"/>
+                </a:rPr>
+                <a:t> code</a:t>
+              </a:r>
+              <a:r>
+                <a:rPr lang="en-US" sz="1800" dirty="0">
+                  <a:ea typeface="Verdana" panose="020B0604030504040204" pitchFamily="34" charset="0"/>
+                  <a:cs typeface="Arial" panose="020B0604020202020204" pitchFamily="34" charset="0"/>
+                </a:rPr>
+                <a:t>. This minor adjustment led to around </a:t>
+              </a:r>
+              <a:r>
+                <a:rPr lang="en-US" sz="1800" b="1" dirty="0">
+                  <a:ea typeface="Verdana" panose="020B0604030504040204" pitchFamily="34" charset="0"/>
+                  <a:cs typeface="Arial" panose="020B0604020202020204" pitchFamily="34" charset="0"/>
+                </a:rPr>
+                <a:t>1,360 modifications </a:t>
+              </a:r>
+              <a:r>
+                <a:rPr lang="en-US" sz="1800" dirty="0">
+                  <a:ea typeface="Verdana" panose="020B0604030504040204" pitchFamily="34" charset="0"/>
+                  <a:cs typeface="Arial" panose="020B0604020202020204" pitchFamily="34" charset="0"/>
+                </a:rPr>
+                <a:t>across </a:t>
+              </a:r>
+              <a:r>
+                <a:rPr lang="en-US" sz="1800" b="1" dirty="0">
+                  <a:ea typeface="Verdana" panose="020B0604030504040204" pitchFamily="34" charset="0"/>
+                  <a:cs typeface="Arial" panose="020B0604020202020204" pitchFamily="34" charset="0"/>
+                </a:rPr>
+                <a:t>67 generated files</a:t>
+              </a:r>
+              <a:r>
+                <a:rPr lang="en-US" sz="1800" dirty="0">
+                  <a:ea typeface="Verdana" panose="020B0604030504040204" pitchFamily="34" charset="0"/>
+                  <a:cs typeface="Arial" panose="020B0604020202020204" pitchFamily="34" charset="0"/>
+                </a:rPr>
+                <a:t>, highlighting </a:t>
+              </a:r>
+              <a:r>
+                <a:rPr lang="en-US" sz="1800" dirty="0" err="1">
+                  <a:ea typeface="Verdana" panose="020B0604030504040204" pitchFamily="34" charset="0"/>
+                  <a:cs typeface="Arial" panose="020B0604020202020204" pitchFamily="34" charset="0"/>
+                </a:rPr>
+                <a:t>Drasil’s</a:t>
+              </a:r>
+              <a:r>
+                <a:rPr lang="en-US" sz="1800" dirty="0">
+                  <a:ea typeface="Verdana" panose="020B0604030504040204" pitchFamily="34" charset="0"/>
+                  <a:cs typeface="Arial" panose="020B0604020202020204" pitchFamily="34" charset="0"/>
+                </a:rPr>
+                <a:t> efficiency.</a:t>
+              </a:r>
+            </a:p>
+            <a:p>
+              <a:endParaRPr lang="en-US" sz="1050" dirty="0">
                 <a:ea typeface="Verdana" panose="020B0604030504040204" pitchFamily="34" charset="0"/>
                 <a:cs typeface="Arial" panose="020B0604020202020204" pitchFamily="34" charset="0"/>
-              </a:rPr>
-              <a:t>: </a:t>
-            </a:r>
-            <a:r>
-              <a:rPr lang="en-US" sz="1600" dirty="0">
+              </a:endParaRPr>
+            </a:p>
+            <a:p>
+              <a:r>
+                <a:rPr lang="en-US" sz="1800" dirty="0">
+                  <a:ea typeface="Verdana" panose="020B0604030504040204" pitchFamily="34" charset="0"/>
+                  <a:cs typeface="Arial" panose="020B0604020202020204" pitchFamily="34" charset="0"/>
+                </a:rPr>
+                <a:t>The graph below illustrates that software documentation generated with </a:t>
+              </a:r>
+              <a:r>
+                <a:rPr lang="en-US" sz="1800" dirty="0" err="1">
+                  <a:ea typeface="Verdana" panose="020B0604030504040204" pitchFamily="34" charset="0"/>
+                  <a:cs typeface="Arial" panose="020B0604020202020204" pitchFamily="34" charset="0"/>
+                </a:rPr>
+                <a:t>Drasil</a:t>
+              </a:r>
+              <a:r>
+                <a:rPr lang="en-US" sz="1800" dirty="0">
+                  <a:ea typeface="Verdana" panose="020B0604030504040204" pitchFamily="34" charset="0"/>
+                  <a:cs typeface="Arial" panose="020B0604020202020204" pitchFamily="34" charset="0"/>
+                </a:rPr>
+                <a:t> needed only </a:t>
+              </a:r>
+              <a:r>
+                <a:rPr lang="en-US" sz="1800" b="1" dirty="0">
+                  <a:ea typeface="Verdana" panose="020B0604030504040204" pitchFamily="34" charset="0"/>
+                  <a:cs typeface="Arial" panose="020B0604020202020204" pitchFamily="34" charset="0"/>
+                </a:rPr>
+                <a:t>1,422 lines of user-written code</a:t>
+              </a:r>
+              <a:r>
+                <a:rPr lang="en-US" sz="1800" dirty="0">
+                  <a:ea typeface="Verdana" panose="020B0604030504040204" pitchFamily="34" charset="0"/>
+                  <a:cs typeface="Arial" panose="020B0604020202020204" pitchFamily="34" charset="0"/>
+                </a:rPr>
+                <a:t>, producing </a:t>
+              </a:r>
+              <a:r>
+                <a:rPr lang="en-US" sz="1800" b="1" dirty="0">
+                  <a:ea typeface="Verdana" panose="020B0604030504040204" pitchFamily="34" charset="0"/>
+                  <a:cs typeface="Arial" panose="020B0604020202020204" pitchFamily="34" charset="0"/>
+                </a:rPr>
+                <a:t>7,243 lines of generated documentation code</a:t>
+              </a:r>
+              <a:r>
+                <a:rPr lang="en-US" sz="1800" dirty="0">
+                  <a:ea typeface="Verdana" panose="020B0604030504040204" pitchFamily="34" charset="0"/>
+                  <a:cs typeface="Arial" panose="020B0604020202020204" pitchFamily="34" charset="0"/>
+                </a:rPr>
+                <a:t>—a </a:t>
+              </a:r>
+              <a:r>
+                <a:rPr lang="en-US" sz="1800" b="1" dirty="0">
+                  <a:ea typeface="Verdana" panose="020B0604030504040204" pitchFamily="34" charset="0"/>
+                  <a:cs typeface="Arial" panose="020B0604020202020204" pitchFamily="34" charset="0"/>
+                </a:rPr>
+                <a:t>1:5</a:t>
+              </a:r>
+              <a:r>
+                <a:rPr lang="en-US" sz="1800" dirty="0">
+                  <a:ea typeface="Verdana" panose="020B0604030504040204" pitchFamily="34" charset="0"/>
+                  <a:cs typeface="Arial" panose="020B0604020202020204" pitchFamily="34" charset="0"/>
+                </a:rPr>
+                <a:t> ratio!</a:t>
+              </a:r>
+              <a:endParaRPr lang="en-CA" sz="1800" dirty="0">
                 <a:ea typeface="Verdana" panose="020B0604030504040204" pitchFamily="34" charset="0"/>
                 <a:cs typeface="Arial" panose="020B0604020202020204" pitchFamily="34" charset="0"/>
-              </a:rPr>
-              <a:t>A comparison of user-written code vs. generated code lines.</a:t>
-            </a:r>
-            <a:endParaRPr lang="en-CA" sz="1600" dirty="0">
-              <a:ea typeface="Verdana" panose="020B0604030504040204" pitchFamily="34" charset="0"/>
-              <a:cs typeface="Arial" panose="020B0604020202020204" pitchFamily="34" charset="0"/>
-            </a:endParaRPr>
-          </a:p>
-        </p:txBody>
-      </p:sp>
-      <p:sp>
-        <p:nvSpPr>
-          <p:cNvPr id="77" name="TextBox 76">
-            <a:extLst>
-              <a:ext uri="{FF2B5EF4-FFF2-40B4-BE49-F238E27FC236}">
-                <a16:creationId xmlns:a16="http://schemas.microsoft.com/office/drawing/2014/main" id="{78BE780F-2650-965F-8801-BDA657D7E2F7}"/>
-              </a:ext>
-            </a:extLst>
-          </p:cNvPr>
-          <p:cNvSpPr txBox="1"/>
-          <p:nvPr/>
-        </p:nvSpPr>
-        <p:spPr>
-          <a:xfrm>
-            <a:off x="24324728" y="8275012"/>
-            <a:ext cx="7762857" cy="2308324"/>
-          </a:xfrm>
-          <a:prstGeom prst="rect">
-            <a:avLst/>
-          </a:prstGeom>
-          <a:noFill/>
-        </p:spPr>
-        <p:txBody>
-          <a:bodyPr wrap="square" rtlCol="0">
-            <a:spAutoFit/>
-          </a:bodyPr>
-          <a:lstStyle/>
-          <a:p>
-            <a:r>
-              <a:rPr lang="en-US" sz="1800" b="1" dirty="0">
-                <a:solidFill>
-                  <a:srgbClr val="7A003C"/>
-                </a:solidFill>
-                <a:ea typeface="Verdana" panose="020B0604030504040204" pitchFamily="34" charset="0"/>
-                <a:cs typeface="Arial" panose="020B0604020202020204" pitchFamily="34" charset="0"/>
-              </a:rPr>
-              <a:t>Streamlined LaTeX updates: </a:t>
-            </a:r>
-            <a:r>
-              <a:rPr lang="en-US" sz="1800" dirty="0">
-                <a:ea typeface="Verdana" panose="020B0604030504040204" pitchFamily="34" charset="0"/>
-                <a:cs typeface="Arial" panose="020B0604020202020204" pitchFamily="34" charset="0"/>
-              </a:rPr>
-              <a:t>Updating the multiplication operator in LaTeX required just </a:t>
-            </a:r>
-            <a:r>
-              <a:rPr lang="en-US" sz="1800" b="1" dirty="0">
-                <a:ea typeface="Verdana" panose="020B0604030504040204" pitchFamily="34" charset="0"/>
-                <a:cs typeface="Arial" panose="020B0604020202020204" pitchFamily="34" charset="0"/>
-              </a:rPr>
-              <a:t>a 4-line change in </a:t>
-            </a:r>
-            <a:r>
-              <a:rPr lang="en-US" sz="1800" b="1" dirty="0" err="1">
-                <a:ea typeface="Verdana" panose="020B0604030504040204" pitchFamily="34" charset="0"/>
-                <a:cs typeface="Arial" panose="020B0604020202020204" pitchFamily="34" charset="0"/>
-              </a:rPr>
-              <a:t>Drasil</a:t>
-            </a:r>
-            <a:r>
-              <a:rPr lang="en-US" sz="1800" b="1" dirty="0">
-                <a:ea typeface="Verdana" panose="020B0604030504040204" pitchFamily="34" charset="0"/>
-                <a:cs typeface="Arial" panose="020B0604020202020204" pitchFamily="34" charset="0"/>
-              </a:rPr>
-              <a:t> code</a:t>
-            </a:r>
-            <a:r>
-              <a:rPr lang="en-US" sz="1800" dirty="0">
-                <a:ea typeface="Verdana" panose="020B0604030504040204" pitchFamily="34" charset="0"/>
-                <a:cs typeface="Arial" panose="020B0604020202020204" pitchFamily="34" charset="0"/>
-              </a:rPr>
-              <a:t>. This minor adjustment led to around </a:t>
-            </a:r>
-            <a:r>
-              <a:rPr lang="en-US" sz="1800" b="1" dirty="0">
-                <a:ea typeface="Verdana" panose="020B0604030504040204" pitchFamily="34" charset="0"/>
-                <a:cs typeface="Arial" panose="020B0604020202020204" pitchFamily="34" charset="0"/>
-              </a:rPr>
-              <a:t>1,360 modifications </a:t>
-            </a:r>
-            <a:r>
-              <a:rPr lang="en-US" sz="1800" dirty="0">
-                <a:ea typeface="Verdana" panose="020B0604030504040204" pitchFamily="34" charset="0"/>
-                <a:cs typeface="Arial" panose="020B0604020202020204" pitchFamily="34" charset="0"/>
-              </a:rPr>
-              <a:t>across </a:t>
-            </a:r>
-            <a:r>
-              <a:rPr lang="en-US" sz="1800" b="1" dirty="0">
-                <a:ea typeface="Verdana" panose="020B0604030504040204" pitchFamily="34" charset="0"/>
-                <a:cs typeface="Arial" panose="020B0604020202020204" pitchFamily="34" charset="0"/>
-              </a:rPr>
-              <a:t>67 generated files</a:t>
-            </a:r>
-            <a:r>
-              <a:rPr lang="en-US" sz="1800" dirty="0">
-                <a:ea typeface="Verdana" panose="020B0604030504040204" pitchFamily="34" charset="0"/>
-                <a:cs typeface="Arial" panose="020B0604020202020204" pitchFamily="34" charset="0"/>
-              </a:rPr>
-              <a:t>, highlighting </a:t>
-            </a:r>
-            <a:r>
-              <a:rPr lang="en-US" sz="1800" dirty="0" err="1">
-                <a:ea typeface="Verdana" panose="020B0604030504040204" pitchFamily="34" charset="0"/>
-                <a:cs typeface="Arial" panose="020B0604020202020204" pitchFamily="34" charset="0"/>
-              </a:rPr>
-              <a:t>Drasil’s</a:t>
-            </a:r>
-            <a:r>
-              <a:rPr lang="en-US" sz="1800" dirty="0">
-                <a:ea typeface="Verdana" panose="020B0604030504040204" pitchFamily="34" charset="0"/>
-                <a:cs typeface="Arial" panose="020B0604020202020204" pitchFamily="34" charset="0"/>
-              </a:rPr>
-              <a:t> efficiency.</a:t>
-            </a:r>
-          </a:p>
-          <a:p>
-            <a:endParaRPr lang="en-US" sz="1800" dirty="0">
-              <a:ea typeface="Verdana" panose="020B0604030504040204" pitchFamily="34" charset="0"/>
-              <a:cs typeface="Arial" panose="020B0604020202020204" pitchFamily="34" charset="0"/>
-            </a:endParaRPr>
-          </a:p>
-          <a:p>
-            <a:r>
-              <a:rPr lang="en-US" sz="1800" dirty="0">
-                <a:ea typeface="Verdana" panose="020B0604030504040204" pitchFamily="34" charset="0"/>
-                <a:cs typeface="Arial" panose="020B0604020202020204" pitchFamily="34" charset="0"/>
-              </a:rPr>
-              <a:t>The graph below shows that software documentation generated with </a:t>
-            </a:r>
-            <a:r>
-              <a:rPr lang="en-US" sz="1800" dirty="0" err="1">
-                <a:ea typeface="Verdana" panose="020B0604030504040204" pitchFamily="34" charset="0"/>
-                <a:cs typeface="Arial" panose="020B0604020202020204" pitchFamily="34" charset="0"/>
-              </a:rPr>
-              <a:t>Drasil</a:t>
-            </a:r>
-            <a:r>
-              <a:rPr lang="en-US" sz="1800" dirty="0">
-                <a:ea typeface="Verdana" panose="020B0604030504040204" pitchFamily="34" charset="0"/>
-                <a:cs typeface="Arial" panose="020B0604020202020204" pitchFamily="34" charset="0"/>
-              </a:rPr>
-              <a:t> needed only </a:t>
-            </a:r>
-            <a:r>
-              <a:rPr lang="en-US" sz="1800" b="1" dirty="0">
-                <a:ea typeface="Verdana" panose="020B0604030504040204" pitchFamily="34" charset="0"/>
-                <a:cs typeface="Arial" panose="020B0604020202020204" pitchFamily="34" charset="0"/>
-              </a:rPr>
-              <a:t>1,422 lines of user-written code</a:t>
-            </a:r>
-            <a:r>
-              <a:rPr lang="en-US" sz="1800" dirty="0">
-                <a:ea typeface="Verdana" panose="020B0604030504040204" pitchFamily="34" charset="0"/>
-                <a:cs typeface="Arial" panose="020B0604020202020204" pitchFamily="34" charset="0"/>
-              </a:rPr>
-              <a:t>, producing </a:t>
-            </a:r>
-            <a:r>
-              <a:rPr lang="en-US" sz="1800" b="1" dirty="0">
-                <a:ea typeface="Verdana" panose="020B0604030504040204" pitchFamily="34" charset="0"/>
-                <a:cs typeface="Arial" panose="020B0604020202020204" pitchFamily="34" charset="0"/>
-              </a:rPr>
-              <a:t>7,243 lines of generated code</a:t>
-            </a:r>
-            <a:r>
-              <a:rPr lang="en-US" sz="1800" dirty="0">
-                <a:ea typeface="Verdana" panose="020B0604030504040204" pitchFamily="34" charset="0"/>
-                <a:cs typeface="Arial" panose="020B0604020202020204" pitchFamily="34" charset="0"/>
-              </a:rPr>
-              <a:t>—a </a:t>
-            </a:r>
-            <a:r>
-              <a:rPr lang="en-US" sz="1800" b="1" dirty="0">
-                <a:ea typeface="Verdana" panose="020B0604030504040204" pitchFamily="34" charset="0"/>
-                <a:cs typeface="Arial" panose="020B0604020202020204" pitchFamily="34" charset="0"/>
-              </a:rPr>
-              <a:t>1:5</a:t>
-            </a:r>
-            <a:r>
-              <a:rPr lang="en-US" sz="1800" dirty="0">
-                <a:ea typeface="Verdana" panose="020B0604030504040204" pitchFamily="34" charset="0"/>
-                <a:cs typeface="Arial" panose="020B0604020202020204" pitchFamily="34" charset="0"/>
-              </a:rPr>
-              <a:t> ratio!</a:t>
-            </a:r>
-            <a:endParaRPr lang="en-CA" sz="1800" dirty="0">
-              <a:ea typeface="Verdana" panose="020B0604030504040204" pitchFamily="34" charset="0"/>
-              <a:cs typeface="Arial" panose="020B0604020202020204" pitchFamily="34" charset="0"/>
-            </a:endParaRPr>
-          </a:p>
-        </p:txBody>
-      </p:sp>
+              </a:endParaRPr>
+            </a:p>
+          </p:txBody>
+        </p:sp>
+      </p:grpSp>
       <p:pic>
         <p:nvPicPr>
           <p:cNvPr id="84" name="Picture 83" descr="A qr code on a black background&#10;&#10;Description automatically generated">

</xml_diff>